<commit_message>
gestion erreur adresse email dans le sondage
</commit_message>
<xml_diff>
--- a/PFE - Copie.pptx
+++ b/PFE - Copie.pptx
@@ -5,10 +5,10 @@
     <p:sldMasterId id="2147483648" r:id="rId4"/>
   </p:sldMasterIdLst>
   <p:notesMasterIdLst>
-    <p:notesMasterId r:id="rId20"/>
+    <p:notesMasterId r:id="rId19"/>
   </p:notesMasterIdLst>
   <p:handoutMasterIdLst>
-    <p:handoutMasterId r:id="rId21"/>
+    <p:handoutMasterId r:id="rId20"/>
   </p:handoutMasterIdLst>
   <p:sldIdLst>
     <p:sldId id="265" r:id="rId5"/>
@@ -17,20 +17,19 @@
     <p:sldId id="326" r:id="rId8"/>
     <p:sldId id="341" r:id="rId9"/>
     <p:sldId id="342" r:id="rId10"/>
-    <p:sldId id="327" r:id="rId11"/>
+    <p:sldId id="328" r:id="rId11"/>
     <p:sldId id="343" r:id="rId12"/>
     <p:sldId id="344" r:id="rId13"/>
-    <p:sldId id="345" r:id="rId14"/>
-    <p:sldId id="346" r:id="rId15"/>
+    <p:sldId id="346" r:id="rId14"/>
+    <p:sldId id="327" r:id="rId15"/>
     <p:sldId id="339" r:id="rId16"/>
     <p:sldId id="340" r:id="rId17"/>
     <p:sldId id="329" r:id="rId18"/>
-    <p:sldId id="328" r:id="rId19"/>
   </p:sldIdLst>
   <p:sldSz cx="12188825" cy="6858000"/>
   <p:notesSz cx="6858000" cy="9144000"/>
   <p:custDataLst>
-    <p:tags r:id="rId22"/>
+    <p:tags r:id="rId21"/>
   </p:custDataLst>
   <p:defaultTextStyle>
     <a:defPPr rtl="0">
@@ -149,6 +148,54 @@
 </p:presentation>
 </file>
 
+<file path=ppt/commentAuthors.xml><?xml version="1.0" encoding="utf-8"?>
+<p:cmAuthorLst xmlns:a="http://schemas.openxmlformats.org/drawingml/2006/main" xmlns:r="http://schemas.openxmlformats.org/officeDocument/2006/relationships" xmlns:p="http://schemas.openxmlformats.org/presentationml/2006/main">
+  <p:cmAuthor id="2" name="Auteur" initials="A" lastIdx="3" clrIdx="1"/>
+</p:cmAuthorLst>
+</file>
+
+<file path=ppt/comments/comment1.xml><?xml version="1.0" encoding="utf-8"?>
+<p:cmLst xmlns:a="http://schemas.openxmlformats.org/drawingml/2006/main" xmlns:r="http://schemas.openxmlformats.org/officeDocument/2006/relationships" xmlns:p="http://schemas.openxmlformats.org/presentationml/2006/main">
+  <p:cm authorId="2" dt="2019-09-16T09:45:46.801" idx="1">
+    <p:pos x="10" y="10"/>
+    <p:text>Architecture du site en 4 parties :  1 --- BDD  -----2 et 3 ---- chemin des utilisateurs --- 4 --- routes</p:text>
+    <p:extLst>
+      <p:ext uri="{C676402C-5697-4E1C-873F-D02D1690AC5C}">
+        <p15:threadingInfo xmlns:p15="http://schemas.microsoft.com/office/powerpoint/2012/main" timeZoneBias="-120"/>
+      </p:ext>
+    </p:extLst>
+  </p:cm>
+</p:cmLst>
+</file>
+
+<file path=ppt/comments/comment2.xml><?xml version="1.0" encoding="utf-8"?>
+<p:cmLst xmlns:a="http://schemas.openxmlformats.org/drawingml/2006/main" xmlns:r="http://schemas.openxmlformats.org/officeDocument/2006/relationships" xmlns:p="http://schemas.openxmlformats.org/presentationml/2006/main">
+  <p:cm authorId="2" dt="2019-09-16T11:56:13.699" idx="3">
+    <p:pos x="10" y="10"/>
+    <p:text>2 parcours type</p:text>
+    <p:extLst>
+      <p:ext uri="{C676402C-5697-4E1C-873F-D02D1690AC5C}">
+        <p15:threadingInfo xmlns:p15="http://schemas.microsoft.com/office/powerpoint/2012/main" timeZoneBias="-120"/>
+      </p:ext>
+    </p:extLst>
+  </p:cm>
+</p:cmLst>
+</file>
+
+<file path=ppt/comments/comment3.xml><?xml version="1.0" encoding="utf-8"?>
+<p:cmLst xmlns:a="http://schemas.openxmlformats.org/drawingml/2006/main" xmlns:r="http://schemas.openxmlformats.org/officeDocument/2006/relationships" xmlns:p="http://schemas.openxmlformats.org/presentationml/2006/main">
+  <p:cm authorId="2" dt="2019-09-16T09:45:42.856" idx="2">
+    <p:pos x="10" y="10"/>
+    <p:text/>
+    <p:extLst>
+      <p:ext uri="{C676402C-5697-4E1C-873F-D02D1690AC5C}">
+        <p15:threadingInfo xmlns:p15="http://schemas.microsoft.com/office/powerpoint/2012/main" timeZoneBias="-120"/>
+      </p:ext>
+    </p:extLst>
+  </p:cm>
+</p:cmLst>
+</file>
+
 <file path=ppt/diagrams/colors1.xml><?xml version="1.0" encoding="utf-8"?>
 <dgm:colorsDef xmlns:dgm="http://schemas.openxmlformats.org/drawingml/2006/diagram" xmlns:a="http://schemas.openxmlformats.org/drawingml/2006/main" uniqueId="urn:microsoft.com/office/officeart/2005/8/colors/accent1_2">
   <dgm:title val=""/>
@@ -1643,1086 +1690,7 @@
 </dgm:colorsDef>
 </file>
 
-<file path=ppt/diagrams/colors3.xml><?xml version="1.0" encoding="utf-8"?>
-<dgm:colorsDef xmlns:dgm="http://schemas.openxmlformats.org/drawingml/2006/diagram" xmlns:a="http://schemas.openxmlformats.org/drawingml/2006/main" uniqueId="urn:microsoft.com/office/officeart/2005/8/colors/accent1_2">
-  <dgm:title val=""/>
-  <dgm:desc val=""/>
-  <dgm:catLst>
-    <dgm:cat type="accent1" pri="11200"/>
-  </dgm:catLst>
-  <dgm:styleLbl name="node0">
-    <dgm:fillClrLst meth="repeat">
-      <a:schemeClr val="accent1"/>
-    </dgm:fillClrLst>
-    <dgm:linClrLst meth="repeat">
-      <a:schemeClr val="lt1"/>
-    </dgm:linClrLst>
-    <dgm:effectClrLst/>
-    <dgm:txLinClrLst/>
-    <dgm:txFillClrLst/>
-    <dgm:txEffectClrLst/>
-  </dgm:styleLbl>
-  <dgm:styleLbl name="alignNode1">
-    <dgm:fillClrLst meth="repeat">
-      <a:schemeClr val="accent1"/>
-    </dgm:fillClrLst>
-    <dgm:linClrLst meth="repeat">
-      <a:schemeClr val="accent1"/>
-    </dgm:linClrLst>
-    <dgm:effectClrLst/>
-    <dgm:txLinClrLst/>
-    <dgm:txFillClrLst/>
-    <dgm:txEffectClrLst/>
-  </dgm:styleLbl>
-  <dgm:styleLbl name="node1">
-    <dgm:fillClrLst meth="repeat">
-      <a:schemeClr val="accent1"/>
-    </dgm:fillClrLst>
-    <dgm:linClrLst meth="repeat">
-      <a:schemeClr val="lt1"/>
-    </dgm:linClrLst>
-    <dgm:effectClrLst/>
-    <dgm:txLinClrLst/>
-    <dgm:txFillClrLst/>
-    <dgm:txEffectClrLst/>
-  </dgm:styleLbl>
-  <dgm:styleLbl name="lnNode1">
-    <dgm:fillClrLst meth="repeat">
-      <a:schemeClr val="accent1"/>
-    </dgm:fillClrLst>
-    <dgm:linClrLst meth="repeat">
-      <a:schemeClr val="lt1"/>
-    </dgm:linClrLst>
-    <dgm:effectClrLst/>
-    <dgm:txLinClrLst/>
-    <dgm:txFillClrLst/>
-    <dgm:txEffectClrLst/>
-  </dgm:styleLbl>
-  <dgm:styleLbl name="vennNode1">
-    <dgm:fillClrLst meth="repeat">
-      <a:schemeClr val="accent1">
-        <a:alpha val="50000"/>
-      </a:schemeClr>
-    </dgm:fillClrLst>
-    <dgm:linClrLst meth="repeat">
-      <a:schemeClr val="lt1"/>
-    </dgm:linClrLst>
-    <dgm:effectClrLst/>
-    <dgm:txLinClrLst/>
-    <dgm:txFillClrLst/>
-    <dgm:txEffectClrLst/>
-  </dgm:styleLbl>
-  <dgm:styleLbl name="node2">
-    <dgm:fillClrLst meth="repeat">
-      <a:schemeClr val="accent1"/>
-    </dgm:fillClrLst>
-    <dgm:linClrLst meth="repeat">
-      <a:schemeClr val="lt1"/>
-    </dgm:linClrLst>
-    <dgm:effectClrLst/>
-    <dgm:txLinClrLst/>
-    <dgm:txFillClrLst/>
-    <dgm:txEffectClrLst/>
-  </dgm:styleLbl>
-  <dgm:styleLbl name="node3">
-    <dgm:fillClrLst meth="repeat">
-      <a:schemeClr val="accent1"/>
-    </dgm:fillClrLst>
-    <dgm:linClrLst meth="repeat">
-      <a:schemeClr val="lt1"/>
-    </dgm:linClrLst>
-    <dgm:effectClrLst/>
-    <dgm:txLinClrLst/>
-    <dgm:txFillClrLst/>
-    <dgm:txEffectClrLst/>
-  </dgm:styleLbl>
-  <dgm:styleLbl name="node4">
-    <dgm:fillClrLst meth="repeat">
-      <a:schemeClr val="accent1"/>
-    </dgm:fillClrLst>
-    <dgm:linClrLst meth="repeat">
-      <a:schemeClr val="lt1"/>
-    </dgm:linClrLst>
-    <dgm:effectClrLst/>
-    <dgm:txLinClrLst/>
-    <dgm:txFillClrLst/>
-    <dgm:txEffectClrLst/>
-  </dgm:styleLbl>
-  <dgm:styleLbl name="fgImgPlace1">
-    <dgm:fillClrLst meth="repeat">
-      <a:schemeClr val="accent1">
-        <a:tint val="50000"/>
-      </a:schemeClr>
-    </dgm:fillClrLst>
-    <dgm:linClrLst meth="repeat">
-      <a:schemeClr val="lt1"/>
-    </dgm:linClrLst>
-    <dgm:effectClrLst/>
-    <dgm:txLinClrLst/>
-    <dgm:txFillClrLst meth="repeat">
-      <a:schemeClr val="lt1"/>
-    </dgm:txFillClrLst>
-    <dgm:txEffectClrLst/>
-  </dgm:styleLbl>
-  <dgm:styleLbl name="alignImgPlace1">
-    <dgm:fillClrLst meth="repeat">
-      <a:schemeClr val="accent1">
-        <a:tint val="50000"/>
-      </a:schemeClr>
-    </dgm:fillClrLst>
-    <dgm:linClrLst meth="repeat">
-      <a:schemeClr val="lt1"/>
-    </dgm:linClrLst>
-    <dgm:effectClrLst/>
-    <dgm:txLinClrLst/>
-    <dgm:txFillClrLst meth="repeat">
-      <a:schemeClr val="lt1"/>
-    </dgm:txFillClrLst>
-    <dgm:txEffectClrLst/>
-  </dgm:styleLbl>
-  <dgm:styleLbl name="bgImgPlace1">
-    <dgm:fillClrLst meth="repeat">
-      <a:schemeClr val="accent1">
-        <a:tint val="50000"/>
-      </a:schemeClr>
-    </dgm:fillClrLst>
-    <dgm:linClrLst meth="repeat">
-      <a:schemeClr val="lt1"/>
-    </dgm:linClrLst>
-    <dgm:effectClrLst/>
-    <dgm:txLinClrLst/>
-    <dgm:txFillClrLst meth="repeat">
-      <a:schemeClr val="lt1"/>
-    </dgm:txFillClrLst>
-    <dgm:txEffectClrLst/>
-  </dgm:styleLbl>
-  <dgm:styleLbl name="sibTrans2D1">
-    <dgm:fillClrLst meth="repeat">
-      <a:schemeClr val="accent1">
-        <a:tint val="60000"/>
-      </a:schemeClr>
-    </dgm:fillClrLst>
-    <dgm:linClrLst meth="repeat">
-      <a:schemeClr val="accent1">
-        <a:tint val="60000"/>
-      </a:schemeClr>
-    </dgm:linClrLst>
-    <dgm:effectClrLst/>
-    <dgm:txLinClrLst/>
-    <dgm:txFillClrLst/>
-    <dgm:txEffectClrLst/>
-  </dgm:styleLbl>
-  <dgm:styleLbl name="fgSibTrans2D1">
-    <dgm:fillClrLst meth="repeat">
-      <a:schemeClr val="accent1">
-        <a:tint val="60000"/>
-      </a:schemeClr>
-    </dgm:fillClrLst>
-    <dgm:linClrLst meth="repeat">
-      <a:schemeClr val="accent1">
-        <a:tint val="60000"/>
-      </a:schemeClr>
-    </dgm:linClrLst>
-    <dgm:effectClrLst/>
-    <dgm:txLinClrLst/>
-    <dgm:txFillClrLst/>
-    <dgm:txEffectClrLst/>
-  </dgm:styleLbl>
-  <dgm:styleLbl name="bgSibTrans2D1">
-    <dgm:fillClrLst meth="repeat">
-      <a:schemeClr val="accent1">
-        <a:tint val="60000"/>
-      </a:schemeClr>
-    </dgm:fillClrLst>
-    <dgm:linClrLst meth="repeat">
-      <a:schemeClr val="accent1">
-        <a:tint val="60000"/>
-      </a:schemeClr>
-    </dgm:linClrLst>
-    <dgm:effectClrLst/>
-    <dgm:txLinClrLst/>
-    <dgm:txFillClrLst/>
-    <dgm:txEffectClrLst/>
-  </dgm:styleLbl>
-  <dgm:styleLbl name="sibTrans1D1">
-    <dgm:fillClrLst meth="repeat">
-      <a:schemeClr val="accent1"/>
-    </dgm:fillClrLst>
-    <dgm:linClrLst meth="repeat">
-      <a:schemeClr val="accent1"/>
-    </dgm:linClrLst>
-    <dgm:effectClrLst/>
-    <dgm:txLinClrLst/>
-    <dgm:txFillClrLst meth="repeat">
-      <a:schemeClr val="tx1"/>
-    </dgm:txFillClrLst>
-    <dgm:txEffectClrLst/>
-  </dgm:styleLbl>
-  <dgm:styleLbl name="callout">
-    <dgm:fillClrLst meth="repeat">
-      <a:schemeClr val="accent1"/>
-    </dgm:fillClrLst>
-    <dgm:linClrLst meth="repeat">
-      <a:schemeClr val="accent1">
-        <a:tint val="50000"/>
-      </a:schemeClr>
-    </dgm:linClrLst>
-    <dgm:effectClrLst/>
-    <dgm:txLinClrLst/>
-    <dgm:txFillClrLst meth="repeat">
-      <a:schemeClr val="tx1"/>
-    </dgm:txFillClrLst>
-    <dgm:txEffectClrLst/>
-  </dgm:styleLbl>
-  <dgm:styleLbl name="asst0">
-    <dgm:fillClrLst meth="repeat">
-      <a:schemeClr val="accent1"/>
-    </dgm:fillClrLst>
-    <dgm:linClrLst meth="repeat">
-      <a:schemeClr val="lt1"/>
-    </dgm:linClrLst>
-    <dgm:effectClrLst/>
-    <dgm:txLinClrLst/>
-    <dgm:txFillClrLst/>
-    <dgm:txEffectClrLst/>
-  </dgm:styleLbl>
-  <dgm:styleLbl name="asst1">
-    <dgm:fillClrLst meth="repeat">
-      <a:schemeClr val="accent1"/>
-    </dgm:fillClrLst>
-    <dgm:linClrLst meth="repeat">
-      <a:schemeClr val="lt1"/>
-    </dgm:linClrLst>
-    <dgm:effectClrLst/>
-    <dgm:txLinClrLst/>
-    <dgm:txFillClrLst/>
-    <dgm:txEffectClrLst/>
-  </dgm:styleLbl>
-  <dgm:styleLbl name="asst2">
-    <dgm:fillClrLst meth="repeat">
-      <a:schemeClr val="accent1"/>
-    </dgm:fillClrLst>
-    <dgm:linClrLst meth="repeat">
-      <a:schemeClr val="lt1"/>
-    </dgm:linClrLst>
-    <dgm:effectClrLst/>
-    <dgm:txLinClrLst/>
-    <dgm:txFillClrLst/>
-    <dgm:txEffectClrLst/>
-  </dgm:styleLbl>
-  <dgm:styleLbl name="asst3">
-    <dgm:fillClrLst meth="repeat">
-      <a:schemeClr val="accent1"/>
-    </dgm:fillClrLst>
-    <dgm:linClrLst meth="repeat">
-      <a:schemeClr val="lt1"/>
-    </dgm:linClrLst>
-    <dgm:effectClrLst/>
-    <dgm:txLinClrLst/>
-    <dgm:txFillClrLst/>
-    <dgm:txEffectClrLst/>
-  </dgm:styleLbl>
-  <dgm:styleLbl name="asst4">
-    <dgm:fillClrLst meth="repeat">
-      <a:schemeClr val="accent1"/>
-    </dgm:fillClrLst>
-    <dgm:linClrLst meth="repeat">
-      <a:schemeClr val="lt1"/>
-    </dgm:linClrLst>
-    <dgm:effectClrLst/>
-    <dgm:txLinClrLst/>
-    <dgm:txFillClrLst/>
-    <dgm:txEffectClrLst/>
-  </dgm:styleLbl>
-  <dgm:styleLbl name="parChTrans2D1">
-    <dgm:fillClrLst meth="repeat">
-      <a:schemeClr val="accent1">
-        <a:tint val="60000"/>
-      </a:schemeClr>
-    </dgm:fillClrLst>
-    <dgm:linClrLst meth="repeat">
-      <a:schemeClr val="accent1">
-        <a:tint val="60000"/>
-      </a:schemeClr>
-    </dgm:linClrLst>
-    <dgm:effectClrLst/>
-    <dgm:txLinClrLst/>
-    <dgm:txFillClrLst meth="repeat">
-      <a:schemeClr val="lt1"/>
-    </dgm:txFillClrLst>
-    <dgm:txEffectClrLst/>
-  </dgm:styleLbl>
-  <dgm:styleLbl name="parChTrans2D2">
-    <dgm:fillClrLst meth="repeat">
-      <a:schemeClr val="accent1"/>
-    </dgm:fillClrLst>
-    <dgm:linClrLst meth="repeat">
-      <a:schemeClr val="accent1"/>
-    </dgm:linClrLst>
-    <dgm:effectClrLst/>
-    <dgm:txLinClrLst/>
-    <dgm:txFillClrLst meth="repeat">
-      <a:schemeClr val="lt1"/>
-    </dgm:txFillClrLst>
-    <dgm:txEffectClrLst/>
-  </dgm:styleLbl>
-  <dgm:styleLbl name="parChTrans2D3">
-    <dgm:fillClrLst meth="repeat">
-      <a:schemeClr val="accent1"/>
-    </dgm:fillClrLst>
-    <dgm:linClrLst meth="repeat">
-      <a:schemeClr val="accent1"/>
-    </dgm:linClrLst>
-    <dgm:effectClrLst/>
-    <dgm:txLinClrLst/>
-    <dgm:txFillClrLst meth="repeat">
-      <a:schemeClr val="lt1"/>
-    </dgm:txFillClrLst>
-    <dgm:txEffectClrLst/>
-  </dgm:styleLbl>
-  <dgm:styleLbl name="parChTrans2D4">
-    <dgm:fillClrLst meth="repeat">
-      <a:schemeClr val="accent1"/>
-    </dgm:fillClrLst>
-    <dgm:linClrLst meth="repeat">
-      <a:schemeClr val="accent1"/>
-    </dgm:linClrLst>
-    <dgm:effectClrLst/>
-    <dgm:txLinClrLst/>
-    <dgm:txFillClrLst meth="repeat">
-      <a:schemeClr val="lt1"/>
-    </dgm:txFillClrLst>
-    <dgm:txEffectClrLst/>
-  </dgm:styleLbl>
-  <dgm:styleLbl name="parChTrans1D1">
-    <dgm:fillClrLst meth="repeat">
-      <a:schemeClr val="accent1"/>
-    </dgm:fillClrLst>
-    <dgm:linClrLst meth="repeat">
-      <a:schemeClr val="accent1">
-        <a:shade val="60000"/>
-      </a:schemeClr>
-    </dgm:linClrLst>
-    <dgm:effectClrLst/>
-    <dgm:txLinClrLst/>
-    <dgm:txFillClrLst meth="repeat">
-      <a:schemeClr val="tx1"/>
-    </dgm:txFillClrLst>
-    <dgm:txEffectClrLst/>
-  </dgm:styleLbl>
-  <dgm:styleLbl name="parChTrans1D2">
-    <dgm:fillClrLst meth="repeat">
-      <a:schemeClr val="accent1"/>
-    </dgm:fillClrLst>
-    <dgm:linClrLst meth="repeat">
-      <a:schemeClr val="accent1">
-        <a:shade val="60000"/>
-      </a:schemeClr>
-    </dgm:linClrLst>
-    <dgm:effectClrLst/>
-    <dgm:txLinClrLst/>
-    <dgm:txFillClrLst meth="repeat">
-      <a:schemeClr val="tx1"/>
-    </dgm:txFillClrLst>
-    <dgm:txEffectClrLst/>
-  </dgm:styleLbl>
-  <dgm:styleLbl name="parChTrans1D3">
-    <dgm:fillClrLst meth="repeat">
-      <a:schemeClr val="accent1"/>
-    </dgm:fillClrLst>
-    <dgm:linClrLst meth="repeat">
-      <a:schemeClr val="accent1">
-        <a:shade val="80000"/>
-      </a:schemeClr>
-    </dgm:linClrLst>
-    <dgm:effectClrLst/>
-    <dgm:txLinClrLst/>
-    <dgm:txFillClrLst meth="repeat">
-      <a:schemeClr val="tx1"/>
-    </dgm:txFillClrLst>
-    <dgm:txEffectClrLst/>
-  </dgm:styleLbl>
-  <dgm:styleLbl name="parChTrans1D4">
-    <dgm:fillClrLst meth="repeat">
-      <a:schemeClr val="accent1"/>
-    </dgm:fillClrLst>
-    <dgm:linClrLst meth="repeat">
-      <a:schemeClr val="accent1">
-        <a:shade val="80000"/>
-      </a:schemeClr>
-    </dgm:linClrLst>
-    <dgm:effectClrLst/>
-    <dgm:txLinClrLst/>
-    <dgm:txFillClrLst meth="repeat">
-      <a:schemeClr val="tx1"/>
-    </dgm:txFillClrLst>
-    <dgm:txEffectClrLst/>
-  </dgm:styleLbl>
-  <dgm:styleLbl name="fgAcc1">
-    <dgm:fillClrLst meth="repeat">
-      <a:schemeClr val="lt1">
-        <a:alpha val="90000"/>
-      </a:schemeClr>
-    </dgm:fillClrLst>
-    <dgm:linClrLst meth="repeat">
-      <a:schemeClr val="accent1"/>
-    </dgm:linClrLst>
-    <dgm:effectClrLst/>
-    <dgm:txLinClrLst/>
-    <dgm:txFillClrLst meth="repeat">
-      <a:schemeClr val="dk1"/>
-    </dgm:txFillClrLst>
-    <dgm:txEffectClrLst/>
-  </dgm:styleLbl>
-  <dgm:styleLbl name="conFgAcc1">
-    <dgm:fillClrLst meth="repeat">
-      <a:schemeClr val="lt1">
-        <a:alpha val="90000"/>
-      </a:schemeClr>
-    </dgm:fillClrLst>
-    <dgm:linClrLst meth="repeat">
-      <a:schemeClr val="accent1"/>
-    </dgm:linClrLst>
-    <dgm:effectClrLst/>
-    <dgm:txLinClrLst/>
-    <dgm:txFillClrLst meth="repeat">
-      <a:schemeClr val="dk1"/>
-    </dgm:txFillClrLst>
-    <dgm:txEffectClrLst/>
-  </dgm:styleLbl>
-  <dgm:styleLbl name="alignAcc1">
-    <dgm:fillClrLst meth="repeat">
-      <a:schemeClr val="lt1">
-        <a:alpha val="90000"/>
-      </a:schemeClr>
-    </dgm:fillClrLst>
-    <dgm:linClrLst meth="repeat">
-      <a:schemeClr val="accent1"/>
-    </dgm:linClrLst>
-    <dgm:effectClrLst/>
-    <dgm:txLinClrLst/>
-    <dgm:txFillClrLst meth="repeat">
-      <a:schemeClr val="dk1"/>
-    </dgm:txFillClrLst>
-    <dgm:txEffectClrLst/>
-  </dgm:styleLbl>
-  <dgm:styleLbl name="trAlignAcc1">
-    <dgm:fillClrLst meth="repeat">
-      <a:schemeClr val="lt1">
-        <a:alpha val="40000"/>
-      </a:schemeClr>
-    </dgm:fillClrLst>
-    <dgm:linClrLst meth="repeat">
-      <a:schemeClr val="accent1"/>
-    </dgm:linClrLst>
-    <dgm:effectClrLst/>
-    <dgm:txLinClrLst/>
-    <dgm:txFillClrLst meth="repeat">
-      <a:schemeClr val="dk1"/>
-    </dgm:txFillClrLst>
-    <dgm:txEffectClrLst/>
-  </dgm:styleLbl>
-  <dgm:styleLbl name="bgAcc1">
-    <dgm:fillClrLst meth="repeat">
-      <a:schemeClr val="lt1">
-        <a:alpha val="90000"/>
-      </a:schemeClr>
-    </dgm:fillClrLst>
-    <dgm:linClrLst meth="repeat">
-      <a:schemeClr val="accent1"/>
-    </dgm:linClrLst>
-    <dgm:effectClrLst/>
-    <dgm:txLinClrLst/>
-    <dgm:txFillClrLst meth="repeat">
-      <a:schemeClr val="dk1"/>
-    </dgm:txFillClrLst>
-    <dgm:txEffectClrLst/>
-  </dgm:styleLbl>
-  <dgm:styleLbl name="solidFgAcc1">
-    <dgm:fillClrLst meth="repeat">
-      <a:schemeClr val="lt1"/>
-    </dgm:fillClrLst>
-    <dgm:linClrLst meth="repeat">
-      <a:schemeClr val="accent1"/>
-    </dgm:linClrLst>
-    <dgm:effectClrLst/>
-    <dgm:txLinClrLst/>
-    <dgm:txFillClrLst meth="repeat">
-      <a:schemeClr val="dk1"/>
-    </dgm:txFillClrLst>
-    <dgm:txEffectClrLst/>
-  </dgm:styleLbl>
-  <dgm:styleLbl name="solidAlignAcc1">
-    <dgm:fillClrLst meth="repeat">
-      <a:schemeClr val="lt1"/>
-    </dgm:fillClrLst>
-    <dgm:linClrLst meth="repeat">
-      <a:schemeClr val="accent1"/>
-    </dgm:linClrLst>
-    <dgm:effectClrLst/>
-    <dgm:txLinClrLst/>
-    <dgm:txFillClrLst meth="repeat">
-      <a:schemeClr val="dk1"/>
-    </dgm:txFillClrLst>
-    <dgm:txEffectClrLst/>
-  </dgm:styleLbl>
-  <dgm:styleLbl name="solidBgAcc1">
-    <dgm:fillClrLst meth="repeat">
-      <a:schemeClr val="lt1"/>
-    </dgm:fillClrLst>
-    <dgm:linClrLst meth="repeat">
-      <a:schemeClr val="accent1"/>
-    </dgm:linClrLst>
-    <dgm:effectClrLst/>
-    <dgm:txLinClrLst/>
-    <dgm:txFillClrLst meth="repeat">
-      <a:schemeClr val="dk1"/>
-    </dgm:txFillClrLst>
-    <dgm:txEffectClrLst/>
-  </dgm:styleLbl>
-  <dgm:styleLbl name="fgAccFollowNode1">
-    <dgm:fillClrLst meth="repeat">
-      <a:schemeClr val="accent1">
-        <a:alpha val="90000"/>
-        <a:tint val="40000"/>
-      </a:schemeClr>
-    </dgm:fillClrLst>
-    <dgm:linClrLst meth="repeat">
-      <a:schemeClr val="accent1">
-        <a:alpha val="90000"/>
-        <a:tint val="40000"/>
-      </a:schemeClr>
-    </dgm:linClrLst>
-    <dgm:effectClrLst/>
-    <dgm:txLinClrLst/>
-    <dgm:txFillClrLst meth="repeat">
-      <a:schemeClr val="dk1"/>
-    </dgm:txFillClrLst>
-    <dgm:txEffectClrLst/>
-  </dgm:styleLbl>
-  <dgm:styleLbl name="alignAccFollowNode1">
-    <dgm:fillClrLst meth="repeat">
-      <a:schemeClr val="accent1">
-        <a:alpha val="90000"/>
-        <a:tint val="40000"/>
-      </a:schemeClr>
-    </dgm:fillClrLst>
-    <dgm:linClrLst meth="repeat">
-      <a:schemeClr val="accent1">
-        <a:alpha val="90000"/>
-        <a:tint val="40000"/>
-      </a:schemeClr>
-    </dgm:linClrLst>
-    <dgm:effectClrLst/>
-    <dgm:txLinClrLst/>
-    <dgm:txFillClrLst meth="repeat">
-      <a:schemeClr val="dk1"/>
-    </dgm:txFillClrLst>
-    <dgm:txEffectClrLst/>
-  </dgm:styleLbl>
-  <dgm:styleLbl name="bgAccFollowNode1">
-    <dgm:fillClrLst meth="repeat">
-      <a:schemeClr val="accent1">
-        <a:alpha val="90000"/>
-        <a:tint val="40000"/>
-      </a:schemeClr>
-    </dgm:fillClrLst>
-    <dgm:linClrLst meth="repeat">
-      <a:schemeClr val="accent1">
-        <a:alpha val="90000"/>
-        <a:tint val="40000"/>
-      </a:schemeClr>
-    </dgm:linClrLst>
-    <dgm:effectClrLst/>
-    <dgm:txLinClrLst/>
-    <dgm:txFillClrLst meth="repeat">
-      <a:schemeClr val="dk1"/>
-    </dgm:txFillClrLst>
-    <dgm:txEffectClrLst/>
-  </dgm:styleLbl>
-  <dgm:styleLbl name="fgAcc0">
-    <dgm:fillClrLst meth="repeat">
-      <a:schemeClr val="lt1">
-        <a:alpha val="90000"/>
-      </a:schemeClr>
-    </dgm:fillClrLst>
-    <dgm:linClrLst meth="repeat">
-      <a:schemeClr val="accent1"/>
-    </dgm:linClrLst>
-    <dgm:effectClrLst/>
-    <dgm:txLinClrLst/>
-    <dgm:txFillClrLst meth="repeat">
-      <a:schemeClr val="dk1"/>
-    </dgm:txFillClrLst>
-    <dgm:txEffectClrLst/>
-  </dgm:styleLbl>
-  <dgm:styleLbl name="fgAcc2">
-    <dgm:fillClrLst meth="repeat">
-      <a:schemeClr val="lt1">
-        <a:alpha val="90000"/>
-      </a:schemeClr>
-    </dgm:fillClrLst>
-    <dgm:linClrLst meth="repeat">
-      <a:schemeClr val="accent1"/>
-    </dgm:linClrLst>
-    <dgm:effectClrLst/>
-    <dgm:txLinClrLst/>
-    <dgm:txFillClrLst meth="repeat">
-      <a:schemeClr val="dk1"/>
-    </dgm:txFillClrLst>
-    <dgm:txEffectClrLst/>
-  </dgm:styleLbl>
-  <dgm:styleLbl name="fgAcc3">
-    <dgm:fillClrLst meth="repeat">
-      <a:schemeClr val="lt1">
-        <a:alpha val="90000"/>
-      </a:schemeClr>
-    </dgm:fillClrLst>
-    <dgm:linClrLst meth="repeat">
-      <a:schemeClr val="accent1"/>
-    </dgm:linClrLst>
-    <dgm:effectClrLst/>
-    <dgm:txLinClrLst/>
-    <dgm:txFillClrLst meth="repeat">
-      <a:schemeClr val="dk1"/>
-    </dgm:txFillClrLst>
-    <dgm:txEffectClrLst/>
-  </dgm:styleLbl>
-  <dgm:styleLbl name="fgAcc4">
-    <dgm:fillClrLst meth="repeat">
-      <a:schemeClr val="lt1">
-        <a:alpha val="90000"/>
-      </a:schemeClr>
-    </dgm:fillClrLst>
-    <dgm:linClrLst meth="repeat">
-      <a:schemeClr val="accent1"/>
-    </dgm:linClrLst>
-    <dgm:effectClrLst/>
-    <dgm:txLinClrLst/>
-    <dgm:txFillClrLst meth="repeat">
-      <a:schemeClr val="dk1"/>
-    </dgm:txFillClrLst>
-    <dgm:txEffectClrLst/>
-  </dgm:styleLbl>
-  <dgm:styleLbl name="bgShp">
-    <dgm:fillClrLst meth="repeat">
-      <a:schemeClr val="accent1">
-        <a:tint val="40000"/>
-      </a:schemeClr>
-    </dgm:fillClrLst>
-    <dgm:linClrLst meth="repeat">
-      <a:schemeClr val="accent1"/>
-    </dgm:linClrLst>
-    <dgm:effectClrLst/>
-    <dgm:txLinClrLst/>
-    <dgm:txFillClrLst meth="repeat">
-      <a:schemeClr val="dk1"/>
-    </dgm:txFillClrLst>
-    <dgm:txEffectClrLst/>
-  </dgm:styleLbl>
-  <dgm:styleLbl name="dkBgShp">
-    <dgm:fillClrLst meth="repeat">
-      <a:schemeClr val="accent1">
-        <a:shade val="80000"/>
-      </a:schemeClr>
-    </dgm:fillClrLst>
-    <dgm:linClrLst meth="repeat">
-      <a:schemeClr val="accent1"/>
-    </dgm:linClrLst>
-    <dgm:effectClrLst/>
-    <dgm:txLinClrLst/>
-    <dgm:txFillClrLst meth="repeat">
-      <a:schemeClr val="lt1"/>
-    </dgm:txFillClrLst>
-    <dgm:txEffectClrLst/>
-  </dgm:styleLbl>
-  <dgm:styleLbl name="trBgShp">
-    <dgm:fillClrLst meth="repeat">
-      <a:schemeClr val="accent1">
-        <a:tint val="50000"/>
-        <a:alpha val="40000"/>
-      </a:schemeClr>
-    </dgm:fillClrLst>
-    <dgm:linClrLst meth="repeat">
-      <a:schemeClr val="accent1"/>
-    </dgm:linClrLst>
-    <dgm:effectClrLst/>
-    <dgm:txLinClrLst/>
-    <dgm:txFillClrLst meth="repeat">
-      <a:schemeClr val="lt1"/>
-    </dgm:txFillClrLst>
-    <dgm:txEffectClrLst/>
-  </dgm:styleLbl>
-  <dgm:styleLbl name="fgShp">
-    <dgm:fillClrLst meth="repeat">
-      <a:schemeClr val="accent1">
-        <a:tint val="60000"/>
-      </a:schemeClr>
-    </dgm:fillClrLst>
-    <dgm:linClrLst meth="repeat">
-      <a:schemeClr val="lt1"/>
-    </dgm:linClrLst>
-    <dgm:effectClrLst/>
-    <dgm:txLinClrLst/>
-    <dgm:txFillClrLst meth="repeat">
-      <a:schemeClr val="dk1"/>
-    </dgm:txFillClrLst>
-    <dgm:txEffectClrLst/>
-  </dgm:styleLbl>
-  <dgm:styleLbl name="revTx">
-    <dgm:fillClrLst meth="repeat">
-      <a:schemeClr val="lt1">
-        <a:alpha val="0"/>
-      </a:schemeClr>
-    </dgm:fillClrLst>
-    <dgm:linClrLst meth="repeat">
-      <a:schemeClr val="dk1">
-        <a:alpha val="0"/>
-      </a:schemeClr>
-    </dgm:linClrLst>
-    <dgm:effectClrLst/>
-    <dgm:txLinClrLst/>
-    <dgm:txFillClrLst meth="repeat">
-      <a:schemeClr val="tx1"/>
-    </dgm:txFillClrLst>
-    <dgm:txEffectClrLst/>
-  </dgm:styleLbl>
-</dgm:colorsDef>
-</file>
-
 <file path=ppt/diagrams/data1.xml><?xml version="1.0" encoding="utf-8"?>
-<dgm:dataModel xmlns:dgm="http://schemas.openxmlformats.org/drawingml/2006/diagram" xmlns:a="http://schemas.openxmlformats.org/drawingml/2006/main">
-  <dgm:ptLst>
-    <dgm:pt modelId="{A0E151F3-8F13-4484-A080-825F0353E1D0}" type="doc">
-      <dgm:prSet loTypeId="urn:microsoft.com/office/officeart/2005/8/layout/cycle2" loCatId="cycle" qsTypeId="urn:microsoft.com/office/officeart/2005/8/quickstyle/simple1" qsCatId="simple" csTypeId="urn:microsoft.com/office/officeart/2005/8/colors/accent1_2" csCatId="accent1" phldr="1"/>
-      <dgm:spPr/>
-      <dgm:t>
-        <a:bodyPr/>
-        <a:lstStyle/>
-        <a:p>
-          <a:endParaRPr lang="fr-FR"/>
-        </a:p>
-      </dgm:t>
-    </dgm:pt>
-    <dgm:pt modelId="{978F1A3F-F289-4B04-94F8-DC120B996142}">
-      <dgm:prSet phldrT="[Texte]"/>
-      <dgm:spPr/>
-      <dgm:t>
-        <a:bodyPr/>
-        <a:lstStyle/>
-        <a:p>
-          <a:r>
-            <a:rPr lang="fr-FR" dirty="0"/>
-            <a:t>L’utilisateur arrive sur l’application</a:t>
-          </a:r>
-        </a:p>
-      </dgm:t>
-    </dgm:pt>
-    <dgm:pt modelId="{D67994DE-3C62-4636-AF6F-CE4F1AF37AB4}" type="parTrans" cxnId="{E0D0962D-D08B-45F3-B2B4-99F42308219F}">
-      <dgm:prSet/>
-      <dgm:spPr/>
-      <dgm:t>
-        <a:bodyPr/>
-        <a:lstStyle/>
-        <a:p>
-          <a:endParaRPr lang="fr-FR"/>
-        </a:p>
-      </dgm:t>
-    </dgm:pt>
-    <dgm:pt modelId="{4DE8B97C-11E8-47AB-AE29-AB3597B4CD71}" type="sibTrans" cxnId="{E0D0962D-D08B-45F3-B2B4-99F42308219F}">
-      <dgm:prSet/>
-      <dgm:spPr/>
-      <dgm:t>
-        <a:bodyPr/>
-        <a:lstStyle/>
-        <a:p>
-          <a:endParaRPr lang="fr-FR"/>
-        </a:p>
-      </dgm:t>
-    </dgm:pt>
-    <dgm:pt modelId="{29E6F535-4FAB-4757-A793-0D76437CD70A}">
-      <dgm:prSet phldrT="[Texte]"/>
-      <dgm:spPr/>
-      <dgm:t>
-        <a:bodyPr/>
-        <a:lstStyle/>
-        <a:p>
-          <a:r>
-            <a:rPr lang="fr-FR" dirty="0"/>
-            <a:t>Le HomeController va charger les questions</a:t>
-          </a:r>
-        </a:p>
-      </dgm:t>
-    </dgm:pt>
-    <dgm:pt modelId="{9B7E434A-64F4-47D8-B475-5DBC86509B8C}" type="parTrans" cxnId="{303E0D86-0372-435F-A7FD-FBDFA3D156B4}">
-      <dgm:prSet/>
-      <dgm:spPr/>
-      <dgm:t>
-        <a:bodyPr/>
-        <a:lstStyle/>
-        <a:p>
-          <a:endParaRPr lang="fr-FR"/>
-        </a:p>
-      </dgm:t>
-    </dgm:pt>
-    <dgm:pt modelId="{6FE5D54B-FDB5-4BDB-BFD7-60557B9164EE}" type="sibTrans" cxnId="{303E0D86-0372-435F-A7FD-FBDFA3D156B4}">
-      <dgm:prSet/>
-      <dgm:spPr/>
-      <dgm:t>
-        <a:bodyPr/>
-        <a:lstStyle/>
-        <a:p>
-          <a:endParaRPr lang="fr-FR"/>
-        </a:p>
-      </dgm:t>
-    </dgm:pt>
-    <dgm:pt modelId="{30B78A84-B910-454B-B3FB-D5AEE9A6232E}">
-      <dgm:prSet phldrT="[Texte]"/>
-      <dgm:spPr/>
-      <dgm:t>
-        <a:bodyPr/>
-        <a:lstStyle/>
-        <a:p>
-          <a:r>
-            <a:rPr lang="fr-FR" dirty="0"/>
-            <a:t>L’utilisateur répond et valide le sondage</a:t>
-          </a:r>
-        </a:p>
-      </dgm:t>
-    </dgm:pt>
-    <dgm:pt modelId="{2F58CF59-D612-4945-BBF3-D1D28A251970}" type="parTrans" cxnId="{F432D188-F4BA-43AE-A4D0-B966A2C87EED}">
-      <dgm:prSet/>
-      <dgm:spPr/>
-      <dgm:t>
-        <a:bodyPr/>
-        <a:lstStyle/>
-        <a:p>
-          <a:endParaRPr lang="fr-FR"/>
-        </a:p>
-      </dgm:t>
-    </dgm:pt>
-    <dgm:pt modelId="{A88D5C83-1BD5-4197-A541-43514BBDBF5F}" type="sibTrans" cxnId="{F432D188-F4BA-43AE-A4D0-B966A2C87EED}">
-      <dgm:prSet/>
-      <dgm:spPr/>
-      <dgm:t>
-        <a:bodyPr/>
-        <a:lstStyle/>
-        <a:p>
-          <a:endParaRPr lang="fr-FR"/>
-        </a:p>
-      </dgm:t>
-    </dgm:pt>
-    <dgm:pt modelId="{1355676D-CCB2-4BF5-A5EE-CB0A8019CBC2}">
-      <dgm:prSet phldrT="[Texte]"/>
-      <dgm:spPr/>
-      <dgm:t>
-        <a:bodyPr/>
-        <a:lstStyle/>
-        <a:p>
-          <a:r>
-            <a:rPr lang="fr-FR" dirty="0"/>
-            <a:t>Le HomeController valide la requête, stock les réponses et renvoi un lien</a:t>
-          </a:r>
-        </a:p>
-      </dgm:t>
-    </dgm:pt>
-    <dgm:pt modelId="{16B1EDBE-A3E4-4A07-BD16-054A988E5942}" type="parTrans" cxnId="{1D04BE28-00CC-45AD-9A74-F8A86ED8B531}">
-      <dgm:prSet/>
-      <dgm:spPr/>
-      <dgm:t>
-        <a:bodyPr/>
-        <a:lstStyle/>
-        <a:p>
-          <a:endParaRPr lang="fr-FR"/>
-        </a:p>
-      </dgm:t>
-    </dgm:pt>
-    <dgm:pt modelId="{68ED1C1A-E6A2-4257-BEFA-7C126893FACD}" type="sibTrans" cxnId="{1D04BE28-00CC-45AD-9A74-F8A86ED8B531}">
-      <dgm:prSet/>
-      <dgm:spPr/>
-      <dgm:t>
-        <a:bodyPr/>
-        <a:lstStyle/>
-        <a:p>
-          <a:endParaRPr lang="fr-FR"/>
-        </a:p>
-      </dgm:t>
-    </dgm:pt>
-    <dgm:pt modelId="{334A81AC-AC9A-4C24-8CBD-CBEF3E9B4D5D}">
-      <dgm:prSet phldrT="[Texte]"/>
-      <dgm:spPr/>
-      <dgm:t>
-        <a:bodyPr/>
-        <a:lstStyle/>
-        <a:p>
-          <a:r>
-            <a:rPr lang="fr-FR" dirty="0"/>
-            <a:t>L’utilisateur clique sur le lien et le controller va charger le sondage lié a cet utilisateur</a:t>
-          </a:r>
-        </a:p>
-      </dgm:t>
-    </dgm:pt>
-    <dgm:pt modelId="{46A63A79-9D67-4544-BE48-5606EE3B92EE}" type="parTrans" cxnId="{A6983A7C-FE48-4939-8EB2-88E68603B38B}">
-      <dgm:prSet/>
-      <dgm:spPr/>
-      <dgm:t>
-        <a:bodyPr/>
-        <a:lstStyle/>
-        <a:p>
-          <a:endParaRPr lang="fr-FR"/>
-        </a:p>
-      </dgm:t>
-    </dgm:pt>
-    <dgm:pt modelId="{392A4C21-1F88-4053-8BBA-5EE0F392FAF4}" type="sibTrans" cxnId="{A6983A7C-FE48-4939-8EB2-88E68603B38B}">
-      <dgm:prSet/>
-      <dgm:spPr/>
-      <dgm:t>
-        <a:bodyPr/>
-        <a:lstStyle/>
-        <a:p>
-          <a:endParaRPr lang="fr-FR"/>
-        </a:p>
-      </dgm:t>
-    </dgm:pt>
-    <dgm:pt modelId="{B10E68AE-B2D3-466C-97B2-FE220EE78A8D}" type="pres">
-      <dgm:prSet presAssocID="{A0E151F3-8F13-4484-A080-825F0353E1D0}" presName="cycle" presStyleCnt="0">
-        <dgm:presLayoutVars>
-          <dgm:dir/>
-          <dgm:resizeHandles val="exact"/>
-        </dgm:presLayoutVars>
-      </dgm:prSet>
-      <dgm:spPr/>
-    </dgm:pt>
-    <dgm:pt modelId="{8D599B6D-E5FF-4517-B617-3A392ECA5AAF}" type="pres">
-      <dgm:prSet presAssocID="{978F1A3F-F289-4B04-94F8-DC120B996142}" presName="node" presStyleLbl="node1" presStyleIdx="0" presStyleCnt="5">
-        <dgm:presLayoutVars>
-          <dgm:bulletEnabled val="1"/>
-        </dgm:presLayoutVars>
-      </dgm:prSet>
-      <dgm:spPr/>
-    </dgm:pt>
-    <dgm:pt modelId="{9BD12B6E-0942-4D81-A262-54E993C63A85}" type="pres">
-      <dgm:prSet presAssocID="{4DE8B97C-11E8-47AB-AE29-AB3597B4CD71}" presName="sibTrans" presStyleLbl="sibTrans2D1" presStyleIdx="0" presStyleCnt="5"/>
-      <dgm:spPr/>
-    </dgm:pt>
-    <dgm:pt modelId="{1D8A4943-B137-4839-A402-61523B46796A}" type="pres">
-      <dgm:prSet presAssocID="{4DE8B97C-11E8-47AB-AE29-AB3597B4CD71}" presName="connectorText" presStyleLbl="sibTrans2D1" presStyleIdx="0" presStyleCnt="5"/>
-      <dgm:spPr/>
-    </dgm:pt>
-    <dgm:pt modelId="{5E1AD98E-E383-4096-A25C-C1590EF87768}" type="pres">
-      <dgm:prSet presAssocID="{29E6F535-4FAB-4757-A793-0D76437CD70A}" presName="node" presStyleLbl="node1" presStyleIdx="1" presStyleCnt="5">
-        <dgm:presLayoutVars>
-          <dgm:bulletEnabled val="1"/>
-        </dgm:presLayoutVars>
-      </dgm:prSet>
-      <dgm:spPr/>
-    </dgm:pt>
-    <dgm:pt modelId="{69CD87AC-6EAE-4CD5-9C94-FEF02F90CF33}" type="pres">
-      <dgm:prSet presAssocID="{6FE5D54B-FDB5-4BDB-BFD7-60557B9164EE}" presName="sibTrans" presStyleLbl="sibTrans2D1" presStyleIdx="1" presStyleCnt="5"/>
-      <dgm:spPr/>
-    </dgm:pt>
-    <dgm:pt modelId="{82203228-0635-48F9-97B9-351DDBE06FA8}" type="pres">
-      <dgm:prSet presAssocID="{6FE5D54B-FDB5-4BDB-BFD7-60557B9164EE}" presName="connectorText" presStyleLbl="sibTrans2D1" presStyleIdx="1" presStyleCnt="5"/>
-      <dgm:spPr/>
-    </dgm:pt>
-    <dgm:pt modelId="{B2884A15-2323-4BA6-BB54-8513CF9E1436}" type="pres">
-      <dgm:prSet presAssocID="{30B78A84-B910-454B-B3FB-D5AEE9A6232E}" presName="node" presStyleLbl="node1" presStyleIdx="2" presStyleCnt="5">
-        <dgm:presLayoutVars>
-          <dgm:bulletEnabled val="1"/>
-        </dgm:presLayoutVars>
-      </dgm:prSet>
-      <dgm:spPr/>
-    </dgm:pt>
-    <dgm:pt modelId="{E7D0785B-D9CD-49EE-B140-BED117B958DE}" type="pres">
-      <dgm:prSet presAssocID="{A88D5C83-1BD5-4197-A541-43514BBDBF5F}" presName="sibTrans" presStyleLbl="sibTrans2D1" presStyleIdx="2" presStyleCnt="5"/>
-      <dgm:spPr/>
-    </dgm:pt>
-    <dgm:pt modelId="{D6264588-1C07-491F-8823-F033E85A621E}" type="pres">
-      <dgm:prSet presAssocID="{A88D5C83-1BD5-4197-A541-43514BBDBF5F}" presName="connectorText" presStyleLbl="sibTrans2D1" presStyleIdx="2" presStyleCnt="5"/>
-      <dgm:spPr/>
-    </dgm:pt>
-    <dgm:pt modelId="{1B64D531-AA69-4799-A53A-D02BB154DFC5}" type="pres">
-      <dgm:prSet presAssocID="{1355676D-CCB2-4BF5-A5EE-CB0A8019CBC2}" presName="node" presStyleLbl="node1" presStyleIdx="3" presStyleCnt="5">
-        <dgm:presLayoutVars>
-          <dgm:bulletEnabled val="1"/>
-        </dgm:presLayoutVars>
-      </dgm:prSet>
-      <dgm:spPr/>
-    </dgm:pt>
-    <dgm:pt modelId="{3881C069-5581-4E33-8C8A-7559F506BD6A}" type="pres">
-      <dgm:prSet presAssocID="{68ED1C1A-E6A2-4257-BEFA-7C126893FACD}" presName="sibTrans" presStyleLbl="sibTrans2D1" presStyleIdx="3" presStyleCnt="5"/>
-      <dgm:spPr/>
-    </dgm:pt>
-    <dgm:pt modelId="{F5A600EF-D379-4730-B65A-D1B7C5A6F67D}" type="pres">
-      <dgm:prSet presAssocID="{68ED1C1A-E6A2-4257-BEFA-7C126893FACD}" presName="connectorText" presStyleLbl="sibTrans2D1" presStyleIdx="3" presStyleCnt="5"/>
-      <dgm:spPr/>
-    </dgm:pt>
-    <dgm:pt modelId="{7E318264-034E-4A55-8650-6B54E68C2D86}" type="pres">
-      <dgm:prSet presAssocID="{334A81AC-AC9A-4C24-8CBD-CBEF3E9B4D5D}" presName="node" presStyleLbl="node1" presStyleIdx="4" presStyleCnt="5">
-        <dgm:presLayoutVars>
-          <dgm:bulletEnabled val="1"/>
-        </dgm:presLayoutVars>
-      </dgm:prSet>
-      <dgm:spPr/>
-    </dgm:pt>
-    <dgm:pt modelId="{D65E2CBE-7556-4C5B-A5A1-24EF959E7A71}" type="pres">
-      <dgm:prSet presAssocID="{392A4C21-1F88-4053-8BBA-5EE0F392FAF4}" presName="sibTrans" presStyleLbl="sibTrans2D1" presStyleIdx="4" presStyleCnt="5"/>
-      <dgm:spPr/>
-    </dgm:pt>
-    <dgm:pt modelId="{F601C43B-51B2-4644-87EE-18E9F7C530D2}" type="pres">
-      <dgm:prSet presAssocID="{392A4C21-1F88-4053-8BBA-5EE0F392FAF4}" presName="connectorText" presStyleLbl="sibTrans2D1" presStyleIdx="4" presStyleCnt="5"/>
-      <dgm:spPr/>
-    </dgm:pt>
-  </dgm:ptLst>
-  <dgm:cxnLst>
-    <dgm:cxn modelId="{30AAB002-3DFB-4278-9FE8-19E32C4B82BD}" type="presOf" srcId="{4DE8B97C-11E8-47AB-AE29-AB3597B4CD71}" destId="{9BD12B6E-0942-4D81-A262-54E993C63A85}" srcOrd="0" destOrd="0" presId="urn:microsoft.com/office/officeart/2005/8/layout/cycle2"/>
-    <dgm:cxn modelId="{780D0C08-1762-422D-BA88-5127EF44C2FB}" type="presOf" srcId="{392A4C21-1F88-4053-8BBA-5EE0F392FAF4}" destId="{D65E2CBE-7556-4C5B-A5A1-24EF959E7A71}" srcOrd="0" destOrd="0" presId="urn:microsoft.com/office/officeart/2005/8/layout/cycle2"/>
-    <dgm:cxn modelId="{EC252B17-C49F-45E3-99E8-41148332821D}" type="presOf" srcId="{334A81AC-AC9A-4C24-8CBD-CBEF3E9B4D5D}" destId="{7E318264-034E-4A55-8650-6B54E68C2D86}" srcOrd="0" destOrd="0" presId="urn:microsoft.com/office/officeart/2005/8/layout/cycle2"/>
-    <dgm:cxn modelId="{43704B1E-5DCC-4DB9-911B-614A1C3A0725}" type="presOf" srcId="{6FE5D54B-FDB5-4BDB-BFD7-60557B9164EE}" destId="{69CD87AC-6EAE-4CD5-9C94-FEF02F90CF33}" srcOrd="0" destOrd="0" presId="urn:microsoft.com/office/officeart/2005/8/layout/cycle2"/>
-    <dgm:cxn modelId="{1D04BE28-00CC-45AD-9A74-F8A86ED8B531}" srcId="{A0E151F3-8F13-4484-A080-825F0353E1D0}" destId="{1355676D-CCB2-4BF5-A5EE-CB0A8019CBC2}" srcOrd="3" destOrd="0" parTransId="{16B1EDBE-A3E4-4A07-BD16-054A988E5942}" sibTransId="{68ED1C1A-E6A2-4257-BEFA-7C126893FACD}"/>
-    <dgm:cxn modelId="{E0D0962D-D08B-45F3-B2B4-99F42308219F}" srcId="{A0E151F3-8F13-4484-A080-825F0353E1D0}" destId="{978F1A3F-F289-4B04-94F8-DC120B996142}" srcOrd="0" destOrd="0" parTransId="{D67994DE-3C62-4636-AF6F-CE4F1AF37AB4}" sibTransId="{4DE8B97C-11E8-47AB-AE29-AB3597B4CD71}"/>
-    <dgm:cxn modelId="{F19C5D2F-6459-4F31-A80B-97B24CE7102A}" type="presOf" srcId="{978F1A3F-F289-4B04-94F8-DC120B996142}" destId="{8D599B6D-E5FF-4517-B617-3A392ECA5AAF}" srcOrd="0" destOrd="0" presId="urn:microsoft.com/office/officeart/2005/8/layout/cycle2"/>
-    <dgm:cxn modelId="{88F10431-1600-4AF7-8FBA-7B270AB0EA70}" type="presOf" srcId="{6FE5D54B-FDB5-4BDB-BFD7-60557B9164EE}" destId="{82203228-0635-48F9-97B9-351DDBE06FA8}" srcOrd="1" destOrd="0" presId="urn:microsoft.com/office/officeart/2005/8/layout/cycle2"/>
-    <dgm:cxn modelId="{731E8F3B-CE78-4E24-8372-639DB09C46AF}" type="presOf" srcId="{30B78A84-B910-454B-B3FB-D5AEE9A6232E}" destId="{B2884A15-2323-4BA6-BB54-8513CF9E1436}" srcOrd="0" destOrd="0" presId="urn:microsoft.com/office/officeart/2005/8/layout/cycle2"/>
-    <dgm:cxn modelId="{CFA41F43-D4D4-45FF-9A7F-B1B404EC9856}" type="presOf" srcId="{A0E151F3-8F13-4484-A080-825F0353E1D0}" destId="{B10E68AE-B2D3-466C-97B2-FE220EE78A8D}" srcOrd="0" destOrd="0" presId="urn:microsoft.com/office/officeart/2005/8/layout/cycle2"/>
-    <dgm:cxn modelId="{8FF24451-D13F-4E65-AE51-B5FE27EB8BA1}" type="presOf" srcId="{68ED1C1A-E6A2-4257-BEFA-7C126893FACD}" destId="{F5A600EF-D379-4730-B65A-D1B7C5A6F67D}" srcOrd="1" destOrd="0" presId="urn:microsoft.com/office/officeart/2005/8/layout/cycle2"/>
-    <dgm:cxn modelId="{EA218359-567F-4CDB-A6F8-AE01E4A93E9F}" type="presOf" srcId="{392A4C21-1F88-4053-8BBA-5EE0F392FAF4}" destId="{F601C43B-51B2-4644-87EE-18E9F7C530D2}" srcOrd="1" destOrd="0" presId="urn:microsoft.com/office/officeart/2005/8/layout/cycle2"/>
-    <dgm:cxn modelId="{6A8D2B7A-E30A-410E-A69D-1ED20FBEC65D}" type="presOf" srcId="{29E6F535-4FAB-4757-A793-0D76437CD70A}" destId="{5E1AD98E-E383-4096-A25C-C1590EF87768}" srcOrd="0" destOrd="0" presId="urn:microsoft.com/office/officeart/2005/8/layout/cycle2"/>
-    <dgm:cxn modelId="{A6983A7C-FE48-4939-8EB2-88E68603B38B}" srcId="{A0E151F3-8F13-4484-A080-825F0353E1D0}" destId="{334A81AC-AC9A-4C24-8CBD-CBEF3E9B4D5D}" srcOrd="4" destOrd="0" parTransId="{46A63A79-9D67-4544-BE48-5606EE3B92EE}" sibTransId="{392A4C21-1F88-4053-8BBA-5EE0F392FAF4}"/>
-    <dgm:cxn modelId="{84388A7C-CEE4-447A-92A3-152E13D6FFBB}" type="presOf" srcId="{A88D5C83-1BD5-4197-A541-43514BBDBF5F}" destId="{E7D0785B-D9CD-49EE-B140-BED117B958DE}" srcOrd="0" destOrd="0" presId="urn:microsoft.com/office/officeart/2005/8/layout/cycle2"/>
-    <dgm:cxn modelId="{303E0D86-0372-435F-A7FD-FBDFA3D156B4}" srcId="{A0E151F3-8F13-4484-A080-825F0353E1D0}" destId="{29E6F535-4FAB-4757-A793-0D76437CD70A}" srcOrd="1" destOrd="0" parTransId="{9B7E434A-64F4-47D8-B475-5DBC86509B8C}" sibTransId="{6FE5D54B-FDB5-4BDB-BFD7-60557B9164EE}"/>
-    <dgm:cxn modelId="{F432D188-F4BA-43AE-A4D0-B966A2C87EED}" srcId="{A0E151F3-8F13-4484-A080-825F0353E1D0}" destId="{30B78A84-B910-454B-B3FB-D5AEE9A6232E}" srcOrd="2" destOrd="0" parTransId="{2F58CF59-D612-4945-BBF3-D1D28A251970}" sibTransId="{A88D5C83-1BD5-4197-A541-43514BBDBF5F}"/>
-    <dgm:cxn modelId="{903210B9-0DD7-4D8A-A561-EA3B27A324DB}" type="presOf" srcId="{1355676D-CCB2-4BF5-A5EE-CB0A8019CBC2}" destId="{1B64D531-AA69-4799-A53A-D02BB154DFC5}" srcOrd="0" destOrd="0" presId="urn:microsoft.com/office/officeart/2005/8/layout/cycle2"/>
-    <dgm:cxn modelId="{6866D7BF-FD68-4592-AD1B-D5CDE38D820D}" type="presOf" srcId="{68ED1C1A-E6A2-4257-BEFA-7C126893FACD}" destId="{3881C069-5581-4E33-8C8A-7559F506BD6A}" srcOrd="0" destOrd="0" presId="urn:microsoft.com/office/officeart/2005/8/layout/cycle2"/>
-    <dgm:cxn modelId="{82880BD9-B6FB-4502-A189-03CB0636BCA4}" type="presOf" srcId="{A88D5C83-1BD5-4197-A541-43514BBDBF5F}" destId="{D6264588-1C07-491F-8823-F033E85A621E}" srcOrd="1" destOrd="0" presId="urn:microsoft.com/office/officeart/2005/8/layout/cycle2"/>
-    <dgm:cxn modelId="{DAB06DFA-308E-4241-8936-B8A65CA9C853}" type="presOf" srcId="{4DE8B97C-11E8-47AB-AE29-AB3597B4CD71}" destId="{1D8A4943-B137-4839-A402-61523B46796A}" srcOrd="1" destOrd="0" presId="urn:microsoft.com/office/officeart/2005/8/layout/cycle2"/>
-    <dgm:cxn modelId="{8A515C6F-7E7A-4A6D-8E48-79AF90DD23AB}" type="presParOf" srcId="{B10E68AE-B2D3-466C-97B2-FE220EE78A8D}" destId="{8D599B6D-E5FF-4517-B617-3A392ECA5AAF}" srcOrd="0" destOrd="0" presId="urn:microsoft.com/office/officeart/2005/8/layout/cycle2"/>
-    <dgm:cxn modelId="{34322190-BF73-4C66-B75C-6307DF36B171}" type="presParOf" srcId="{B10E68AE-B2D3-466C-97B2-FE220EE78A8D}" destId="{9BD12B6E-0942-4D81-A262-54E993C63A85}" srcOrd="1" destOrd="0" presId="urn:microsoft.com/office/officeart/2005/8/layout/cycle2"/>
-    <dgm:cxn modelId="{6804BAA5-94AA-495E-B52B-5D1EAA2748E5}" type="presParOf" srcId="{9BD12B6E-0942-4D81-A262-54E993C63A85}" destId="{1D8A4943-B137-4839-A402-61523B46796A}" srcOrd="0" destOrd="0" presId="urn:microsoft.com/office/officeart/2005/8/layout/cycle2"/>
-    <dgm:cxn modelId="{FCD18571-FE48-4768-AB4F-8F88728B6A7D}" type="presParOf" srcId="{B10E68AE-B2D3-466C-97B2-FE220EE78A8D}" destId="{5E1AD98E-E383-4096-A25C-C1590EF87768}" srcOrd="2" destOrd="0" presId="urn:microsoft.com/office/officeart/2005/8/layout/cycle2"/>
-    <dgm:cxn modelId="{8509EF69-39C2-4292-84B2-E748473B548F}" type="presParOf" srcId="{B10E68AE-B2D3-466C-97B2-FE220EE78A8D}" destId="{69CD87AC-6EAE-4CD5-9C94-FEF02F90CF33}" srcOrd="3" destOrd="0" presId="urn:microsoft.com/office/officeart/2005/8/layout/cycle2"/>
-    <dgm:cxn modelId="{99B70124-E9F9-4DAB-9DE7-370AE3690EB2}" type="presParOf" srcId="{69CD87AC-6EAE-4CD5-9C94-FEF02F90CF33}" destId="{82203228-0635-48F9-97B9-351DDBE06FA8}" srcOrd="0" destOrd="0" presId="urn:microsoft.com/office/officeart/2005/8/layout/cycle2"/>
-    <dgm:cxn modelId="{6F27CE25-B9B6-4BAB-8E5F-2CE34870749E}" type="presParOf" srcId="{B10E68AE-B2D3-466C-97B2-FE220EE78A8D}" destId="{B2884A15-2323-4BA6-BB54-8513CF9E1436}" srcOrd="4" destOrd="0" presId="urn:microsoft.com/office/officeart/2005/8/layout/cycle2"/>
-    <dgm:cxn modelId="{D0F716C8-0536-4F47-9761-1B8100B24FD4}" type="presParOf" srcId="{B10E68AE-B2D3-466C-97B2-FE220EE78A8D}" destId="{E7D0785B-D9CD-49EE-B140-BED117B958DE}" srcOrd="5" destOrd="0" presId="urn:microsoft.com/office/officeart/2005/8/layout/cycle2"/>
-    <dgm:cxn modelId="{168DDDAA-6C6E-45DA-8BF6-8B725D76434C}" type="presParOf" srcId="{E7D0785B-D9CD-49EE-B140-BED117B958DE}" destId="{D6264588-1C07-491F-8823-F033E85A621E}" srcOrd="0" destOrd="0" presId="urn:microsoft.com/office/officeart/2005/8/layout/cycle2"/>
-    <dgm:cxn modelId="{3EF38E23-701D-4476-AD21-CE138D8487CD}" type="presParOf" srcId="{B10E68AE-B2D3-466C-97B2-FE220EE78A8D}" destId="{1B64D531-AA69-4799-A53A-D02BB154DFC5}" srcOrd="6" destOrd="0" presId="urn:microsoft.com/office/officeart/2005/8/layout/cycle2"/>
-    <dgm:cxn modelId="{9D856767-E4F0-494A-BC6E-40796F6ED1C7}" type="presParOf" srcId="{B10E68AE-B2D3-466C-97B2-FE220EE78A8D}" destId="{3881C069-5581-4E33-8C8A-7559F506BD6A}" srcOrd="7" destOrd="0" presId="urn:microsoft.com/office/officeart/2005/8/layout/cycle2"/>
-    <dgm:cxn modelId="{D0E5E62E-C12F-4CFE-9799-E09B92CCA5DD}" type="presParOf" srcId="{3881C069-5581-4E33-8C8A-7559F506BD6A}" destId="{F5A600EF-D379-4730-B65A-D1B7C5A6F67D}" srcOrd="0" destOrd="0" presId="urn:microsoft.com/office/officeart/2005/8/layout/cycle2"/>
-    <dgm:cxn modelId="{B61817AA-7E87-4AC4-920D-E7441C52A49F}" type="presParOf" srcId="{B10E68AE-B2D3-466C-97B2-FE220EE78A8D}" destId="{7E318264-034E-4A55-8650-6B54E68C2D86}" srcOrd="8" destOrd="0" presId="urn:microsoft.com/office/officeart/2005/8/layout/cycle2"/>
-    <dgm:cxn modelId="{DE0F89C3-02F0-4D02-B342-4D40F9B7B675}" type="presParOf" srcId="{B10E68AE-B2D3-466C-97B2-FE220EE78A8D}" destId="{D65E2CBE-7556-4C5B-A5A1-24EF959E7A71}" srcOrd="9" destOrd="0" presId="urn:microsoft.com/office/officeart/2005/8/layout/cycle2"/>
-    <dgm:cxn modelId="{1BAB237D-74B1-4EC7-B17B-B40E5D8CD3C6}" type="presParOf" srcId="{D65E2CBE-7556-4C5B-A5A1-24EF959E7A71}" destId="{F601C43B-51B2-4644-87EE-18E9F7C530D2}" srcOrd="0" destOrd="0" presId="urn:microsoft.com/office/officeart/2005/8/layout/cycle2"/>
-  </dgm:cxnLst>
-  <dgm:bg/>
-  <dgm:whole/>
-  <dgm:extLst>
-    <a:ext uri="http://schemas.microsoft.com/office/drawing/2008/diagram">
-      <dsp:dataModelExt xmlns:dsp="http://schemas.microsoft.com/office/drawing/2008/diagram" relId="rId6" minVer="http://schemas.openxmlformats.org/drawingml/2006/diagram"/>
-    </a:ext>
-  </dgm:extLst>
-</dgm:dataModel>
-</file>
-
-<file path=ppt/diagrams/data2.xml><?xml version="1.0" encoding="utf-8"?>
 <dgm:dataModel xmlns:dgm="http://schemas.openxmlformats.org/drawingml/2006/diagram" xmlns:a="http://schemas.openxmlformats.org/drawingml/2006/main">
   <dgm:ptLst>
     <dgm:pt modelId="{EEE9A5BF-29A3-4BA6-A478-052F3BB81B64}" type="doc">
@@ -3038,7 +2006,11 @@
     </dgm:pt>
     <dgm:pt modelId="{32DEE72B-52CB-4C41-B306-A1C2FB87D7C4}" type="pres">
       <dgm:prSet presAssocID="{444273EB-F442-48DD-B163-4CF743DE343A}" presName="background2" presStyleLbl="asst1" presStyleIdx="0" presStyleCnt="2"/>
-      <dgm:spPr/>
+      <dgm:spPr>
+        <a:solidFill>
+          <a:srgbClr val="FF0000"/>
+        </a:solidFill>
+      </dgm:spPr>
     </dgm:pt>
     <dgm:pt modelId="{A0F3BA7B-D39E-4787-8ED8-C11A376E4387}" type="pres">
       <dgm:prSet presAssocID="{444273EB-F442-48DD-B163-4CF743DE343A}" presName="text2" presStyleLbl="fgAcc2" presStyleIdx="0" presStyleCnt="2">
@@ -3066,7 +2038,11 @@
     </dgm:pt>
     <dgm:pt modelId="{60C7A587-6D71-4150-B1A6-0A764D638D5B}" type="pres">
       <dgm:prSet presAssocID="{35B3032F-5EAB-43D5-B330-AD829A8A3F00}" presName="background3" presStyleLbl="asst1" presStyleIdx="1" presStyleCnt="2"/>
-      <dgm:spPr/>
+      <dgm:spPr>
+        <a:solidFill>
+          <a:srgbClr val="FF0000"/>
+        </a:solidFill>
+      </dgm:spPr>
     </dgm:pt>
     <dgm:pt modelId="{654A0927-2001-4A5B-AF9C-87343C0D83F4}" type="pres">
       <dgm:prSet presAssocID="{35B3032F-5EAB-43D5-B330-AD829A8A3F00}" presName="text3" presStyleLbl="fgAcc3" presStyleIdx="0" presStyleCnt="4">
@@ -3094,7 +2070,11 @@
     </dgm:pt>
     <dgm:pt modelId="{3FB7ACE3-79BA-4FD3-9994-8E955F6276EF}" type="pres">
       <dgm:prSet presAssocID="{8AC80C89-DCF7-449B-89FE-A5E8FE8E148F}" presName="background3" presStyleLbl="node3" presStyleIdx="0" presStyleCnt="3"/>
-      <dgm:spPr/>
+      <dgm:spPr>
+        <a:solidFill>
+          <a:srgbClr val="FF0000"/>
+        </a:solidFill>
+      </dgm:spPr>
     </dgm:pt>
     <dgm:pt modelId="{E363EC81-2A87-4194-BF55-A0713589AD5C}" type="pres">
       <dgm:prSet presAssocID="{8AC80C89-DCF7-449B-89FE-A5E8FE8E148F}" presName="text3" presStyleLbl="fgAcc3" presStyleIdx="1" presStyleCnt="4">
@@ -3122,7 +2102,11 @@
     </dgm:pt>
     <dgm:pt modelId="{99659CAC-0080-4C0F-943F-F76BD72145D4}" type="pres">
       <dgm:prSet presAssocID="{7AD993E1-BEEB-4CED-8E6F-1BC010ECE253}" presName="background3" presStyleLbl="node3" presStyleIdx="1" presStyleCnt="3"/>
-      <dgm:spPr/>
+      <dgm:spPr>
+        <a:solidFill>
+          <a:srgbClr val="FF0000"/>
+        </a:solidFill>
+      </dgm:spPr>
     </dgm:pt>
     <dgm:pt modelId="{A7CCD258-216F-4509-87EA-880B1B4E0A3C}" type="pres">
       <dgm:prSet presAssocID="{7AD993E1-BEEB-4CED-8E6F-1BC010ECE253}" presName="text3" presStyleLbl="fgAcc3" presStyleIdx="2" presStyleCnt="4">
@@ -3150,7 +2134,11 @@
     </dgm:pt>
     <dgm:pt modelId="{80814144-5D40-4D47-A86C-8F7CC517640D}" type="pres">
       <dgm:prSet presAssocID="{3BFE589C-DE21-46C1-8171-4B64277EB0D2}" presName="background3" presStyleLbl="node3" presStyleIdx="2" presStyleCnt="3"/>
-      <dgm:spPr/>
+      <dgm:spPr>
+        <a:solidFill>
+          <a:srgbClr val="FF0000"/>
+        </a:solidFill>
+      </dgm:spPr>
     </dgm:pt>
     <dgm:pt modelId="{50EAB104-A48B-4A6F-88C8-7833D0466B3C}" type="pres">
       <dgm:prSet presAssocID="{3BFE589C-DE21-46C1-8171-4B64277EB0D2}" presName="text3" presStyleLbl="fgAcc3" presStyleIdx="3" presStyleCnt="4">
@@ -3267,7 +2255,7 @@
 </dgm:dataModel>
 </file>
 
-<file path=ppt/diagrams/data3.xml><?xml version="1.0" encoding="utf-8"?>
+<file path=ppt/diagrams/data2.xml><?xml version="1.0" encoding="utf-8"?>
 <dgm:dataModel xmlns:dgm="http://schemas.openxmlformats.org/drawingml/2006/diagram" xmlns:a="http://schemas.openxmlformats.org/drawingml/2006/main">
   <dgm:ptLst>
     <dgm:pt modelId="{B3D90669-A77E-40CE-B524-F5A1E18AEA4D}" type="doc">
@@ -3585,758 +2573,6 @@
 </file>
 
 <file path=ppt/diagrams/drawing1.xml><?xml version="1.0" encoding="utf-8"?>
-<dsp:drawing xmlns:dgm="http://schemas.openxmlformats.org/drawingml/2006/diagram" xmlns:dsp="http://schemas.microsoft.com/office/drawing/2008/diagram" xmlns:a="http://schemas.openxmlformats.org/drawingml/2006/main">
-  <dsp:spTree>
-    <dsp:nvGrpSpPr>
-      <dsp:cNvPr id="0" name=""/>
-      <dsp:cNvGrpSpPr/>
-    </dsp:nvGrpSpPr>
-    <dsp:grpSpPr/>
-    <dsp:sp modelId="{8D599B6D-E5FF-4517-B617-3A392ECA5AAF}">
-      <dsp:nvSpPr>
-        <dsp:cNvPr id="0" name=""/>
-        <dsp:cNvSpPr/>
-      </dsp:nvSpPr>
-      <dsp:spPr>
-        <a:xfrm>
-          <a:off x="3245591" y="534"/>
-          <a:ext cx="1634699" cy="1634699"/>
-        </a:xfrm>
-        <a:prstGeom prst="ellipse">
-          <a:avLst/>
-        </a:prstGeom>
-        <a:solidFill>
-          <a:schemeClr val="accent1">
-            <a:hueOff val="0"/>
-            <a:satOff val="0"/>
-            <a:lumOff val="0"/>
-            <a:alphaOff val="0"/>
-          </a:schemeClr>
-        </a:solidFill>
-        <a:ln w="12700" cap="flat" cmpd="sng" algn="ctr">
-          <a:solidFill>
-            <a:schemeClr val="lt1">
-              <a:hueOff val="0"/>
-              <a:satOff val="0"/>
-              <a:lumOff val="0"/>
-              <a:alphaOff val="0"/>
-            </a:schemeClr>
-          </a:solidFill>
-          <a:prstDash val="solid"/>
-          <a:miter lim="800000"/>
-        </a:ln>
-        <a:effectLst/>
-      </dsp:spPr>
-      <dsp:style>
-        <a:lnRef idx="2">
-          <a:scrgbClr r="0" g="0" b="0"/>
-        </a:lnRef>
-        <a:fillRef idx="1">
-          <a:scrgbClr r="0" g="0" b="0"/>
-        </a:fillRef>
-        <a:effectRef idx="0">
-          <a:scrgbClr r="0" g="0" b="0"/>
-        </a:effectRef>
-        <a:fontRef idx="minor">
-          <a:schemeClr val="lt1"/>
-        </a:fontRef>
-      </dsp:style>
-      <dsp:txBody>
-        <a:bodyPr spcFirstLastPara="0" vert="horz" wrap="square" lIns="16510" tIns="16510" rIns="16510" bIns="16510" numCol="1" spcCol="1270" anchor="ctr" anchorCtr="0">
-          <a:noAutofit/>
-        </a:bodyPr>
-        <a:lstStyle/>
-        <a:p>
-          <a:pPr marL="0" lvl="0" indent="0" algn="ctr" defTabSz="577850">
-            <a:lnSpc>
-              <a:spcPct val="90000"/>
-            </a:lnSpc>
-            <a:spcBef>
-              <a:spcPct val="0"/>
-            </a:spcBef>
-            <a:spcAft>
-              <a:spcPct val="35000"/>
-            </a:spcAft>
-            <a:buNone/>
-          </a:pPr>
-          <a:r>
-            <a:rPr lang="fr-FR" sz="1300" kern="1200" dirty="0"/>
-            <a:t>L’utilisateur arrive sur l’application</a:t>
-          </a:r>
-        </a:p>
-      </dsp:txBody>
-      <dsp:txXfrm>
-        <a:off x="3484987" y="239930"/>
-        <a:ext cx="1155907" cy="1155907"/>
-      </dsp:txXfrm>
-    </dsp:sp>
-    <dsp:sp modelId="{9BD12B6E-0942-4D81-A262-54E993C63A85}">
-      <dsp:nvSpPr>
-        <dsp:cNvPr id="0" name=""/>
-        <dsp:cNvSpPr/>
-      </dsp:nvSpPr>
-      <dsp:spPr>
-        <a:xfrm rot="2160000">
-          <a:off x="4828976" y="1256975"/>
-          <a:ext cx="436010" cy="551710"/>
-        </a:xfrm>
-        <a:prstGeom prst="rightArrow">
-          <a:avLst>
-            <a:gd name="adj1" fmla="val 60000"/>
-            <a:gd name="adj2" fmla="val 50000"/>
-          </a:avLst>
-        </a:prstGeom>
-        <a:solidFill>
-          <a:schemeClr val="accent1">
-            <a:tint val="60000"/>
-            <a:hueOff val="0"/>
-            <a:satOff val="0"/>
-            <a:lumOff val="0"/>
-            <a:alphaOff val="0"/>
-          </a:schemeClr>
-        </a:solidFill>
-        <a:ln>
-          <a:noFill/>
-        </a:ln>
-        <a:effectLst/>
-      </dsp:spPr>
-      <dsp:style>
-        <a:lnRef idx="0">
-          <a:scrgbClr r="0" g="0" b="0"/>
-        </a:lnRef>
-        <a:fillRef idx="1">
-          <a:scrgbClr r="0" g="0" b="0"/>
-        </a:fillRef>
-        <a:effectRef idx="0">
-          <a:scrgbClr r="0" g="0" b="0"/>
-        </a:effectRef>
-        <a:fontRef idx="minor">
-          <a:schemeClr val="lt1"/>
-        </a:fontRef>
-      </dsp:style>
-      <dsp:txBody>
-        <a:bodyPr spcFirstLastPara="0" vert="horz" wrap="square" lIns="0" tIns="0" rIns="0" bIns="0" numCol="1" spcCol="1270" anchor="ctr" anchorCtr="0">
-          <a:noAutofit/>
-        </a:bodyPr>
-        <a:lstStyle/>
-        <a:p>
-          <a:pPr marL="0" lvl="0" indent="0" algn="ctr" defTabSz="488950">
-            <a:lnSpc>
-              <a:spcPct val="90000"/>
-            </a:lnSpc>
-            <a:spcBef>
-              <a:spcPct val="0"/>
-            </a:spcBef>
-            <a:spcAft>
-              <a:spcPct val="35000"/>
-            </a:spcAft>
-            <a:buNone/>
-          </a:pPr>
-          <a:endParaRPr lang="fr-FR" sz="1100" kern="1200"/>
-        </a:p>
-      </dsp:txBody>
-      <dsp:txXfrm>
-        <a:off x="4841467" y="1328875"/>
-        <a:ext cx="305207" cy="331026"/>
-      </dsp:txXfrm>
-    </dsp:sp>
-    <dsp:sp modelId="{5E1AD98E-E383-4096-A25C-C1590EF87768}">
-      <dsp:nvSpPr>
-        <dsp:cNvPr id="0" name=""/>
-        <dsp:cNvSpPr/>
-      </dsp:nvSpPr>
-      <dsp:spPr>
-        <a:xfrm>
-          <a:off x="5233637" y="1444934"/>
-          <a:ext cx="1634699" cy="1634699"/>
-        </a:xfrm>
-        <a:prstGeom prst="ellipse">
-          <a:avLst/>
-        </a:prstGeom>
-        <a:solidFill>
-          <a:schemeClr val="accent1">
-            <a:hueOff val="0"/>
-            <a:satOff val="0"/>
-            <a:lumOff val="0"/>
-            <a:alphaOff val="0"/>
-          </a:schemeClr>
-        </a:solidFill>
-        <a:ln w="12700" cap="flat" cmpd="sng" algn="ctr">
-          <a:solidFill>
-            <a:schemeClr val="lt1">
-              <a:hueOff val="0"/>
-              <a:satOff val="0"/>
-              <a:lumOff val="0"/>
-              <a:alphaOff val="0"/>
-            </a:schemeClr>
-          </a:solidFill>
-          <a:prstDash val="solid"/>
-          <a:miter lim="800000"/>
-        </a:ln>
-        <a:effectLst/>
-      </dsp:spPr>
-      <dsp:style>
-        <a:lnRef idx="2">
-          <a:scrgbClr r="0" g="0" b="0"/>
-        </a:lnRef>
-        <a:fillRef idx="1">
-          <a:scrgbClr r="0" g="0" b="0"/>
-        </a:fillRef>
-        <a:effectRef idx="0">
-          <a:scrgbClr r="0" g="0" b="0"/>
-        </a:effectRef>
-        <a:fontRef idx="minor">
-          <a:schemeClr val="lt1"/>
-        </a:fontRef>
-      </dsp:style>
-      <dsp:txBody>
-        <a:bodyPr spcFirstLastPara="0" vert="horz" wrap="square" lIns="16510" tIns="16510" rIns="16510" bIns="16510" numCol="1" spcCol="1270" anchor="ctr" anchorCtr="0">
-          <a:noAutofit/>
-        </a:bodyPr>
-        <a:lstStyle/>
-        <a:p>
-          <a:pPr marL="0" lvl="0" indent="0" algn="ctr" defTabSz="577850">
-            <a:lnSpc>
-              <a:spcPct val="90000"/>
-            </a:lnSpc>
-            <a:spcBef>
-              <a:spcPct val="0"/>
-            </a:spcBef>
-            <a:spcAft>
-              <a:spcPct val="35000"/>
-            </a:spcAft>
-            <a:buNone/>
-          </a:pPr>
-          <a:r>
-            <a:rPr lang="fr-FR" sz="1300" kern="1200" dirty="0"/>
-            <a:t>Le HomeController va charger les questions</a:t>
-          </a:r>
-        </a:p>
-      </dsp:txBody>
-      <dsp:txXfrm>
-        <a:off x="5473033" y="1684330"/>
-        <a:ext cx="1155907" cy="1155907"/>
-      </dsp:txXfrm>
-    </dsp:sp>
-    <dsp:sp modelId="{69CD87AC-6EAE-4CD5-9C94-FEF02F90CF33}">
-      <dsp:nvSpPr>
-        <dsp:cNvPr id="0" name=""/>
-        <dsp:cNvSpPr/>
-      </dsp:nvSpPr>
-      <dsp:spPr>
-        <a:xfrm rot="6480000">
-          <a:off x="5457112" y="3143236"/>
-          <a:ext cx="436010" cy="551710"/>
-        </a:xfrm>
-        <a:prstGeom prst="rightArrow">
-          <a:avLst>
-            <a:gd name="adj1" fmla="val 60000"/>
-            <a:gd name="adj2" fmla="val 50000"/>
-          </a:avLst>
-        </a:prstGeom>
-        <a:solidFill>
-          <a:schemeClr val="accent1">
-            <a:tint val="60000"/>
-            <a:hueOff val="0"/>
-            <a:satOff val="0"/>
-            <a:lumOff val="0"/>
-            <a:alphaOff val="0"/>
-          </a:schemeClr>
-        </a:solidFill>
-        <a:ln>
-          <a:noFill/>
-        </a:ln>
-        <a:effectLst/>
-      </dsp:spPr>
-      <dsp:style>
-        <a:lnRef idx="0">
-          <a:scrgbClr r="0" g="0" b="0"/>
-        </a:lnRef>
-        <a:fillRef idx="1">
-          <a:scrgbClr r="0" g="0" b="0"/>
-        </a:fillRef>
-        <a:effectRef idx="0">
-          <a:scrgbClr r="0" g="0" b="0"/>
-        </a:effectRef>
-        <a:fontRef idx="minor">
-          <a:schemeClr val="lt1"/>
-        </a:fontRef>
-      </dsp:style>
-      <dsp:txBody>
-        <a:bodyPr spcFirstLastPara="0" vert="horz" wrap="square" lIns="0" tIns="0" rIns="0" bIns="0" numCol="1" spcCol="1270" anchor="ctr" anchorCtr="0">
-          <a:noAutofit/>
-        </a:bodyPr>
-        <a:lstStyle/>
-        <a:p>
-          <a:pPr marL="0" lvl="0" indent="0" algn="ctr" defTabSz="488950">
-            <a:lnSpc>
-              <a:spcPct val="90000"/>
-            </a:lnSpc>
-            <a:spcBef>
-              <a:spcPct val="0"/>
-            </a:spcBef>
-            <a:spcAft>
-              <a:spcPct val="35000"/>
-            </a:spcAft>
-            <a:buNone/>
-          </a:pPr>
-          <a:endParaRPr lang="fr-FR" sz="1100" kern="1200"/>
-        </a:p>
-      </dsp:txBody>
-      <dsp:txXfrm rot="10800000">
-        <a:off x="5542724" y="3191377"/>
-        <a:ext cx="305207" cy="331026"/>
-      </dsp:txXfrm>
-    </dsp:sp>
-    <dsp:sp modelId="{B2884A15-2323-4BA6-BB54-8513CF9E1436}">
-      <dsp:nvSpPr>
-        <dsp:cNvPr id="0" name=""/>
-        <dsp:cNvSpPr/>
-      </dsp:nvSpPr>
-      <dsp:spPr>
-        <a:xfrm>
-          <a:off x="4474271" y="3782022"/>
-          <a:ext cx="1634699" cy="1634699"/>
-        </a:xfrm>
-        <a:prstGeom prst="ellipse">
-          <a:avLst/>
-        </a:prstGeom>
-        <a:solidFill>
-          <a:schemeClr val="accent1">
-            <a:hueOff val="0"/>
-            <a:satOff val="0"/>
-            <a:lumOff val="0"/>
-            <a:alphaOff val="0"/>
-          </a:schemeClr>
-        </a:solidFill>
-        <a:ln w="12700" cap="flat" cmpd="sng" algn="ctr">
-          <a:solidFill>
-            <a:schemeClr val="lt1">
-              <a:hueOff val="0"/>
-              <a:satOff val="0"/>
-              <a:lumOff val="0"/>
-              <a:alphaOff val="0"/>
-            </a:schemeClr>
-          </a:solidFill>
-          <a:prstDash val="solid"/>
-          <a:miter lim="800000"/>
-        </a:ln>
-        <a:effectLst/>
-      </dsp:spPr>
-      <dsp:style>
-        <a:lnRef idx="2">
-          <a:scrgbClr r="0" g="0" b="0"/>
-        </a:lnRef>
-        <a:fillRef idx="1">
-          <a:scrgbClr r="0" g="0" b="0"/>
-        </a:fillRef>
-        <a:effectRef idx="0">
-          <a:scrgbClr r="0" g="0" b="0"/>
-        </a:effectRef>
-        <a:fontRef idx="minor">
-          <a:schemeClr val="lt1"/>
-        </a:fontRef>
-      </dsp:style>
-      <dsp:txBody>
-        <a:bodyPr spcFirstLastPara="0" vert="horz" wrap="square" lIns="16510" tIns="16510" rIns="16510" bIns="16510" numCol="1" spcCol="1270" anchor="ctr" anchorCtr="0">
-          <a:noAutofit/>
-        </a:bodyPr>
-        <a:lstStyle/>
-        <a:p>
-          <a:pPr marL="0" lvl="0" indent="0" algn="ctr" defTabSz="577850">
-            <a:lnSpc>
-              <a:spcPct val="90000"/>
-            </a:lnSpc>
-            <a:spcBef>
-              <a:spcPct val="0"/>
-            </a:spcBef>
-            <a:spcAft>
-              <a:spcPct val="35000"/>
-            </a:spcAft>
-            <a:buNone/>
-          </a:pPr>
-          <a:r>
-            <a:rPr lang="fr-FR" sz="1300" kern="1200" dirty="0"/>
-            <a:t>L’utilisateur répond et valide le sondage</a:t>
-          </a:r>
-        </a:p>
-      </dsp:txBody>
-      <dsp:txXfrm>
-        <a:off x="4713667" y="4021418"/>
-        <a:ext cx="1155907" cy="1155907"/>
-      </dsp:txXfrm>
-    </dsp:sp>
-    <dsp:sp modelId="{E7D0785B-D9CD-49EE-B140-BED117B958DE}">
-      <dsp:nvSpPr>
-        <dsp:cNvPr id="0" name=""/>
-        <dsp:cNvSpPr/>
-      </dsp:nvSpPr>
-      <dsp:spPr>
-        <a:xfrm rot="10800000">
-          <a:off x="3857276" y="4323516"/>
-          <a:ext cx="436010" cy="551710"/>
-        </a:xfrm>
-        <a:prstGeom prst="rightArrow">
-          <a:avLst>
-            <a:gd name="adj1" fmla="val 60000"/>
-            <a:gd name="adj2" fmla="val 50000"/>
-          </a:avLst>
-        </a:prstGeom>
-        <a:solidFill>
-          <a:schemeClr val="accent1">
-            <a:tint val="60000"/>
-            <a:hueOff val="0"/>
-            <a:satOff val="0"/>
-            <a:lumOff val="0"/>
-            <a:alphaOff val="0"/>
-          </a:schemeClr>
-        </a:solidFill>
-        <a:ln>
-          <a:noFill/>
-        </a:ln>
-        <a:effectLst/>
-      </dsp:spPr>
-      <dsp:style>
-        <a:lnRef idx="0">
-          <a:scrgbClr r="0" g="0" b="0"/>
-        </a:lnRef>
-        <a:fillRef idx="1">
-          <a:scrgbClr r="0" g="0" b="0"/>
-        </a:fillRef>
-        <a:effectRef idx="0">
-          <a:scrgbClr r="0" g="0" b="0"/>
-        </a:effectRef>
-        <a:fontRef idx="minor">
-          <a:schemeClr val="lt1"/>
-        </a:fontRef>
-      </dsp:style>
-      <dsp:txBody>
-        <a:bodyPr spcFirstLastPara="0" vert="horz" wrap="square" lIns="0" tIns="0" rIns="0" bIns="0" numCol="1" spcCol="1270" anchor="ctr" anchorCtr="0">
-          <a:noAutofit/>
-        </a:bodyPr>
-        <a:lstStyle/>
-        <a:p>
-          <a:pPr marL="0" lvl="0" indent="0" algn="ctr" defTabSz="488950">
-            <a:lnSpc>
-              <a:spcPct val="90000"/>
-            </a:lnSpc>
-            <a:spcBef>
-              <a:spcPct val="0"/>
-            </a:spcBef>
-            <a:spcAft>
-              <a:spcPct val="35000"/>
-            </a:spcAft>
-            <a:buNone/>
-          </a:pPr>
-          <a:endParaRPr lang="fr-FR" sz="1100" kern="1200"/>
-        </a:p>
-      </dsp:txBody>
-      <dsp:txXfrm rot="10800000">
-        <a:off x="3988079" y="4433858"/>
-        <a:ext cx="305207" cy="331026"/>
-      </dsp:txXfrm>
-    </dsp:sp>
-    <dsp:sp modelId="{1B64D531-AA69-4799-A53A-D02BB154DFC5}">
-      <dsp:nvSpPr>
-        <dsp:cNvPr id="0" name=""/>
-        <dsp:cNvSpPr/>
-      </dsp:nvSpPr>
-      <dsp:spPr>
-        <a:xfrm>
-          <a:off x="2016912" y="3782022"/>
-          <a:ext cx="1634699" cy="1634699"/>
-        </a:xfrm>
-        <a:prstGeom prst="ellipse">
-          <a:avLst/>
-        </a:prstGeom>
-        <a:solidFill>
-          <a:schemeClr val="accent1">
-            <a:hueOff val="0"/>
-            <a:satOff val="0"/>
-            <a:lumOff val="0"/>
-            <a:alphaOff val="0"/>
-          </a:schemeClr>
-        </a:solidFill>
-        <a:ln w="12700" cap="flat" cmpd="sng" algn="ctr">
-          <a:solidFill>
-            <a:schemeClr val="lt1">
-              <a:hueOff val="0"/>
-              <a:satOff val="0"/>
-              <a:lumOff val="0"/>
-              <a:alphaOff val="0"/>
-            </a:schemeClr>
-          </a:solidFill>
-          <a:prstDash val="solid"/>
-          <a:miter lim="800000"/>
-        </a:ln>
-        <a:effectLst/>
-      </dsp:spPr>
-      <dsp:style>
-        <a:lnRef idx="2">
-          <a:scrgbClr r="0" g="0" b="0"/>
-        </a:lnRef>
-        <a:fillRef idx="1">
-          <a:scrgbClr r="0" g="0" b="0"/>
-        </a:fillRef>
-        <a:effectRef idx="0">
-          <a:scrgbClr r="0" g="0" b="0"/>
-        </a:effectRef>
-        <a:fontRef idx="minor">
-          <a:schemeClr val="lt1"/>
-        </a:fontRef>
-      </dsp:style>
-      <dsp:txBody>
-        <a:bodyPr spcFirstLastPara="0" vert="horz" wrap="square" lIns="16510" tIns="16510" rIns="16510" bIns="16510" numCol="1" spcCol="1270" anchor="ctr" anchorCtr="0">
-          <a:noAutofit/>
-        </a:bodyPr>
-        <a:lstStyle/>
-        <a:p>
-          <a:pPr marL="0" lvl="0" indent="0" algn="ctr" defTabSz="577850">
-            <a:lnSpc>
-              <a:spcPct val="90000"/>
-            </a:lnSpc>
-            <a:spcBef>
-              <a:spcPct val="0"/>
-            </a:spcBef>
-            <a:spcAft>
-              <a:spcPct val="35000"/>
-            </a:spcAft>
-            <a:buNone/>
-          </a:pPr>
-          <a:r>
-            <a:rPr lang="fr-FR" sz="1300" kern="1200" dirty="0"/>
-            <a:t>Le HomeController valide la requête, stock les réponses et renvoi un lien</a:t>
-          </a:r>
-        </a:p>
-      </dsp:txBody>
-      <dsp:txXfrm>
-        <a:off x="2256308" y="4021418"/>
-        <a:ext cx="1155907" cy="1155907"/>
-      </dsp:txXfrm>
-    </dsp:sp>
-    <dsp:sp modelId="{3881C069-5581-4E33-8C8A-7559F506BD6A}">
-      <dsp:nvSpPr>
-        <dsp:cNvPr id="0" name=""/>
-        <dsp:cNvSpPr/>
-      </dsp:nvSpPr>
-      <dsp:spPr>
-        <a:xfrm rot="15120000">
-          <a:off x="2240386" y="3166708"/>
-          <a:ext cx="436010" cy="551710"/>
-        </a:xfrm>
-        <a:prstGeom prst="rightArrow">
-          <a:avLst>
-            <a:gd name="adj1" fmla="val 60000"/>
-            <a:gd name="adj2" fmla="val 50000"/>
-          </a:avLst>
-        </a:prstGeom>
-        <a:solidFill>
-          <a:schemeClr val="accent1">
-            <a:tint val="60000"/>
-            <a:hueOff val="0"/>
-            <a:satOff val="0"/>
-            <a:lumOff val="0"/>
-            <a:alphaOff val="0"/>
-          </a:schemeClr>
-        </a:solidFill>
-        <a:ln>
-          <a:noFill/>
-        </a:ln>
-        <a:effectLst/>
-      </dsp:spPr>
-      <dsp:style>
-        <a:lnRef idx="0">
-          <a:scrgbClr r="0" g="0" b="0"/>
-        </a:lnRef>
-        <a:fillRef idx="1">
-          <a:scrgbClr r="0" g="0" b="0"/>
-        </a:fillRef>
-        <a:effectRef idx="0">
-          <a:scrgbClr r="0" g="0" b="0"/>
-        </a:effectRef>
-        <a:fontRef idx="minor">
-          <a:schemeClr val="lt1"/>
-        </a:fontRef>
-      </dsp:style>
-      <dsp:txBody>
-        <a:bodyPr spcFirstLastPara="0" vert="horz" wrap="square" lIns="0" tIns="0" rIns="0" bIns="0" numCol="1" spcCol="1270" anchor="ctr" anchorCtr="0">
-          <a:noAutofit/>
-        </a:bodyPr>
-        <a:lstStyle/>
-        <a:p>
-          <a:pPr marL="0" lvl="0" indent="0" algn="ctr" defTabSz="488950">
-            <a:lnSpc>
-              <a:spcPct val="90000"/>
-            </a:lnSpc>
-            <a:spcBef>
-              <a:spcPct val="0"/>
-            </a:spcBef>
-            <a:spcAft>
-              <a:spcPct val="35000"/>
-            </a:spcAft>
-            <a:buNone/>
-          </a:pPr>
-          <a:endParaRPr lang="fr-FR" sz="1100" kern="1200"/>
-        </a:p>
-      </dsp:txBody>
-      <dsp:txXfrm rot="10800000">
-        <a:off x="2325998" y="3339251"/>
-        <a:ext cx="305207" cy="331026"/>
-      </dsp:txXfrm>
-    </dsp:sp>
-    <dsp:sp modelId="{7E318264-034E-4A55-8650-6B54E68C2D86}">
-      <dsp:nvSpPr>
-        <dsp:cNvPr id="0" name=""/>
-        <dsp:cNvSpPr/>
-      </dsp:nvSpPr>
-      <dsp:spPr>
-        <a:xfrm>
-          <a:off x="1257546" y="1444934"/>
-          <a:ext cx="1634699" cy="1634699"/>
-        </a:xfrm>
-        <a:prstGeom prst="ellipse">
-          <a:avLst/>
-        </a:prstGeom>
-        <a:solidFill>
-          <a:schemeClr val="accent1">
-            <a:hueOff val="0"/>
-            <a:satOff val="0"/>
-            <a:lumOff val="0"/>
-            <a:alphaOff val="0"/>
-          </a:schemeClr>
-        </a:solidFill>
-        <a:ln w="12700" cap="flat" cmpd="sng" algn="ctr">
-          <a:solidFill>
-            <a:schemeClr val="lt1">
-              <a:hueOff val="0"/>
-              <a:satOff val="0"/>
-              <a:lumOff val="0"/>
-              <a:alphaOff val="0"/>
-            </a:schemeClr>
-          </a:solidFill>
-          <a:prstDash val="solid"/>
-          <a:miter lim="800000"/>
-        </a:ln>
-        <a:effectLst/>
-      </dsp:spPr>
-      <dsp:style>
-        <a:lnRef idx="2">
-          <a:scrgbClr r="0" g="0" b="0"/>
-        </a:lnRef>
-        <a:fillRef idx="1">
-          <a:scrgbClr r="0" g="0" b="0"/>
-        </a:fillRef>
-        <a:effectRef idx="0">
-          <a:scrgbClr r="0" g="0" b="0"/>
-        </a:effectRef>
-        <a:fontRef idx="minor">
-          <a:schemeClr val="lt1"/>
-        </a:fontRef>
-      </dsp:style>
-      <dsp:txBody>
-        <a:bodyPr spcFirstLastPara="0" vert="horz" wrap="square" lIns="16510" tIns="16510" rIns="16510" bIns="16510" numCol="1" spcCol="1270" anchor="ctr" anchorCtr="0">
-          <a:noAutofit/>
-        </a:bodyPr>
-        <a:lstStyle/>
-        <a:p>
-          <a:pPr marL="0" lvl="0" indent="0" algn="ctr" defTabSz="577850">
-            <a:lnSpc>
-              <a:spcPct val="90000"/>
-            </a:lnSpc>
-            <a:spcBef>
-              <a:spcPct val="0"/>
-            </a:spcBef>
-            <a:spcAft>
-              <a:spcPct val="35000"/>
-            </a:spcAft>
-            <a:buNone/>
-          </a:pPr>
-          <a:r>
-            <a:rPr lang="fr-FR" sz="1300" kern="1200" dirty="0"/>
-            <a:t>L’utilisateur clique sur le lien et le controller va charger le sondage lié a cet utilisateur</a:t>
-          </a:r>
-        </a:p>
-      </dsp:txBody>
-      <dsp:txXfrm>
-        <a:off x="1496942" y="1684330"/>
-        <a:ext cx="1155907" cy="1155907"/>
-      </dsp:txXfrm>
-    </dsp:sp>
-    <dsp:sp modelId="{D65E2CBE-7556-4C5B-A5A1-24EF959E7A71}">
-      <dsp:nvSpPr>
-        <dsp:cNvPr id="0" name=""/>
-        <dsp:cNvSpPr/>
-      </dsp:nvSpPr>
-      <dsp:spPr>
-        <a:xfrm rot="19440000">
-          <a:off x="2840930" y="1271481"/>
-          <a:ext cx="436010" cy="551710"/>
-        </a:xfrm>
-        <a:prstGeom prst="rightArrow">
-          <a:avLst>
-            <a:gd name="adj1" fmla="val 60000"/>
-            <a:gd name="adj2" fmla="val 50000"/>
-          </a:avLst>
-        </a:prstGeom>
-        <a:solidFill>
-          <a:schemeClr val="accent1">
-            <a:tint val="60000"/>
-            <a:hueOff val="0"/>
-            <a:satOff val="0"/>
-            <a:lumOff val="0"/>
-            <a:alphaOff val="0"/>
-          </a:schemeClr>
-        </a:solidFill>
-        <a:ln>
-          <a:noFill/>
-        </a:ln>
-        <a:effectLst/>
-      </dsp:spPr>
-      <dsp:style>
-        <a:lnRef idx="0">
-          <a:scrgbClr r="0" g="0" b="0"/>
-        </a:lnRef>
-        <a:fillRef idx="1">
-          <a:scrgbClr r="0" g="0" b="0"/>
-        </a:fillRef>
-        <a:effectRef idx="0">
-          <a:scrgbClr r="0" g="0" b="0"/>
-        </a:effectRef>
-        <a:fontRef idx="minor">
-          <a:schemeClr val="lt1"/>
-        </a:fontRef>
-      </dsp:style>
-      <dsp:txBody>
-        <a:bodyPr spcFirstLastPara="0" vert="horz" wrap="square" lIns="0" tIns="0" rIns="0" bIns="0" numCol="1" spcCol="1270" anchor="ctr" anchorCtr="0">
-          <a:noAutofit/>
-        </a:bodyPr>
-        <a:lstStyle/>
-        <a:p>
-          <a:pPr marL="0" lvl="0" indent="0" algn="ctr" defTabSz="488950">
-            <a:lnSpc>
-              <a:spcPct val="90000"/>
-            </a:lnSpc>
-            <a:spcBef>
-              <a:spcPct val="0"/>
-            </a:spcBef>
-            <a:spcAft>
-              <a:spcPct val="35000"/>
-            </a:spcAft>
-            <a:buNone/>
-          </a:pPr>
-          <a:endParaRPr lang="fr-FR" sz="1100" kern="1200"/>
-        </a:p>
-      </dsp:txBody>
-      <dsp:txXfrm>
-        <a:off x="2853421" y="1420265"/>
-        <a:ext cx="305207" cy="331026"/>
-      </dsp:txXfrm>
-    </dsp:sp>
-  </dsp:spTree>
-</dsp:drawing>
-</file>
-
-<file path=ppt/diagrams/drawing2.xml><?xml version="1.0" encoding="utf-8"?>
 <dsp:drawing xmlns:dgm="http://schemas.openxmlformats.org/drawingml/2006/diagram" xmlns:dsp="http://schemas.microsoft.com/office/drawing/2008/diagram" xmlns:a="http://schemas.openxmlformats.org/drawingml/2006/main">
   <dsp:spTree>
     <dsp:nvGrpSpPr>
@@ -4863,12 +3099,7 @@
           </a:avLst>
         </a:prstGeom>
         <a:solidFill>
-          <a:schemeClr val="accent1">
-            <a:hueOff val="0"/>
-            <a:satOff val="0"/>
-            <a:lumOff val="0"/>
-            <a:alphaOff val="0"/>
-          </a:schemeClr>
+          <a:srgbClr val="FF0000"/>
         </a:solidFill>
         <a:ln w="12700" cap="flat" cmpd="sng" algn="ctr">
           <a:solidFill>
@@ -4994,12 +3225,7 @@
           </a:avLst>
         </a:prstGeom>
         <a:solidFill>
-          <a:schemeClr val="accent1">
-            <a:hueOff val="0"/>
-            <a:satOff val="0"/>
-            <a:lumOff val="0"/>
-            <a:alphaOff val="0"/>
-          </a:schemeClr>
+          <a:srgbClr val="FF0000"/>
         </a:solidFill>
         <a:ln w="12700" cap="flat" cmpd="sng" algn="ctr">
           <a:solidFill>
@@ -5125,12 +3351,7 @@
           </a:avLst>
         </a:prstGeom>
         <a:solidFill>
-          <a:schemeClr val="accent1">
-            <a:hueOff val="0"/>
-            <a:satOff val="0"/>
-            <a:lumOff val="0"/>
-            <a:alphaOff val="0"/>
-          </a:schemeClr>
+          <a:srgbClr val="FF0000"/>
         </a:solidFill>
         <a:ln w="12700" cap="flat" cmpd="sng" algn="ctr">
           <a:solidFill>
@@ -5256,12 +3477,7 @@
           </a:avLst>
         </a:prstGeom>
         <a:solidFill>
-          <a:schemeClr val="accent1">
-            <a:hueOff val="0"/>
-            <a:satOff val="0"/>
-            <a:lumOff val="0"/>
-            <a:alphaOff val="0"/>
-          </a:schemeClr>
+          <a:srgbClr val="FF0000"/>
         </a:solidFill>
         <a:ln w="12700" cap="flat" cmpd="sng" algn="ctr">
           <a:solidFill>
@@ -5387,12 +3603,7 @@
           </a:avLst>
         </a:prstGeom>
         <a:solidFill>
-          <a:schemeClr val="accent1">
-            <a:hueOff val="0"/>
-            <a:satOff val="0"/>
-            <a:lumOff val="0"/>
-            <a:alphaOff val="0"/>
-          </a:schemeClr>
+          <a:srgbClr val="FF0000"/>
         </a:solidFill>
         <a:ln w="12700" cap="flat" cmpd="sng" algn="ctr">
           <a:solidFill>
@@ -5637,7 +3848,7 @@
 </dsp:drawing>
 </file>
 
-<file path=ppt/diagrams/drawing3.xml><?xml version="1.0" encoding="utf-8"?>
+<file path=ppt/diagrams/drawing2.xml><?xml version="1.0" encoding="utf-8"?>
 <dsp:drawing xmlns:dgm="http://schemas.openxmlformats.org/drawingml/2006/diagram" xmlns:dsp="http://schemas.microsoft.com/office/drawing/2008/diagram" xmlns:a="http://schemas.openxmlformats.org/drawingml/2006/main">
   <dsp:spTree>
     <dsp:nvGrpSpPr>
@@ -6044,217 +4255,6 @@
 </file>
 
 <file path=ppt/diagrams/layout1.xml><?xml version="1.0" encoding="utf-8"?>
-<dgm:layoutDef xmlns:dgm="http://schemas.openxmlformats.org/drawingml/2006/diagram" xmlns:a="http://schemas.openxmlformats.org/drawingml/2006/main" uniqueId="urn:microsoft.com/office/officeart/2005/8/layout/cycle2">
-  <dgm:title val=""/>
-  <dgm:desc val=""/>
-  <dgm:catLst>
-    <dgm:cat type="cycle" pri="1000"/>
-    <dgm:cat type="convert" pri="10000"/>
-  </dgm:catLst>
-  <dgm:sampData>
-    <dgm:dataModel>
-      <dgm:ptLst>
-        <dgm:pt modelId="0" type="doc"/>
-        <dgm:pt modelId="1">
-          <dgm:prSet phldr="1"/>
-        </dgm:pt>
-        <dgm:pt modelId="2">
-          <dgm:prSet phldr="1"/>
-        </dgm:pt>
-        <dgm:pt modelId="3">
-          <dgm:prSet phldr="1"/>
-        </dgm:pt>
-        <dgm:pt modelId="4">
-          <dgm:prSet phldr="1"/>
-        </dgm:pt>
-        <dgm:pt modelId="5">
-          <dgm:prSet phldr="1"/>
-        </dgm:pt>
-      </dgm:ptLst>
-      <dgm:cxnLst>
-        <dgm:cxn modelId="6" srcId="0" destId="1" srcOrd="0" destOrd="0"/>
-        <dgm:cxn modelId="7" srcId="0" destId="2" srcOrd="1" destOrd="0"/>
-        <dgm:cxn modelId="8" srcId="0" destId="3" srcOrd="2" destOrd="0"/>
-        <dgm:cxn modelId="9" srcId="0" destId="4" srcOrd="3" destOrd="0"/>
-        <dgm:cxn modelId="10" srcId="0" destId="5" srcOrd="4" destOrd="0"/>
-      </dgm:cxnLst>
-      <dgm:bg/>
-      <dgm:whole/>
-    </dgm:dataModel>
-  </dgm:sampData>
-  <dgm:styleData>
-    <dgm:dataModel>
-      <dgm:ptLst>
-        <dgm:pt modelId="0" type="doc"/>
-        <dgm:pt modelId="1"/>
-        <dgm:pt modelId="2"/>
-        <dgm:pt modelId="3"/>
-      </dgm:ptLst>
-      <dgm:cxnLst>
-        <dgm:cxn modelId="4" srcId="0" destId="1" srcOrd="0" destOrd="0"/>
-        <dgm:cxn modelId="5" srcId="0" destId="2" srcOrd="1" destOrd="0"/>
-        <dgm:cxn modelId="6" srcId="0" destId="3" srcOrd="2" destOrd="0"/>
-      </dgm:cxnLst>
-      <dgm:bg/>
-      <dgm:whole/>
-    </dgm:dataModel>
-  </dgm:styleData>
-  <dgm:clrData>
-    <dgm:dataModel>
-      <dgm:ptLst>
-        <dgm:pt modelId="0" type="doc"/>
-        <dgm:pt modelId="1"/>
-        <dgm:pt modelId="2"/>
-        <dgm:pt modelId="3"/>
-        <dgm:pt modelId="4"/>
-        <dgm:pt modelId="5"/>
-        <dgm:pt modelId="6"/>
-      </dgm:ptLst>
-      <dgm:cxnLst>
-        <dgm:cxn modelId="7" srcId="0" destId="1" srcOrd="0" destOrd="0"/>
-        <dgm:cxn modelId="8" srcId="0" destId="2" srcOrd="1" destOrd="0"/>
-        <dgm:cxn modelId="9" srcId="0" destId="3" srcOrd="2" destOrd="0"/>
-        <dgm:cxn modelId="10" srcId="0" destId="4" srcOrd="3" destOrd="0"/>
-        <dgm:cxn modelId="11" srcId="0" destId="5" srcOrd="4" destOrd="0"/>
-        <dgm:cxn modelId="12" srcId="0" destId="6" srcOrd="5" destOrd="0"/>
-      </dgm:cxnLst>
-      <dgm:bg/>
-      <dgm:whole/>
-    </dgm:dataModel>
-  </dgm:clrData>
-  <dgm:layoutNode name="cycle">
-    <dgm:varLst>
-      <dgm:dir/>
-      <dgm:resizeHandles val="exact"/>
-    </dgm:varLst>
-    <dgm:choose name="Name0">
-      <dgm:if name="Name1" func="var" arg="dir" op="equ" val="norm">
-        <dgm:choose name="Name2">
-          <dgm:if name="Name3" axis="ch" ptType="node" func="cnt" op="gt" val="2">
-            <dgm:alg type="cycle">
-              <dgm:param type="stAng" val="0"/>
-              <dgm:param type="spanAng" val="360"/>
-            </dgm:alg>
-          </dgm:if>
-          <dgm:else name="Name4">
-            <dgm:alg type="cycle">
-              <dgm:param type="stAng" val="-90"/>
-              <dgm:param type="spanAng" val="360"/>
-            </dgm:alg>
-          </dgm:else>
-        </dgm:choose>
-      </dgm:if>
-      <dgm:else name="Name5">
-        <dgm:choose name="Name6">
-          <dgm:if name="Name7" axis="ch" ptType="node" func="cnt" op="gt" val="2">
-            <dgm:alg type="cycle">
-              <dgm:param type="stAng" val="0"/>
-              <dgm:param type="spanAng" val="-360"/>
-            </dgm:alg>
-          </dgm:if>
-          <dgm:else name="Name8">
-            <dgm:alg type="cycle">
-              <dgm:param type="stAng" val="90"/>
-              <dgm:param type="spanAng" val="-360"/>
-            </dgm:alg>
-          </dgm:else>
-        </dgm:choose>
-      </dgm:else>
-    </dgm:choose>
-    <dgm:shape xmlns:r="http://schemas.openxmlformats.org/officeDocument/2006/relationships" r:blip="">
-      <dgm:adjLst/>
-    </dgm:shape>
-    <dgm:presOf/>
-    <dgm:constrLst>
-      <dgm:constr type="w" for="ch" ptType="node" refType="w"/>
-      <dgm:constr type="w" for="ch" ptType="sibTrans" refType="w" refFor="ch" refPtType="node" op="equ" fact="0.25"/>
-      <dgm:constr type="sibSp" refType="w" refFor="ch" refPtType="node" fact="0.5"/>
-      <dgm:constr type="primFontSz" for="ch" ptType="node" op="equ" val="65"/>
-      <dgm:constr type="primFontSz" for="des" forName="connectorText" op="equ" val="55"/>
-      <dgm:constr type="primFontSz" for="des" forName="connectorText" refType="primFontSz" refFor="ch" refPtType="node" op="lte" fact="0.8"/>
-    </dgm:constrLst>
-    <dgm:ruleLst/>
-    <dgm:forEach name="nodesForEach" axis="ch" ptType="node">
-      <dgm:layoutNode name="node">
-        <dgm:varLst>
-          <dgm:bulletEnabled val="1"/>
-        </dgm:varLst>
-        <dgm:alg type="tx">
-          <dgm:param type="txAnchorVertCh" val="mid"/>
-        </dgm:alg>
-        <dgm:shape xmlns:r="http://schemas.openxmlformats.org/officeDocument/2006/relationships" type="ellipse" r:blip="">
-          <dgm:adjLst/>
-        </dgm:shape>
-        <dgm:presOf axis="desOrSelf" ptType="node"/>
-        <dgm:constrLst>
-          <dgm:constr type="h" refType="w"/>
-          <dgm:constr type="lMarg" refType="primFontSz" fact="0.1"/>
-          <dgm:constr type="rMarg" refType="primFontSz" fact="0.1"/>
-          <dgm:constr type="tMarg" refType="primFontSz" fact="0.1"/>
-          <dgm:constr type="bMarg" refType="primFontSz" fact="0.1"/>
-        </dgm:constrLst>
-        <dgm:ruleLst>
-          <dgm:rule type="primFontSz" val="5" fact="NaN" max="NaN"/>
-        </dgm:ruleLst>
-      </dgm:layoutNode>
-      <dgm:choose name="Name9">
-        <dgm:if name="Name10" axis="par ch" ptType="doc node" func="cnt" op="gt" val="1">
-          <dgm:forEach name="sibTransForEach" axis="followSib" ptType="sibTrans" hideLastTrans="0" cnt="1">
-            <dgm:layoutNode name="sibTrans">
-              <dgm:choose name="Name11">
-                <dgm:if name="Name12" axis="par ch" ptType="doc node" func="cnt" op="lt" val="3">
-                  <dgm:alg type="conn">
-                    <dgm:param type="begPts" val="radial"/>
-                    <dgm:param type="endPts" val="radial"/>
-                  </dgm:alg>
-                </dgm:if>
-                <dgm:else name="Name13">
-                  <dgm:alg type="conn">
-                    <dgm:param type="begPts" val="auto"/>
-                    <dgm:param type="endPts" val="auto"/>
-                  </dgm:alg>
-                </dgm:else>
-              </dgm:choose>
-              <dgm:shape xmlns:r="http://schemas.openxmlformats.org/officeDocument/2006/relationships" type="conn" r:blip="">
-                <dgm:adjLst/>
-              </dgm:shape>
-              <dgm:presOf axis="self"/>
-              <dgm:constrLst>
-                <dgm:constr type="h" refType="w" fact="1.35"/>
-                <dgm:constr type="connDist"/>
-                <dgm:constr type="w" for="ch" refType="connDist" fact="0.45"/>
-                <dgm:constr type="h" for="ch" refType="h"/>
-              </dgm:constrLst>
-              <dgm:ruleLst/>
-              <dgm:layoutNode name="connectorText">
-                <dgm:alg type="tx">
-                  <dgm:param type="autoTxRot" val="grav"/>
-                </dgm:alg>
-                <dgm:shape xmlns:r="http://schemas.openxmlformats.org/officeDocument/2006/relationships" type="conn" r:blip="" hideGeom="1">
-                  <dgm:adjLst/>
-                </dgm:shape>
-                <dgm:presOf axis="self"/>
-                <dgm:constrLst>
-                  <dgm:constr type="lMarg"/>
-                  <dgm:constr type="rMarg"/>
-                  <dgm:constr type="tMarg"/>
-                  <dgm:constr type="bMarg"/>
-                </dgm:constrLst>
-                <dgm:ruleLst>
-                  <dgm:rule type="primFontSz" val="5" fact="NaN" max="NaN"/>
-                </dgm:ruleLst>
-              </dgm:layoutNode>
-            </dgm:layoutNode>
-          </dgm:forEach>
-        </dgm:if>
-        <dgm:else name="Name14"/>
-      </dgm:choose>
-    </dgm:forEach>
-  </dgm:layoutNode>
-</dgm:layoutDef>
-</file>
-
-<file path=ppt/diagrams/layout2.xml><?xml version="1.0" encoding="utf-8"?>
 <dgm:layoutDef xmlns:dgm="http://schemas.openxmlformats.org/drawingml/2006/diagram" xmlns:a="http://schemas.openxmlformats.org/drawingml/2006/main" uniqueId="urn:microsoft.com/office/officeart/2005/8/layout/hierarchy1">
   <dgm:title val=""/>
   <dgm:desc val=""/>
@@ -6817,7 +4817,7 @@
 </dgm:layoutDef>
 </file>
 
-<file path=ppt/diagrams/layout3.xml><?xml version="1.0" encoding="utf-8"?>
+<file path=ppt/diagrams/layout2.xml><?xml version="1.0" encoding="utf-8"?>
 <dgm:layoutDef xmlns:dgm="http://schemas.openxmlformats.org/drawingml/2006/diagram" xmlns:a="http://schemas.openxmlformats.org/drawingml/2006/main" uniqueId="urn:microsoft.com/office/officeart/2005/8/layout/matrix1">
   <dgm:title val=""/>
   <dgm:desc val=""/>
@@ -9262,1040 +7262,6 @@
 </dgm:styleDef>
 </file>
 
-<file path=ppt/diagrams/quickStyle3.xml><?xml version="1.0" encoding="utf-8"?>
-<dgm:styleDef xmlns:dgm="http://schemas.openxmlformats.org/drawingml/2006/diagram" xmlns:a="http://schemas.openxmlformats.org/drawingml/2006/main" uniqueId="urn:microsoft.com/office/officeart/2005/8/quickstyle/simple1">
-  <dgm:title val=""/>
-  <dgm:desc val=""/>
-  <dgm:catLst>
-    <dgm:cat type="simple" pri="10100"/>
-  </dgm:catLst>
-  <dgm:scene3d>
-    <a:camera prst="orthographicFront"/>
-    <a:lightRig rig="threePt" dir="t"/>
-  </dgm:scene3d>
-  <dgm:styleLbl name="node0">
-    <dgm:scene3d>
-      <a:camera prst="orthographicFront"/>
-      <a:lightRig rig="threePt" dir="t"/>
-    </dgm:scene3d>
-    <dgm:sp3d/>
-    <dgm:txPr/>
-    <dgm:style>
-      <a:lnRef idx="2">
-        <a:scrgbClr r="0" g="0" b="0"/>
-      </a:lnRef>
-      <a:fillRef idx="1">
-        <a:scrgbClr r="0" g="0" b="0"/>
-      </a:fillRef>
-      <a:effectRef idx="0">
-        <a:scrgbClr r="0" g="0" b="0"/>
-      </a:effectRef>
-      <a:fontRef idx="minor">
-        <a:schemeClr val="lt1"/>
-      </a:fontRef>
-    </dgm:style>
-  </dgm:styleLbl>
-  <dgm:styleLbl name="lnNode1">
-    <dgm:scene3d>
-      <a:camera prst="orthographicFront"/>
-      <a:lightRig rig="threePt" dir="t"/>
-    </dgm:scene3d>
-    <dgm:sp3d/>
-    <dgm:txPr/>
-    <dgm:style>
-      <a:lnRef idx="2">
-        <a:scrgbClr r="0" g="0" b="0"/>
-      </a:lnRef>
-      <a:fillRef idx="1">
-        <a:scrgbClr r="0" g="0" b="0"/>
-      </a:fillRef>
-      <a:effectRef idx="0">
-        <a:scrgbClr r="0" g="0" b="0"/>
-      </a:effectRef>
-      <a:fontRef idx="minor">
-        <a:schemeClr val="lt1"/>
-      </a:fontRef>
-    </dgm:style>
-  </dgm:styleLbl>
-  <dgm:styleLbl name="vennNode1">
-    <dgm:scene3d>
-      <a:camera prst="orthographicFront"/>
-      <a:lightRig rig="threePt" dir="t"/>
-    </dgm:scene3d>
-    <dgm:sp3d/>
-    <dgm:txPr/>
-    <dgm:style>
-      <a:lnRef idx="2">
-        <a:scrgbClr r="0" g="0" b="0"/>
-      </a:lnRef>
-      <a:fillRef idx="1">
-        <a:scrgbClr r="0" g="0" b="0"/>
-      </a:fillRef>
-      <a:effectRef idx="0">
-        <a:scrgbClr r="0" g="0" b="0"/>
-      </a:effectRef>
-      <a:fontRef idx="minor">
-        <a:schemeClr val="tx1"/>
-      </a:fontRef>
-    </dgm:style>
-  </dgm:styleLbl>
-  <dgm:styleLbl name="alignNode1">
-    <dgm:scene3d>
-      <a:camera prst="orthographicFront"/>
-      <a:lightRig rig="threePt" dir="t"/>
-    </dgm:scene3d>
-    <dgm:sp3d/>
-    <dgm:txPr/>
-    <dgm:style>
-      <a:lnRef idx="2">
-        <a:scrgbClr r="0" g="0" b="0"/>
-      </a:lnRef>
-      <a:fillRef idx="1">
-        <a:scrgbClr r="0" g="0" b="0"/>
-      </a:fillRef>
-      <a:effectRef idx="0">
-        <a:scrgbClr r="0" g="0" b="0"/>
-      </a:effectRef>
-      <a:fontRef idx="minor">
-        <a:schemeClr val="lt1"/>
-      </a:fontRef>
-    </dgm:style>
-  </dgm:styleLbl>
-  <dgm:styleLbl name="node1">
-    <dgm:scene3d>
-      <a:camera prst="orthographicFront"/>
-      <a:lightRig rig="threePt" dir="t"/>
-    </dgm:scene3d>
-    <dgm:sp3d/>
-    <dgm:txPr/>
-    <dgm:style>
-      <a:lnRef idx="2">
-        <a:scrgbClr r="0" g="0" b="0"/>
-      </a:lnRef>
-      <a:fillRef idx="1">
-        <a:scrgbClr r="0" g="0" b="0"/>
-      </a:fillRef>
-      <a:effectRef idx="0">
-        <a:scrgbClr r="0" g="0" b="0"/>
-      </a:effectRef>
-      <a:fontRef idx="minor">
-        <a:schemeClr val="lt1"/>
-      </a:fontRef>
-    </dgm:style>
-  </dgm:styleLbl>
-  <dgm:styleLbl name="node2">
-    <dgm:scene3d>
-      <a:camera prst="orthographicFront"/>
-      <a:lightRig rig="threePt" dir="t"/>
-    </dgm:scene3d>
-    <dgm:sp3d/>
-    <dgm:txPr/>
-    <dgm:style>
-      <a:lnRef idx="2">
-        <a:scrgbClr r="0" g="0" b="0"/>
-      </a:lnRef>
-      <a:fillRef idx="1">
-        <a:scrgbClr r="0" g="0" b="0"/>
-      </a:fillRef>
-      <a:effectRef idx="0">
-        <a:scrgbClr r="0" g="0" b="0"/>
-      </a:effectRef>
-      <a:fontRef idx="minor">
-        <a:schemeClr val="lt1"/>
-      </a:fontRef>
-    </dgm:style>
-  </dgm:styleLbl>
-  <dgm:styleLbl name="node3">
-    <dgm:scene3d>
-      <a:camera prst="orthographicFront"/>
-      <a:lightRig rig="threePt" dir="t"/>
-    </dgm:scene3d>
-    <dgm:sp3d/>
-    <dgm:txPr/>
-    <dgm:style>
-      <a:lnRef idx="2">
-        <a:scrgbClr r="0" g="0" b="0"/>
-      </a:lnRef>
-      <a:fillRef idx="1">
-        <a:scrgbClr r="0" g="0" b="0"/>
-      </a:fillRef>
-      <a:effectRef idx="0">
-        <a:scrgbClr r="0" g="0" b="0"/>
-      </a:effectRef>
-      <a:fontRef idx="minor">
-        <a:schemeClr val="lt1"/>
-      </a:fontRef>
-    </dgm:style>
-  </dgm:styleLbl>
-  <dgm:styleLbl name="node4">
-    <dgm:scene3d>
-      <a:camera prst="orthographicFront"/>
-      <a:lightRig rig="threePt" dir="t"/>
-    </dgm:scene3d>
-    <dgm:sp3d/>
-    <dgm:txPr/>
-    <dgm:style>
-      <a:lnRef idx="2">
-        <a:scrgbClr r="0" g="0" b="0"/>
-      </a:lnRef>
-      <a:fillRef idx="1">
-        <a:scrgbClr r="0" g="0" b="0"/>
-      </a:fillRef>
-      <a:effectRef idx="0">
-        <a:scrgbClr r="0" g="0" b="0"/>
-      </a:effectRef>
-      <a:fontRef idx="minor">
-        <a:schemeClr val="lt1"/>
-      </a:fontRef>
-    </dgm:style>
-  </dgm:styleLbl>
-  <dgm:styleLbl name="fgImgPlace1">
-    <dgm:scene3d>
-      <a:camera prst="orthographicFront"/>
-      <a:lightRig rig="threePt" dir="t"/>
-    </dgm:scene3d>
-    <dgm:sp3d/>
-    <dgm:txPr/>
-    <dgm:style>
-      <a:lnRef idx="2">
-        <a:scrgbClr r="0" g="0" b="0"/>
-      </a:lnRef>
-      <a:fillRef idx="1">
-        <a:scrgbClr r="0" g="0" b="0"/>
-      </a:fillRef>
-      <a:effectRef idx="0">
-        <a:scrgbClr r="0" g="0" b="0"/>
-      </a:effectRef>
-      <a:fontRef idx="minor"/>
-    </dgm:style>
-  </dgm:styleLbl>
-  <dgm:styleLbl name="alignImgPlace1">
-    <dgm:scene3d>
-      <a:camera prst="orthographicFront"/>
-      <a:lightRig rig="threePt" dir="t"/>
-    </dgm:scene3d>
-    <dgm:sp3d/>
-    <dgm:txPr/>
-    <dgm:style>
-      <a:lnRef idx="2">
-        <a:scrgbClr r="0" g="0" b="0"/>
-      </a:lnRef>
-      <a:fillRef idx="1">
-        <a:scrgbClr r="0" g="0" b="0"/>
-      </a:fillRef>
-      <a:effectRef idx="0">
-        <a:scrgbClr r="0" g="0" b="0"/>
-      </a:effectRef>
-      <a:fontRef idx="minor"/>
-    </dgm:style>
-  </dgm:styleLbl>
-  <dgm:styleLbl name="bgImgPlace1">
-    <dgm:scene3d>
-      <a:camera prst="orthographicFront"/>
-      <a:lightRig rig="threePt" dir="t"/>
-    </dgm:scene3d>
-    <dgm:sp3d/>
-    <dgm:txPr/>
-    <dgm:style>
-      <a:lnRef idx="2">
-        <a:scrgbClr r="0" g="0" b="0"/>
-      </a:lnRef>
-      <a:fillRef idx="1">
-        <a:scrgbClr r="0" g="0" b="0"/>
-      </a:fillRef>
-      <a:effectRef idx="0">
-        <a:scrgbClr r="0" g="0" b="0"/>
-      </a:effectRef>
-      <a:fontRef idx="minor"/>
-    </dgm:style>
-  </dgm:styleLbl>
-  <dgm:styleLbl name="sibTrans2D1">
-    <dgm:scene3d>
-      <a:camera prst="orthographicFront"/>
-      <a:lightRig rig="threePt" dir="t"/>
-    </dgm:scene3d>
-    <dgm:sp3d/>
-    <dgm:txPr/>
-    <dgm:style>
-      <a:lnRef idx="0">
-        <a:scrgbClr r="0" g="0" b="0"/>
-      </a:lnRef>
-      <a:fillRef idx="1">
-        <a:scrgbClr r="0" g="0" b="0"/>
-      </a:fillRef>
-      <a:effectRef idx="0">
-        <a:scrgbClr r="0" g="0" b="0"/>
-      </a:effectRef>
-      <a:fontRef idx="minor">
-        <a:schemeClr val="lt1"/>
-      </a:fontRef>
-    </dgm:style>
-  </dgm:styleLbl>
-  <dgm:styleLbl name="fgSibTrans2D1">
-    <dgm:scene3d>
-      <a:camera prst="orthographicFront"/>
-      <a:lightRig rig="threePt" dir="t"/>
-    </dgm:scene3d>
-    <dgm:sp3d/>
-    <dgm:txPr/>
-    <dgm:style>
-      <a:lnRef idx="0">
-        <a:scrgbClr r="0" g="0" b="0"/>
-      </a:lnRef>
-      <a:fillRef idx="1">
-        <a:scrgbClr r="0" g="0" b="0"/>
-      </a:fillRef>
-      <a:effectRef idx="0">
-        <a:scrgbClr r="0" g="0" b="0"/>
-      </a:effectRef>
-      <a:fontRef idx="minor">
-        <a:schemeClr val="lt1"/>
-      </a:fontRef>
-    </dgm:style>
-  </dgm:styleLbl>
-  <dgm:styleLbl name="bgSibTrans2D1">
-    <dgm:scene3d>
-      <a:camera prst="orthographicFront"/>
-      <a:lightRig rig="threePt" dir="t"/>
-    </dgm:scene3d>
-    <dgm:sp3d/>
-    <dgm:txPr/>
-    <dgm:style>
-      <a:lnRef idx="0">
-        <a:scrgbClr r="0" g="0" b="0"/>
-      </a:lnRef>
-      <a:fillRef idx="1">
-        <a:scrgbClr r="0" g="0" b="0"/>
-      </a:fillRef>
-      <a:effectRef idx="0">
-        <a:scrgbClr r="0" g="0" b="0"/>
-      </a:effectRef>
-      <a:fontRef idx="minor">
-        <a:schemeClr val="lt1"/>
-      </a:fontRef>
-    </dgm:style>
-  </dgm:styleLbl>
-  <dgm:styleLbl name="sibTrans1D1">
-    <dgm:scene3d>
-      <a:camera prst="orthographicFront"/>
-      <a:lightRig rig="threePt" dir="t"/>
-    </dgm:scene3d>
-    <dgm:sp3d/>
-    <dgm:txPr/>
-    <dgm:style>
-      <a:lnRef idx="1">
-        <a:scrgbClr r="0" g="0" b="0"/>
-      </a:lnRef>
-      <a:fillRef idx="0">
-        <a:scrgbClr r="0" g="0" b="0"/>
-      </a:fillRef>
-      <a:effectRef idx="0">
-        <a:scrgbClr r="0" g="0" b="0"/>
-      </a:effectRef>
-      <a:fontRef idx="minor"/>
-    </dgm:style>
-  </dgm:styleLbl>
-  <dgm:styleLbl name="callout">
-    <dgm:scene3d>
-      <a:camera prst="orthographicFront"/>
-      <a:lightRig rig="threePt" dir="t"/>
-    </dgm:scene3d>
-    <dgm:sp3d/>
-    <dgm:txPr/>
-    <dgm:style>
-      <a:lnRef idx="2">
-        <a:scrgbClr r="0" g="0" b="0"/>
-      </a:lnRef>
-      <a:fillRef idx="1">
-        <a:scrgbClr r="0" g="0" b="0"/>
-      </a:fillRef>
-      <a:effectRef idx="0">
-        <a:scrgbClr r="0" g="0" b="0"/>
-      </a:effectRef>
-      <a:fontRef idx="minor"/>
-    </dgm:style>
-  </dgm:styleLbl>
-  <dgm:styleLbl name="asst0">
-    <dgm:scene3d>
-      <a:camera prst="orthographicFront"/>
-      <a:lightRig rig="threePt" dir="t"/>
-    </dgm:scene3d>
-    <dgm:sp3d/>
-    <dgm:txPr/>
-    <dgm:style>
-      <a:lnRef idx="2">
-        <a:scrgbClr r="0" g="0" b="0"/>
-      </a:lnRef>
-      <a:fillRef idx="1">
-        <a:scrgbClr r="0" g="0" b="0"/>
-      </a:fillRef>
-      <a:effectRef idx="0">
-        <a:scrgbClr r="0" g="0" b="0"/>
-      </a:effectRef>
-      <a:fontRef idx="minor">
-        <a:schemeClr val="lt1"/>
-      </a:fontRef>
-    </dgm:style>
-  </dgm:styleLbl>
-  <dgm:styleLbl name="asst1">
-    <dgm:scene3d>
-      <a:camera prst="orthographicFront"/>
-      <a:lightRig rig="threePt" dir="t"/>
-    </dgm:scene3d>
-    <dgm:sp3d/>
-    <dgm:txPr/>
-    <dgm:style>
-      <a:lnRef idx="2">
-        <a:scrgbClr r="0" g="0" b="0"/>
-      </a:lnRef>
-      <a:fillRef idx="1">
-        <a:scrgbClr r="0" g="0" b="0"/>
-      </a:fillRef>
-      <a:effectRef idx="0">
-        <a:scrgbClr r="0" g="0" b="0"/>
-      </a:effectRef>
-      <a:fontRef idx="minor">
-        <a:schemeClr val="lt1"/>
-      </a:fontRef>
-    </dgm:style>
-  </dgm:styleLbl>
-  <dgm:styleLbl name="asst2">
-    <dgm:scene3d>
-      <a:camera prst="orthographicFront"/>
-      <a:lightRig rig="threePt" dir="t"/>
-    </dgm:scene3d>
-    <dgm:sp3d/>
-    <dgm:txPr/>
-    <dgm:style>
-      <a:lnRef idx="2">
-        <a:scrgbClr r="0" g="0" b="0"/>
-      </a:lnRef>
-      <a:fillRef idx="1">
-        <a:scrgbClr r="0" g="0" b="0"/>
-      </a:fillRef>
-      <a:effectRef idx="0">
-        <a:scrgbClr r="0" g="0" b="0"/>
-      </a:effectRef>
-      <a:fontRef idx="minor">
-        <a:schemeClr val="lt1"/>
-      </a:fontRef>
-    </dgm:style>
-  </dgm:styleLbl>
-  <dgm:styleLbl name="asst3">
-    <dgm:scene3d>
-      <a:camera prst="orthographicFront"/>
-      <a:lightRig rig="threePt" dir="t"/>
-    </dgm:scene3d>
-    <dgm:sp3d/>
-    <dgm:txPr/>
-    <dgm:style>
-      <a:lnRef idx="2">
-        <a:scrgbClr r="0" g="0" b="0"/>
-      </a:lnRef>
-      <a:fillRef idx="1">
-        <a:scrgbClr r="0" g="0" b="0"/>
-      </a:fillRef>
-      <a:effectRef idx="0">
-        <a:scrgbClr r="0" g="0" b="0"/>
-      </a:effectRef>
-      <a:fontRef idx="minor">
-        <a:schemeClr val="lt1"/>
-      </a:fontRef>
-    </dgm:style>
-  </dgm:styleLbl>
-  <dgm:styleLbl name="asst4">
-    <dgm:scene3d>
-      <a:camera prst="orthographicFront"/>
-      <a:lightRig rig="threePt" dir="t"/>
-    </dgm:scene3d>
-    <dgm:sp3d/>
-    <dgm:txPr/>
-    <dgm:style>
-      <a:lnRef idx="2">
-        <a:scrgbClr r="0" g="0" b="0"/>
-      </a:lnRef>
-      <a:fillRef idx="1">
-        <a:scrgbClr r="0" g="0" b="0"/>
-      </a:fillRef>
-      <a:effectRef idx="0">
-        <a:scrgbClr r="0" g="0" b="0"/>
-      </a:effectRef>
-      <a:fontRef idx="minor">
-        <a:schemeClr val="lt1"/>
-      </a:fontRef>
-    </dgm:style>
-  </dgm:styleLbl>
-  <dgm:styleLbl name="parChTrans2D1">
-    <dgm:scene3d>
-      <a:camera prst="orthographicFront"/>
-      <a:lightRig rig="threePt" dir="t"/>
-    </dgm:scene3d>
-    <dgm:sp3d/>
-    <dgm:txPr/>
-    <dgm:style>
-      <a:lnRef idx="2">
-        <a:scrgbClr r="0" g="0" b="0"/>
-      </a:lnRef>
-      <a:fillRef idx="1">
-        <a:scrgbClr r="0" g="0" b="0"/>
-      </a:fillRef>
-      <a:effectRef idx="0">
-        <a:scrgbClr r="0" g="0" b="0"/>
-      </a:effectRef>
-      <a:fontRef idx="minor">
-        <a:schemeClr val="lt1"/>
-      </a:fontRef>
-    </dgm:style>
-  </dgm:styleLbl>
-  <dgm:styleLbl name="parChTrans2D2">
-    <dgm:scene3d>
-      <a:camera prst="orthographicFront"/>
-      <a:lightRig rig="threePt" dir="t"/>
-    </dgm:scene3d>
-    <dgm:sp3d/>
-    <dgm:txPr/>
-    <dgm:style>
-      <a:lnRef idx="2">
-        <a:scrgbClr r="0" g="0" b="0"/>
-      </a:lnRef>
-      <a:fillRef idx="1">
-        <a:scrgbClr r="0" g="0" b="0"/>
-      </a:fillRef>
-      <a:effectRef idx="0">
-        <a:scrgbClr r="0" g="0" b="0"/>
-      </a:effectRef>
-      <a:fontRef idx="minor">
-        <a:schemeClr val="lt1"/>
-      </a:fontRef>
-    </dgm:style>
-  </dgm:styleLbl>
-  <dgm:styleLbl name="parChTrans2D3">
-    <dgm:scene3d>
-      <a:camera prst="orthographicFront"/>
-      <a:lightRig rig="threePt" dir="t"/>
-    </dgm:scene3d>
-    <dgm:sp3d/>
-    <dgm:txPr/>
-    <dgm:style>
-      <a:lnRef idx="2">
-        <a:scrgbClr r="0" g="0" b="0"/>
-      </a:lnRef>
-      <a:fillRef idx="1">
-        <a:scrgbClr r="0" g="0" b="0"/>
-      </a:fillRef>
-      <a:effectRef idx="0">
-        <a:scrgbClr r="0" g="0" b="0"/>
-      </a:effectRef>
-      <a:fontRef idx="minor">
-        <a:schemeClr val="lt1"/>
-      </a:fontRef>
-    </dgm:style>
-  </dgm:styleLbl>
-  <dgm:styleLbl name="parChTrans2D4">
-    <dgm:scene3d>
-      <a:camera prst="orthographicFront"/>
-      <a:lightRig rig="threePt" dir="t"/>
-    </dgm:scene3d>
-    <dgm:sp3d/>
-    <dgm:txPr/>
-    <dgm:style>
-      <a:lnRef idx="2">
-        <a:scrgbClr r="0" g="0" b="0"/>
-      </a:lnRef>
-      <a:fillRef idx="1">
-        <a:scrgbClr r="0" g="0" b="0"/>
-      </a:fillRef>
-      <a:effectRef idx="0">
-        <a:scrgbClr r="0" g="0" b="0"/>
-      </a:effectRef>
-      <a:fontRef idx="minor">
-        <a:schemeClr val="lt1"/>
-      </a:fontRef>
-    </dgm:style>
-  </dgm:styleLbl>
-  <dgm:styleLbl name="parChTrans1D1">
-    <dgm:scene3d>
-      <a:camera prst="orthographicFront"/>
-      <a:lightRig rig="threePt" dir="t"/>
-    </dgm:scene3d>
-    <dgm:sp3d/>
-    <dgm:txPr/>
-    <dgm:style>
-      <a:lnRef idx="2">
-        <a:scrgbClr r="0" g="0" b="0"/>
-      </a:lnRef>
-      <a:fillRef idx="0">
-        <a:scrgbClr r="0" g="0" b="0"/>
-      </a:fillRef>
-      <a:effectRef idx="0">
-        <a:scrgbClr r="0" g="0" b="0"/>
-      </a:effectRef>
-      <a:fontRef idx="minor"/>
-    </dgm:style>
-  </dgm:styleLbl>
-  <dgm:styleLbl name="parChTrans1D2">
-    <dgm:scene3d>
-      <a:camera prst="orthographicFront"/>
-      <a:lightRig rig="threePt" dir="t"/>
-    </dgm:scene3d>
-    <dgm:sp3d/>
-    <dgm:txPr/>
-    <dgm:style>
-      <a:lnRef idx="2">
-        <a:scrgbClr r="0" g="0" b="0"/>
-      </a:lnRef>
-      <a:fillRef idx="0">
-        <a:scrgbClr r="0" g="0" b="0"/>
-      </a:fillRef>
-      <a:effectRef idx="0">
-        <a:scrgbClr r="0" g="0" b="0"/>
-      </a:effectRef>
-      <a:fontRef idx="minor"/>
-    </dgm:style>
-  </dgm:styleLbl>
-  <dgm:styleLbl name="parChTrans1D3">
-    <dgm:scene3d>
-      <a:camera prst="orthographicFront"/>
-      <a:lightRig rig="threePt" dir="t"/>
-    </dgm:scene3d>
-    <dgm:sp3d/>
-    <dgm:txPr/>
-    <dgm:style>
-      <a:lnRef idx="2">
-        <a:scrgbClr r="0" g="0" b="0"/>
-      </a:lnRef>
-      <a:fillRef idx="0">
-        <a:scrgbClr r="0" g="0" b="0"/>
-      </a:fillRef>
-      <a:effectRef idx="0">
-        <a:scrgbClr r="0" g="0" b="0"/>
-      </a:effectRef>
-      <a:fontRef idx="minor"/>
-    </dgm:style>
-  </dgm:styleLbl>
-  <dgm:styleLbl name="parChTrans1D4">
-    <dgm:scene3d>
-      <a:camera prst="orthographicFront"/>
-      <a:lightRig rig="threePt" dir="t"/>
-    </dgm:scene3d>
-    <dgm:sp3d/>
-    <dgm:txPr/>
-    <dgm:style>
-      <a:lnRef idx="2">
-        <a:scrgbClr r="0" g="0" b="0"/>
-      </a:lnRef>
-      <a:fillRef idx="0">
-        <a:scrgbClr r="0" g="0" b="0"/>
-      </a:fillRef>
-      <a:effectRef idx="0">
-        <a:scrgbClr r="0" g="0" b="0"/>
-      </a:effectRef>
-      <a:fontRef idx="minor"/>
-    </dgm:style>
-  </dgm:styleLbl>
-  <dgm:styleLbl name="fgAcc1">
-    <dgm:scene3d>
-      <a:camera prst="orthographicFront"/>
-      <a:lightRig rig="threePt" dir="t"/>
-    </dgm:scene3d>
-    <dgm:sp3d/>
-    <dgm:txPr/>
-    <dgm:style>
-      <a:lnRef idx="2">
-        <a:scrgbClr r="0" g="0" b="0"/>
-      </a:lnRef>
-      <a:fillRef idx="1">
-        <a:scrgbClr r="0" g="0" b="0"/>
-      </a:fillRef>
-      <a:effectRef idx="0">
-        <a:scrgbClr r="0" g="0" b="0"/>
-      </a:effectRef>
-      <a:fontRef idx="minor"/>
-    </dgm:style>
-  </dgm:styleLbl>
-  <dgm:styleLbl name="conFgAcc1">
-    <dgm:scene3d>
-      <a:camera prst="orthographicFront"/>
-      <a:lightRig rig="threePt" dir="t"/>
-    </dgm:scene3d>
-    <dgm:sp3d/>
-    <dgm:txPr/>
-    <dgm:style>
-      <a:lnRef idx="2">
-        <a:scrgbClr r="0" g="0" b="0"/>
-      </a:lnRef>
-      <a:fillRef idx="1">
-        <a:scrgbClr r="0" g="0" b="0"/>
-      </a:fillRef>
-      <a:effectRef idx="0">
-        <a:scrgbClr r="0" g="0" b="0"/>
-      </a:effectRef>
-      <a:fontRef idx="minor"/>
-    </dgm:style>
-  </dgm:styleLbl>
-  <dgm:styleLbl name="alignAcc1">
-    <dgm:scene3d>
-      <a:camera prst="orthographicFront"/>
-      <a:lightRig rig="threePt" dir="t"/>
-    </dgm:scene3d>
-    <dgm:sp3d/>
-    <dgm:txPr/>
-    <dgm:style>
-      <a:lnRef idx="2">
-        <a:scrgbClr r="0" g="0" b="0"/>
-      </a:lnRef>
-      <a:fillRef idx="1">
-        <a:scrgbClr r="0" g="0" b="0"/>
-      </a:fillRef>
-      <a:effectRef idx="0">
-        <a:scrgbClr r="0" g="0" b="0"/>
-      </a:effectRef>
-      <a:fontRef idx="minor"/>
-    </dgm:style>
-  </dgm:styleLbl>
-  <dgm:styleLbl name="trAlignAcc1">
-    <dgm:scene3d>
-      <a:camera prst="orthographicFront"/>
-      <a:lightRig rig="threePt" dir="t"/>
-    </dgm:scene3d>
-    <dgm:sp3d/>
-    <dgm:txPr/>
-    <dgm:style>
-      <a:lnRef idx="1">
-        <a:scrgbClr r="0" g="0" b="0"/>
-      </a:lnRef>
-      <a:fillRef idx="1">
-        <a:scrgbClr r="0" g="0" b="0"/>
-      </a:fillRef>
-      <a:effectRef idx="0">
-        <a:scrgbClr r="0" g="0" b="0"/>
-      </a:effectRef>
-      <a:fontRef idx="minor"/>
-    </dgm:style>
-  </dgm:styleLbl>
-  <dgm:styleLbl name="bgAcc1">
-    <dgm:scene3d>
-      <a:camera prst="orthographicFront"/>
-      <a:lightRig rig="threePt" dir="t"/>
-    </dgm:scene3d>
-    <dgm:sp3d/>
-    <dgm:txPr/>
-    <dgm:style>
-      <a:lnRef idx="2">
-        <a:scrgbClr r="0" g="0" b="0"/>
-      </a:lnRef>
-      <a:fillRef idx="1">
-        <a:scrgbClr r="0" g="0" b="0"/>
-      </a:fillRef>
-      <a:effectRef idx="0">
-        <a:scrgbClr r="0" g="0" b="0"/>
-      </a:effectRef>
-      <a:fontRef idx="minor"/>
-    </dgm:style>
-  </dgm:styleLbl>
-  <dgm:styleLbl name="solidFgAcc1">
-    <dgm:scene3d>
-      <a:camera prst="orthographicFront"/>
-      <a:lightRig rig="threePt" dir="t"/>
-    </dgm:scene3d>
-    <dgm:sp3d/>
-    <dgm:txPr/>
-    <dgm:style>
-      <a:lnRef idx="2">
-        <a:scrgbClr r="0" g="0" b="0"/>
-      </a:lnRef>
-      <a:fillRef idx="1">
-        <a:scrgbClr r="0" g="0" b="0"/>
-      </a:fillRef>
-      <a:effectRef idx="0">
-        <a:scrgbClr r="0" g="0" b="0"/>
-      </a:effectRef>
-      <a:fontRef idx="minor"/>
-    </dgm:style>
-  </dgm:styleLbl>
-  <dgm:styleLbl name="solidAlignAcc1">
-    <dgm:scene3d>
-      <a:camera prst="orthographicFront"/>
-      <a:lightRig rig="threePt" dir="t"/>
-    </dgm:scene3d>
-    <dgm:sp3d/>
-    <dgm:txPr/>
-    <dgm:style>
-      <a:lnRef idx="2">
-        <a:scrgbClr r="0" g="0" b="0"/>
-      </a:lnRef>
-      <a:fillRef idx="1">
-        <a:scrgbClr r="0" g="0" b="0"/>
-      </a:fillRef>
-      <a:effectRef idx="0">
-        <a:scrgbClr r="0" g="0" b="0"/>
-      </a:effectRef>
-      <a:fontRef idx="minor"/>
-    </dgm:style>
-  </dgm:styleLbl>
-  <dgm:styleLbl name="solidBgAcc1">
-    <dgm:scene3d>
-      <a:camera prst="orthographicFront"/>
-      <a:lightRig rig="threePt" dir="t"/>
-    </dgm:scene3d>
-    <dgm:sp3d/>
-    <dgm:txPr/>
-    <dgm:style>
-      <a:lnRef idx="2">
-        <a:scrgbClr r="0" g="0" b="0"/>
-      </a:lnRef>
-      <a:fillRef idx="1">
-        <a:scrgbClr r="0" g="0" b="0"/>
-      </a:fillRef>
-      <a:effectRef idx="0">
-        <a:scrgbClr r="0" g="0" b="0"/>
-      </a:effectRef>
-      <a:fontRef idx="minor"/>
-    </dgm:style>
-  </dgm:styleLbl>
-  <dgm:styleLbl name="fgAccFollowNode1">
-    <dgm:scene3d>
-      <a:camera prst="orthographicFront"/>
-      <a:lightRig rig="threePt" dir="t"/>
-    </dgm:scene3d>
-    <dgm:sp3d/>
-    <dgm:txPr/>
-    <dgm:style>
-      <a:lnRef idx="2">
-        <a:scrgbClr r="0" g="0" b="0"/>
-      </a:lnRef>
-      <a:fillRef idx="1">
-        <a:scrgbClr r="0" g="0" b="0"/>
-      </a:fillRef>
-      <a:effectRef idx="0">
-        <a:scrgbClr r="0" g="0" b="0"/>
-      </a:effectRef>
-      <a:fontRef idx="minor"/>
-    </dgm:style>
-  </dgm:styleLbl>
-  <dgm:styleLbl name="alignAccFollowNode1">
-    <dgm:scene3d>
-      <a:camera prst="orthographicFront"/>
-      <a:lightRig rig="threePt" dir="t"/>
-    </dgm:scene3d>
-    <dgm:sp3d/>
-    <dgm:txPr/>
-    <dgm:style>
-      <a:lnRef idx="2">
-        <a:scrgbClr r="0" g="0" b="0"/>
-      </a:lnRef>
-      <a:fillRef idx="1">
-        <a:scrgbClr r="0" g="0" b="0"/>
-      </a:fillRef>
-      <a:effectRef idx="0">
-        <a:scrgbClr r="0" g="0" b="0"/>
-      </a:effectRef>
-      <a:fontRef idx="minor"/>
-    </dgm:style>
-  </dgm:styleLbl>
-  <dgm:styleLbl name="bgAccFollowNode1">
-    <dgm:scene3d>
-      <a:camera prst="orthographicFront"/>
-      <a:lightRig rig="threePt" dir="t"/>
-    </dgm:scene3d>
-    <dgm:sp3d/>
-    <dgm:txPr/>
-    <dgm:style>
-      <a:lnRef idx="2">
-        <a:scrgbClr r="0" g="0" b="0"/>
-      </a:lnRef>
-      <a:fillRef idx="1">
-        <a:scrgbClr r="0" g="0" b="0"/>
-      </a:fillRef>
-      <a:effectRef idx="0">
-        <a:scrgbClr r="0" g="0" b="0"/>
-      </a:effectRef>
-      <a:fontRef idx="minor"/>
-    </dgm:style>
-  </dgm:styleLbl>
-  <dgm:styleLbl name="fgAcc0">
-    <dgm:scene3d>
-      <a:camera prst="orthographicFront"/>
-      <a:lightRig rig="threePt" dir="t"/>
-    </dgm:scene3d>
-    <dgm:sp3d/>
-    <dgm:txPr/>
-    <dgm:style>
-      <a:lnRef idx="2">
-        <a:scrgbClr r="0" g="0" b="0"/>
-      </a:lnRef>
-      <a:fillRef idx="1">
-        <a:scrgbClr r="0" g="0" b="0"/>
-      </a:fillRef>
-      <a:effectRef idx="0">
-        <a:scrgbClr r="0" g="0" b="0"/>
-      </a:effectRef>
-      <a:fontRef idx="minor"/>
-    </dgm:style>
-  </dgm:styleLbl>
-  <dgm:styleLbl name="fgAcc2">
-    <dgm:scene3d>
-      <a:camera prst="orthographicFront"/>
-      <a:lightRig rig="threePt" dir="t"/>
-    </dgm:scene3d>
-    <dgm:sp3d/>
-    <dgm:txPr/>
-    <dgm:style>
-      <a:lnRef idx="2">
-        <a:scrgbClr r="0" g="0" b="0"/>
-      </a:lnRef>
-      <a:fillRef idx="1">
-        <a:scrgbClr r="0" g="0" b="0"/>
-      </a:fillRef>
-      <a:effectRef idx="0">
-        <a:scrgbClr r="0" g="0" b="0"/>
-      </a:effectRef>
-      <a:fontRef idx="minor"/>
-    </dgm:style>
-  </dgm:styleLbl>
-  <dgm:styleLbl name="fgAcc3">
-    <dgm:scene3d>
-      <a:camera prst="orthographicFront"/>
-      <a:lightRig rig="threePt" dir="t"/>
-    </dgm:scene3d>
-    <dgm:sp3d/>
-    <dgm:txPr/>
-    <dgm:style>
-      <a:lnRef idx="2">
-        <a:scrgbClr r="0" g="0" b="0"/>
-      </a:lnRef>
-      <a:fillRef idx="1">
-        <a:scrgbClr r="0" g="0" b="0"/>
-      </a:fillRef>
-      <a:effectRef idx="0">
-        <a:scrgbClr r="0" g="0" b="0"/>
-      </a:effectRef>
-      <a:fontRef idx="minor"/>
-    </dgm:style>
-  </dgm:styleLbl>
-  <dgm:styleLbl name="fgAcc4">
-    <dgm:scene3d>
-      <a:camera prst="orthographicFront"/>
-      <a:lightRig rig="threePt" dir="t"/>
-    </dgm:scene3d>
-    <dgm:sp3d/>
-    <dgm:txPr/>
-    <dgm:style>
-      <a:lnRef idx="2">
-        <a:scrgbClr r="0" g="0" b="0"/>
-      </a:lnRef>
-      <a:fillRef idx="1">
-        <a:scrgbClr r="0" g="0" b="0"/>
-      </a:fillRef>
-      <a:effectRef idx="0">
-        <a:scrgbClr r="0" g="0" b="0"/>
-      </a:effectRef>
-      <a:fontRef idx="minor"/>
-    </dgm:style>
-  </dgm:styleLbl>
-  <dgm:styleLbl name="bgShp">
-    <dgm:scene3d>
-      <a:camera prst="orthographicFront"/>
-      <a:lightRig rig="threePt" dir="t"/>
-    </dgm:scene3d>
-    <dgm:sp3d/>
-    <dgm:txPr/>
-    <dgm:style>
-      <a:lnRef idx="0">
-        <a:scrgbClr r="0" g="0" b="0"/>
-      </a:lnRef>
-      <a:fillRef idx="1">
-        <a:scrgbClr r="0" g="0" b="0"/>
-      </a:fillRef>
-      <a:effectRef idx="0">
-        <a:scrgbClr r="0" g="0" b="0"/>
-      </a:effectRef>
-      <a:fontRef idx="minor"/>
-    </dgm:style>
-  </dgm:styleLbl>
-  <dgm:styleLbl name="dkBgShp">
-    <dgm:scene3d>
-      <a:camera prst="orthographicFront"/>
-      <a:lightRig rig="threePt" dir="t"/>
-    </dgm:scene3d>
-    <dgm:sp3d/>
-    <dgm:txPr/>
-    <dgm:style>
-      <a:lnRef idx="0">
-        <a:scrgbClr r="0" g="0" b="0"/>
-      </a:lnRef>
-      <a:fillRef idx="1">
-        <a:scrgbClr r="0" g="0" b="0"/>
-      </a:fillRef>
-      <a:effectRef idx="0">
-        <a:scrgbClr r="0" g="0" b="0"/>
-      </a:effectRef>
-      <a:fontRef idx="minor"/>
-    </dgm:style>
-  </dgm:styleLbl>
-  <dgm:styleLbl name="trBgShp">
-    <dgm:scene3d>
-      <a:camera prst="orthographicFront"/>
-      <a:lightRig rig="threePt" dir="t"/>
-    </dgm:scene3d>
-    <dgm:sp3d/>
-    <dgm:txPr/>
-    <dgm:style>
-      <a:lnRef idx="0">
-        <a:scrgbClr r="0" g="0" b="0"/>
-      </a:lnRef>
-      <a:fillRef idx="1">
-        <a:scrgbClr r="0" g="0" b="0"/>
-      </a:fillRef>
-      <a:effectRef idx="0">
-        <a:scrgbClr r="0" g="0" b="0"/>
-      </a:effectRef>
-      <a:fontRef idx="minor"/>
-    </dgm:style>
-  </dgm:styleLbl>
-  <dgm:styleLbl name="fgShp">
-    <dgm:scene3d>
-      <a:camera prst="orthographicFront"/>
-      <a:lightRig rig="threePt" dir="t"/>
-    </dgm:scene3d>
-    <dgm:sp3d/>
-    <dgm:txPr/>
-    <dgm:style>
-      <a:lnRef idx="2">
-        <a:scrgbClr r="0" g="0" b="0"/>
-      </a:lnRef>
-      <a:fillRef idx="1">
-        <a:scrgbClr r="0" g="0" b="0"/>
-      </a:fillRef>
-      <a:effectRef idx="0">
-        <a:scrgbClr r="0" g="0" b="0"/>
-      </a:effectRef>
-      <a:fontRef idx="minor"/>
-    </dgm:style>
-  </dgm:styleLbl>
-  <dgm:styleLbl name="revTx">
-    <dgm:scene3d>
-      <a:camera prst="orthographicFront"/>
-      <a:lightRig rig="threePt" dir="t"/>
-    </dgm:scene3d>
-    <dgm:sp3d/>
-    <dgm:txPr/>
-    <dgm:style>
-      <a:lnRef idx="0">
-        <a:scrgbClr r="0" g="0" b="0"/>
-      </a:lnRef>
-      <a:fillRef idx="0">
-        <a:scrgbClr r="0" g="0" b="0"/>
-      </a:fillRef>
-      <a:effectRef idx="0">
-        <a:scrgbClr r="0" g="0" b="0"/>
-      </a:effectRef>
-      <a:fontRef idx="minor"/>
-    </dgm:style>
-  </dgm:styleLbl>
-</dgm:styleDef>
-</file>
-
 <file path=ppt/handoutMasters/handoutMaster1.xml><?xml version="1.0" encoding="utf-8"?>
 <p:handoutMaster xmlns:a="http://schemas.openxmlformats.org/drawingml/2006/main" xmlns:r="http://schemas.openxmlformats.org/officeDocument/2006/relationships" xmlns:p="http://schemas.openxmlformats.org/presentationml/2006/main">
   <p:cSld>
@@ -10380,7 +7346,7 @@
             <a:pPr algn="r" rtl="0"/>
             <a:fld id="{4FD0811F-65A0-45DC-A418-D7D88257DA14}" type="datetime1">
               <a:rPr lang="fr-FR" smtClean="0"/>
-              <a:t>12/09/2019</a:t>
+              <a:t>16/09/2019</a:t>
             </a:fld>
             <a:endParaRPr lang="fr-FR" dirty="0"/>
           </a:p>
@@ -10550,7 +7516,7 @@
             <a:fld id="{869BCCB5-3197-42F0-A23E-FBF35BB6BD6D}" type="datetime1">
               <a:rPr lang="fr-FR" smtClean="0"/>
               <a:pPr/>
-              <a:t>12/09/2019</a:t>
+              <a:t>16/09/2019</a:t>
             </a:fld>
             <a:endParaRPr lang="fr-FR" dirty="0"/>
           </a:p>
@@ -11156,7 +8122,7 @@
             <a:fld id="{C169FE22-A35D-4AA5-9ED0-CA5AA0D08EE7}" type="datetime1">
               <a:rPr lang="fr-FR" smtClean="0"/>
               <a:pPr/>
-              <a:t>12/09/2019</a:t>
+              <a:t>16/09/2019</a:t>
             </a:fld>
             <a:endParaRPr lang="fr-FR" dirty="0"/>
           </a:p>
@@ -11356,7 +8322,7 @@
             <a:fld id="{4B2D50EC-F18A-4356-A82F-ED015F56C2C6}" type="datetime1">
               <a:rPr lang="fr-FR" smtClean="0"/>
               <a:pPr/>
-              <a:t>12/09/2019</a:t>
+              <a:t>16/09/2019</a:t>
             </a:fld>
             <a:endParaRPr lang="fr-FR" dirty="0"/>
           </a:p>
@@ -11553,7 +8519,7 @@
             <a:fld id="{D8AB5196-52B1-4918-B153-34A0C9A4A7AD}" type="datetime1">
               <a:rPr lang="fr-FR" smtClean="0"/>
               <a:pPr/>
-              <a:t>12/09/2019</a:t>
+              <a:t>16/09/2019</a:t>
             </a:fld>
             <a:endParaRPr lang="fr-FR" dirty="0"/>
           </a:p>
@@ -11841,7 +8807,7 @@
             <a:fld id="{7399499F-CA45-4A76-BC24-F973E24AC3FB}" type="datetime1">
               <a:rPr lang="fr-FR" smtClean="0"/>
               <a:pPr/>
-              <a:t>12/09/2019</a:t>
+              <a:t>16/09/2019</a:t>
             </a:fld>
             <a:endParaRPr lang="fr-FR" dirty="0"/>
           </a:p>
@@ -12153,7 +9119,7 @@
             <a:fld id="{3817870C-A0A5-4D92-B86D-C2791EFA3A23}" type="datetime1">
               <a:rPr lang="fr-FR" smtClean="0"/>
               <a:pPr/>
-              <a:t>12/09/2019</a:t>
+              <a:t>16/09/2019</a:t>
             </a:fld>
             <a:endParaRPr lang="fr-FR" dirty="0"/>
           </a:p>
@@ -12621,7 +9587,7 @@
             <a:fld id="{812A7B89-83CE-4355-8D19-9AD5D8179E27}" type="datetime1">
               <a:rPr lang="fr-FR" smtClean="0"/>
               <a:pPr/>
-              <a:t>12/09/2019</a:t>
+              <a:t>16/09/2019</a:t>
             </a:fld>
             <a:endParaRPr lang="fr-FR" dirty="0"/>
           </a:p>
@@ -12763,7 +9729,7 @@
             <a:fld id="{EA4593A4-CD22-4D89-9631-B432485C88BE}" type="datetime1">
               <a:rPr lang="fr-FR" smtClean="0"/>
               <a:pPr/>
-              <a:t>12/09/2019</a:t>
+              <a:t>16/09/2019</a:t>
             </a:fld>
             <a:endParaRPr lang="fr-FR" dirty="0"/>
           </a:p>
@@ -12885,7 +9851,7 @@
             <a:fld id="{88F3045D-8AE6-4E47-932F-47FA387FEA34}" type="datetime1">
               <a:rPr lang="fr-FR" smtClean="0"/>
               <a:pPr/>
-              <a:t>12/09/2019</a:t>
+              <a:t>16/09/2019</a:t>
             </a:fld>
             <a:endParaRPr lang="fr-FR" dirty="0"/>
           </a:p>
@@ -13215,7 +10181,7 @@
             <a:fld id="{2282C9DA-93FE-4DDE-8920-2C8AB1F5E18A}" type="datetime1">
               <a:rPr lang="fr-FR" smtClean="0"/>
               <a:pPr/>
-              <a:t>12/09/2019</a:t>
+              <a:t>16/09/2019</a:t>
             </a:fld>
             <a:endParaRPr lang="fr-FR" dirty="0"/>
           </a:p>
@@ -13535,7 +10501,7 @@
             <a:fld id="{EB002A6A-F78C-474F-BA6B-17AE42EC613D}" type="datetime1">
               <a:rPr lang="fr-FR" smtClean="0"/>
               <a:pPr/>
-              <a:t>12/09/2019</a:t>
+              <a:t>16/09/2019</a:t>
             </a:fld>
             <a:endParaRPr lang="fr-FR" dirty="0"/>
           </a:p>
@@ -13772,7 +10738,7 @@
             <a:fld id="{B1406553-4B01-4903-B663-70E503E45D52}" type="datetime1">
               <a:rPr lang="fr-FR" smtClean="0"/>
               <a:pPr/>
-              <a:t>12/09/2019</a:t>
+              <a:t>16/09/2019</a:t>
             </a:fld>
             <a:endParaRPr lang="fr-FR" dirty="0"/>
           </a:p>
@@ -14363,110 +11329,6 @@
           <a:chExt cx="0" cy="0"/>
         </a:xfrm>
       </p:grpSpPr>
-      <p:graphicFrame>
-        <p:nvGraphicFramePr>
-          <p:cNvPr id="4" name="Diagramme 3">
-            <a:extLst>
-              <a:ext uri="{FF2B5EF4-FFF2-40B4-BE49-F238E27FC236}">
-                <a16:creationId xmlns:a16="http://schemas.microsoft.com/office/drawing/2014/main" id="{CE674F48-E742-40F7-B3A8-13DFDBD03553}"/>
-              </a:ext>
-            </a:extLst>
-          </p:cNvPr>
-          <p:cNvGraphicFramePr/>
-          <p:nvPr>
-            <p:extLst>
-              <p:ext uri="{D42A27DB-BD31-4B8C-83A1-F6EECF244321}">
-                <p14:modId xmlns:p14="http://schemas.microsoft.com/office/powerpoint/2010/main" val="3296340266"/>
-              </p:ext>
-            </p:extLst>
-          </p:nvPr>
-        </p:nvGraphicFramePr>
-        <p:xfrm>
-          <a:off x="1629916" y="1045535"/>
-          <a:ext cx="8125883" cy="5417256"/>
-        </p:xfrm>
-        <a:graphic>
-          <a:graphicData uri="http://schemas.openxmlformats.org/drawingml/2006/diagram">
-            <dgm:relIds xmlns:dgm="http://schemas.openxmlformats.org/drawingml/2006/diagram" xmlns:r="http://schemas.openxmlformats.org/officeDocument/2006/relationships" r:dm="rId2" r:lo="rId3" r:qs="rId4" r:cs="rId5"/>
-          </a:graphicData>
-        </a:graphic>
-      </p:graphicFrame>
-      <p:sp>
-        <p:nvSpPr>
-          <p:cNvPr id="5" name="Titre 1">
-            <a:extLst>
-              <a:ext uri="{FF2B5EF4-FFF2-40B4-BE49-F238E27FC236}">
-                <a16:creationId xmlns:a16="http://schemas.microsoft.com/office/drawing/2014/main" id="{A781BE91-6A8E-4D7D-9275-E4DC074CC5F7}"/>
-              </a:ext>
-            </a:extLst>
-          </p:cNvPr>
-          <p:cNvSpPr>
-            <a:spLocks noGrp="1"/>
-          </p:cNvSpPr>
-          <p:nvPr>
-            <p:ph type="title"/>
-          </p:nvPr>
-        </p:nvSpPr>
-        <p:spPr>
-          <a:xfrm>
-            <a:off x="1522413" y="359735"/>
-            <a:ext cx="9144001" cy="1371600"/>
-          </a:xfrm>
-        </p:spPr>
-        <p:txBody>
-          <a:bodyPr anchor="t"/>
-          <a:lstStyle/>
-          <a:p>
-            <a:pPr algn="ctr"/>
-            <a:r>
-              <a:rPr lang="fr-FR" dirty="0"/>
-              <a:t>L’architecture du site</a:t>
-            </a:r>
-          </a:p>
-        </p:txBody>
-      </p:sp>
-    </p:spTree>
-    <p:extLst>
-      <p:ext uri="{BB962C8B-B14F-4D97-AF65-F5344CB8AC3E}">
-        <p14:creationId xmlns:p14="http://schemas.microsoft.com/office/powerpoint/2010/main" val="2918469709"/>
-      </p:ext>
-    </p:extLst>
-  </p:cSld>
-  <p:clrMapOvr>
-    <a:masterClrMapping/>
-  </p:clrMapOvr>
-  <mc:AlternateContent xmlns:mc="http://schemas.openxmlformats.org/markup-compatibility/2006" xmlns:p14="http://schemas.microsoft.com/office/powerpoint/2010/main">
-    <mc:Choice Requires="p14">
-      <p:transition spd="med" p14:dur="700">
-        <p:fade/>
-      </p:transition>
-    </mc:Choice>
-    <mc:Fallback xmlns="">
-      <p:transition spd="med">
-        <p:fade/>
-      </p:transition>
-    </mc:Fallback>
-  </mc:AlternateContent>
-</p:sld>
-</file>
-
-<file path=ppt/slides/slide11.xml><?xml version="1.0" encoding="utf-8"?>
-<p:sld xmlns:a="http://schemas.openxmlformats.org/drawingml/2006/main" xmlns:r="http://schemas.openxmlformats.org/officeDocument/2006/relationships" xmlns:p="http://schemas.openxmlformats.org/presentationml/2006/main">
-  <p:cSld>
-    <p:spTree>
-      <p:nvGrpSpPr>
-        <p:cNvPr id="1" name=""/>
-        <p:cNvGrpSpPr/>
-        <p:nvPr/>
-      </p:nvGrpSpPr>
-      <p:grpSpPr>
-        <a:xfrm>
-          <a:off x="0" y="0"/>
-          <a:ext cx="0" cy="0"/>
-          <a:chOff x="0" y="0"/>
-          <a:chExt cx="0" cy="0"/>
-        </a:xfrm>
-      </p:grpSpPr>
       <p:sp>
         <p:nvSpPr>
           <p:cNvPr id="5" name="Titre 1">
@@ -14514,7 +11376,7 @@
           <p:nvPr>
             <p:extLst>
               <p:ext uri="{D42A27DB-BD31-4B8C-83A1-F6EECF244321}">
-                <p14:modId xmlns:p14="http://schemas.microsoft.com/office/powerpoint/2010/main" val="2336467344"/>
+                <p14:modId xmlns:p14="http://schemas.microsoft.com/office/powerpoint/2010/main" val="1403348329"/>
               </p:ext>
             </p:extLst>
           </p:nvPr>
@@ -14533,6 +11395,112 @@
     <p:extLst>
       <p:ext uri="{BB962C8B-B14F-4D97-AF65-F5344CB8AC3E}">
         <p14:creationId xmlns:p14="http://schemas.microsoft.com/office/powerpoint/2010/main" val="615104864"/>
+      </p:ext>
+    </p:extLst>
+  </p:cSld>
+  <p:clrMapOvr>
+    <a:masterClrMapping/>
+  </p:clrMapOvr>
+  <mc:AlternateContent xmlns:mc="http://schemas.openxmlformats.org/markup-compatibility/2006" xmlns:p14="http://schemas.microsoft.com/office/powerpoint/2010/main">
+    <mc:Choice Requires="p14">
+      <p:transition spd="med" p14:dur="700">
+        <p:fade/>
+      </p:transition>
+    </mc:Choice>
+    <mc:Fallback xmlns="">
+      <p:transition spd="med">
+        <p:fade/>
+      </p:transition>
+    </mc:Fallback>
+  </mc:AlternateContent>
+</p:sld>
+</file>
+
+<file path=ppt/slides/slide11.xml><?xml version="1.0" encoding="utf-8"?>
+<p:sld xmlns:a="http://schemas.openxmlformats.org/drawingml/2006/main" xmlns:r="http://schemas.openxmlformats.org/officeDocument/2006/relationships" xmlns:p="http://schemas.openxmlformats.org/presentationml/2006/main">
+  <p:cSld>
+    <p:spTree>
+      <p:nvGrpSpPr>
+        <p:cNvPr id="1" name=""/>
+        <p:cNvGrpSpPr/>
+        <p:nvPr/>
+      </p:nvGrpSpPr>
+      <p:grpSpPr>
+        <a:xfrm>
+          <a:off x="0" y="0"/>
+          <a:ext cx="0" cy="0"/>
+          <a:chOff x="0" y="0"/>
+          <a:chExt cx="0" cy="0"/>
+        </a:xfrm>
+      </p:grpSpPr>
+      <p:sp>
+        <p:nvSpPr>
+          <p:cNvPr id="2" name="Titre 1"/>
+          <p:cNvSpPr>
+            <a:spLocks noGrp="1"/>
+          </p:cNvSpPr>
+          <p:nvPr>
+            <p:ph type="title"/>
+          </p:nvPr>
+        </p:nvSpPr>
+        <p:spPr>
+          <a:xfrm>
+            <a:off x="1522413" y="359735"/>
+            <a:ext cx="9144001" cy="1371600"/>
+          </a:xfrm>
+        </p:spPr>
+        <p:txBody>
+          <a:bodyPr anchor="t"/>
+          <a:lstStyle/>
+          <a:p>
+            <a:pPr algn="ctr"/>
+            <a:r>
+              <a:rPr lang="fr-FR" dirty="0"/>
+              <a:t>Base de données</a:t>
+            </a:r>
+          </a:p>
+        </p:txBody>
+      </p:sp>
+      <p:pic>
+        <p:nvPicPr>
+          <p:cNvPr id="34" name="Image 33">
+            <a:extLst>
+              <a:ext uri="{FF2B5EF4-FFF2-40B4-BE49-F238E27FC236}">
+                <a16:creationId xmlns:a16="http://schemas.microsoft.com/office/drawing/2014/main" id="{3BF00DBC-A592-4C8B-A556-2B23E2011257}"/>
+              </a:ext>
+            </a:extLst>
+          </p:cNvPr>
+          <p:cNvPicPr>
+            <a:picLocks noChangeAspect="1"/>
+          </p:cNvPicPr>
+          <p:nvPr/>
+        </p:nvPicPr>
+        <p:blipFill>
+          <a:blip r:embed="rId2">
+            <a:extLst>
+              <a:ext uri="{28A0092B-C50C-407E-A947-70E740481C1C}">
+                <a14:useLocalDpi xmlns:a14="http://schemas.microsoft.com/office/drawing/2010/main" val="0"/>
+              </a:ext>
+            </a:extLst>
+          </a:blip>
+          <a:stretch>
+            <a:fillRect/>
+          </a:stretch>
+        </p:blipFill>
+        <p:spPr>
+          <a:xfrm>
+            <a:off x="1593912" y="1045535"/>
+            <a:ext cx="9001000" cy="5630625"/>
+          </a:xfrm>
+          <a:prstGeom prst="rect">
+            <a:avLst/>
+          </a:prstGeom>
+        </p:spPr>
+      </p:pic>
+    </p:spTree>
+    <p:extLst>
+      <p:ext uri="{BB962C8B-B14F-4D97-AF65-F5344CB8AC3E}">
+        <p14:creationId xmlns:p14="http://schemas.microsoft.com/office/powerpoint/2010/main" val="2900554787"/>
       </p:ext>
     </p:extLst>
   </p:cSld>
@@ -14798,7 +11766,7 @@
                 <a:latin typeface="Calibri" panose="020F0502020204030204" pitchFamily="34" charset="0"/>
                 <a:sym typeface="Wingdings" panose="05000000000000000000" pitchFamily="2" charset="2"/>
               </a:rPr>
-              <a:t>Transformation en PWA ( Progressive Web App )</a:t>
+              <a:t>Notifications et transformation en PWA ( Progressive Web App )</a:t>
             </a:r>
           </a:p>
           <a:p>
@@ -14847,6 +11815,15 @@
             </a:r>
           </a:p>
           <a:p>
+            <a:r>
+              <a:rPr lang="fr-FR" dirty="0">
+                <a:latin typeface="Calibri" panose="020F0502020204030204" pitchFamily="34" charset="0"/>
+                <a:sym typeface="Wingdings" panose="05000000000000000000" pitchFamily="2" charset="2"/>
+              </a:rPr>
+              <a:t>CRUD pour améliorer l’administration</a:t>
+            </a:r>
+          </a:p>
+          <a:p>
             <a:endParaRPr lang="fr-FR" dirty="0">
               <a:latin typeface="Calibri" panose="020F0502020204030204" pitchFamily="34" charset="0"/>
             </a:endParaRPr>
@@ -14857,486 +11834,6 @@
     <p:extLst>
       <p:ext uri="{BB962C8B-B14F-4D97-AF65-F5344CB8AC3E}">
         <p14:creationId xmlns:p14="http://schemas.microsoft.com/office/powerpoint/2010/main" val="168796"/>
-      </p:ext>
-    </p:extLst>
-  </p:cSld>
-  <p:clrMapOvr>
-    <a:masterClrMapping/>
-  </p:clrMapOvr>
-  <mc:AlternateContent xmlns:mc="http://schemas.openxmlformats.org/markup-compatibility/2006" xmlns:p14="http://schemas.microsoft.com/office/powerpoint/2010/main">
-    <mc:Choice Requires="p14">
-      <p:transition spd="med" p14:dur="700">
-        <p:fade/>
-      </p:transition>
-    </mc:Choice>
-    <mc:Fallback xmlns="">
-      <p:transition spd="med">
-        <p:fade/>
-      </p:transition>
-    </mc:Fallback>
-  </mc:AlternateContent>
-</p:sld>
-</file>
-
-<file path=ppt/slides/slide15.xml><?xml version="1.0" encoding="utf-8"?>
-<p:sld xmlns:a="http://schemas.openxmlformats.org/drawingml/2006/main" xmlns:r="http://schemas.openxmlformats.org/officeDocument/2006/relationships" xmlns:p="http://schemas.openxmlformats.org/presentationml/2006/main">
-  <p:cSld>
-    <p:spTree>
-      <p:nvGrpSpPr>
-        <p:cNvPr id="1" name=""/>
-        <p:cNvGrpSpPr/>
-        <p:nvPr/>
-      </p:nvGrpSpPr>
-      <p:grpSpPr>
-        <a:xfrm>
-          <a:off x="0" y="0"/>
-          <a:ext cx="0" cy="0"/>
-          <a:chOff x="0" y="0"/>
-          <a:chExt cx="0" cy="0"/>
-        </a:xfrm>
-      </p:grpSpPr>
-      <p:sp>
-        <p:nvSpPr>
-          <p:cNvPr id="2" name="Titre 1"/>
-          <p:cNvSpPr>
-            <a:spLocks noGrp="1"/>
-          </p:cNvSpPr>
-          <p:nvPr>
-            <p:ph type="title"/>
-          </p:nvPr>
-        </p:nvSpPr>
-        <p:spPr/>
-        <p:txBody>
-          <a:bodyPr anchor="t"/>
-          <a:lstStyle/>
-          <a:p>
-            <a:pPr algn="ctr"/>
-            <a:r>
-              <a:rPr lang="fr-FR" dirty="0"/>
-              <a:t>Mes outils</a:t>
-            </a:r>
-          </a:p>
-        </p:txBody>
-      </p:sp>
-      <p:pic>
-        <p:nvPicPr>
-          <p:cNvPr id="1026" name="Picture 2" descr="RÃ©sultat de recherche d'images pour &quot;laravel&quot;">
-            <a:extLst>
-              <a:ext uri="{FF2B5EF4-FFF2-40B4-BE49-F238E27FC236}">
-                <a16:creationId xmlns:a16="http://schemas.microsoft.com/office/drawing/2014/main" id="{22F6204E-995F-403D-9018-29F614C326F7}"/>
-              </a:ext>
-            </a:extLst>
-          </p:cNvPr>
-          <p:cNvPicPr>
-            <a:picLocks noChangeAspect="1" noChangeArrowheads="1"/>
-          </p:cNvPicPr>
-          <p:nvPr/>
-        </p:nvPicPr>
-        <p:blipFill>
-          <a:blip r:embed="rId2">
-            <a:extLst>
-              <a:ext uri="{28A0092B-C50C-407E-A947-70E740481C1C}">
-                <a14:useLocalDpi xmlns:a14="http://schemas.microsoft.com/office/drawing/2010/main" val="0"/>
-              </a:ext>
-            </a:extLst>
-          </a:blip>
-          <a:srcRect/>
-          <a:stretch>
-            <a:fillRect/>
-          </a:stretch>
-        </p:blipFill>
-        <p:spPr bwMode="auto">
-          <a:xfrm>
-            <a:off x="6923908" y="1102281"/>
-            <a:ext cx="1904999" cy="1904999"/>
-          </a:xfrm>
-          <a:prstGeom prst="rect">
-            <a:avLst/>
-          </a:prstGeom>
-          <a:noFill/>
-          <a:extLst>
-            <a:ext uri="{909E8E84-426E-40DD-AFC4-6F175D3DCCD1}">
-              <a14:hiddenFill xmlns:a14="http://schemas.microsoft.com/office/drawing/2010/main">
-                <a:solidFill>
-                  <a:srgbClr val="FFFFFF"/>
-                </a:solidFill>
-              </a14:hiddenFill>
-            </a:ext>
-          </a:extLst>
-        </p:spPr>
-      </p:pic>
-      <p:pic>
-        <p:nvPicPr>
-          <p:cNvPr id="1032" name="Picture 8" descr="RÃ©sultat de recherche d'images pour &quot;bootstrap&quot;">
-            <a:extLst>
-              <a:ext uri="{FF2B5EF4-FFF2-40B4-BE49-F238E27FC236}">
-                <a16:creationId xmlns:a16="http://schemas.microsoft.com/office/drawing/2014/main" id="{82650EBD-1954-4BF2-A121-CF037BC282B3}"/>
-              </a:ext>
-            </a:extLst>
-          </p:cNvPr>
-          <p:cNvPicPr>
-            <a:picLocks noChangeAspect="1" noChangeArrowheads="1"/>
-          </p:cNvPicPr>
-          <p:nvPr/>
-        </p:nvPicPr>
-        <p:blipFill>
-          <a:blip r:embed="rId3" cstate="print">
-            <a:extLst>
-              <a:ext uri="{28A0092B-C50C-407E-A947-70E740481C1C}">
-                <a14:useLocalDpi xmlns:a14="http://schemas.microsoft.com/office/drawing/2010/main" val="0"/>
-              </a:ext>
-            </a:extLst>
-          </a:blip>
-          <a:srcRect/>
-          <a:stretch>
-            <a:fillRect/>
-          </a:stretch>
-        </p:blipFill>
-        <p:spPr bwMode="auto">
-          <a:xfrm>
-            <a:off x="6272119" y="3394575"/>
-            <a:ext cx="3208576" cy="1453847"/>
-          </a:xfrm>
-          <a:prstGeom prst="rect">
-            <a:avLst/>
-          </a:prstGeom>
-          <a:noFill/>
-          <a:extLst>
-            <a:ext uri="{909E8E84-426E-40DD-AFC4-6F175D3DCCD1}">
-              <a14:hiddenFill xmlns:a14="http://schemas.microsoft.com/office/drawing/2010/main">
-                <a:solidFill>
-                  <a:srgbClr val="FFFFFF"/>
-                </a:solidFill>
-              </a14:hiddenFill>
-            </a:ext>
-          </a:extLst>
-        </p:spPr>
-      </p:pic>
-      <p:pic>
-        <p:nvPicPr>
-          <p:cNvPr id="1038" name="Picture 14" descr="RÃ©sultat de recherche d'images pour &quot;fontawesome logo&quot;">
-            <a:extLst>
-              <a:ext uri="{FF2B5EF4-FFF2-40B4-BE49-F238E27FC236}">
-                <a16:creationId xmlns:a16="http://schemas.microsoft.com/office/drawing/2014/main" id="{FA0A33DC-4C85-4E8C-BFD4-40C2D86756A5}"/>
-              </a:ext>
-            </a:extLst>
-          </p:cNvPr>
-          <p:cNvPicPr>
-            <a:picLocks noChangeAspect="1" noChangeArrowheads="1"/>
-          </p:cNvPicPr>
-          <p:nvPr/>
-        </p:nvPicPr>
-        <p:blipFill>
-          <a:blip r:embed="rId4">
-            <a:extLst>
-              <a:ext uri="{28A0092B-C50C-407E-A947-70E740481C1C}">
-                <a14:useLocalDpi xmlns:a14="http://schemas.microsoft.com/office/drawing/2010/main" val="0"/>
-              </a:ext>
-            </a:extLst>
-          </a:blip>
-          <a:srcRect/>
-          <a:stretch>
-            <a:fillRect/>
-          </a:stretch>
-        </p:blipFill>
-        <p:spPr bwMode="auto">
-          <a:xfrm>
-            <a:off x="9444863" y="1305292"/>
-            <a:ext cx="1490328" cy="1490328"/>
-          </a:xfrm>
-          <a:prstGeom prst="rect">
-            <a:avLst/>
-          </a:prstGeom>
-          <a:noFill/>
-          <a:extLst>
-            <a:ext uri="{909E8E84-426E-40DD-AFC4-6F175D3DCCD1}">
-              <a14:hiddenFill xmlns:a14="http://schemas.microsoft.com/office/drawing/2010/main">
-                <a:solidFill>
-                  <a:srgbClr val="FFFFFF"/>
-                </a:solidFill>
-              </a14:hiddenFill>
-            </a:ext>
-          </a:extLst>
-        </p:spPr>
-      </p:pic>
-      <p:pic>
-        <p:nvPicPr>
-          <p:cNvPr id="6" name="Image 5">
-            <a:extLst>
-              <a:ext uri="{FF2B5EF4-FFF2-40B4-BE49-F238E27FC236}">
-                <a16:creationId xmlns:a16="http://schemas.microsoft.com/office/drawing/2014/main" id="{9F517ECC-F998-42A9-8089-908CEE030F11}"/>
-              </a:ext>
-            </a:extLst>
-          </p:cNvPr>
-          <p:cNvPicPr>
-            <a:picLocks noChangeAspect="1"/>
-          </p:cNvPicPr>
-          <p:nvPr/>
-        </p:nvPicPr>
-        <p:blipFill>
-          <a:blip r:embed="rId5">
-            <a:extLst>
-              <a:ext uri="{28A0092B-C50C-407E-A947-70E740481C1C}">
-                <a14:useLocalDpi xmlns:a14="http://schemas.microsoft.com/office/drawing/2010/main" val="0"/>
-              </a:ext>
-            </a:extLst>
-          </a:blip>
-          <a:stretch>
-            <a:fillRect/>
-          </a:stretch>
-        </p:blipFill>
-        <p:spPr>
-          <a:xfrm>
-            <a:off x="828398" y="1235415"/>
-            <a:ext cx="1495634" cy="1486107"/>
-          </a:xfrm>
-          <a:prstGeom prst="rect">
-            <a:avLst/>
-          </a:prstGeom>
-        </p:spPr>
-      </p:pic>
-      <p:pic>
-        <p:nvPicPr>
-          <p:cNvPr id="8" name="Image 7" descr="Une image contenant texte, signe&#10;&#10;Description générée automatiquement">
-            <a:extLst>
-              <a:ext uri="{FF2B5EF4-FFF2-40B4-BE49-F238E27FC236}">
-                <a16:creationId xmlns:a16="http://schemas.microsoft.com/office/drawing/2014/main" id="{1ED49972-73A3-4BFA-AB94-18B311B035CF}"/>
-              </a:ext>
-            </a:extLst>
-          </p:cNvPr>
-          <p:cNvPicPr>
-            <a:picLocks noChangeAspect="1"/>
-          </p:cNvPicPr>
-          <p:nvPr/>
-        </p:nvPicPr>
-        <p:blipFill>
-          <a:blip r:embed="rId6">
-            <a:extLst>
-              <a:ext uri="{28A0092B-C50C-407E-A947-70E740481C1C}">
-                <a14:useLocalDpi xmlns:a14="http://schemas.microsoft.com/office/drawing/2010/main" val="0"/>
-              </a:ext>
-            </a:extLst>
-          </a:blip>
-          <a:stretch>
-            <a:fillRect/>
-          </a:stretch>
-        </p:blipFill>
-        <p:spPr>
-          <a:xfrm>
-            <a:off x="760118" y="3687450"/>
-            <a:ext cx="2232248" cy="868096"/>
-          </a:xfrm>
-          <a:prstGeom prst="rect">
-            <a:avLst/>
-          </a:prstGeom>
-        </p:spPr>
-      </p:pic>
-      <p:pic>
-        <p:nvPicPr>
-          <p:cNvPr id="10" name="Image 9">
-            <a:extLst>
-              <a:ext uri="{FF2B5EF4-FFF2-40B4-BE49-F238E27FC236}">
-                <a16:creationId xmlns:a16="http://schemas.microsoft.com/office/drawing/2014/main" id="{7C0BD8D6-DD17-42D3-ACE7-859FE4BCF9BD}"/>
-              </a:ext>
-            </a:extLst>
-          </p:cNvPr>
-          <p:cNvPicPr>
-            <a:picLocks noChangeAspect="1"/>
-          </p:cNvPicPr>
-          <p:nvPr/>
-        </p:nvPicPr>
-        <p:blipFill>
-          <a:blip r:embed="rId7">
-            <a:extLst>
-              <a:ext uri="{28A0092B-C50C-407E-A947-70E740481C1C}">
-                <a14:useLocalDpi xmlns:a14="http://schemas.microsoft.com/office/drawing/2010/main" val="0"/>
-              </a:ext>
-            </a:extLst>
-          </a:blip>
-          <a:stretch>
-            <a:fillRect/>
-          </a:stretch>
-        </p:blipFill>
-        <p:spPr>
-          <a:xfrm>
-            <a:off x="3158703" y="1061487"/>
-            <a:ext cx="3149249" cy="1659740"/>
-          </a:xfrm>
-          <a:prstGeom prst="rect">
-            <a:avLst/>
-          </a:prstGeom>
-        </p:spPr>
-      </p:pic>
-      <p:pic>
-        <p:nvPicPr>
-          <p:cNvPr id="1044" name="Picture 20" descr="RÃ©sultat de recherche d'images pour &quot;php&quot;">
-            <a:extLst>
-              <a:ext uri="{FF2B5EF4-FFF2-40B4-BE49-F238E27FC236}">
-                <a16:creationId xmlns:a16="http://schemas.microsoft.com/office/drawing/2014/main" id="{1EBB4F7E-8168-4486-8238-392D4C331C87}"/>
-              </a:ext>
-            </a:extLst>
-          </p:cNvPr>
-          <p:cNvPicPr>
-            <a:picLocks noChangeAspect="1" noChangeArrowheads="1"/>
-          </p:cNvPicPr>
-          <p:nvPr/>
-        </p:nvPicPr>
-        <p:blipFill>
-          <a:blip r:embed="rId8" cstate="print">
-            <a:extLst>
-              <a:ext uri="{28A0092B-C50C-407E-A947-70E740481C1C}">
-                <a14:useLocalDpi xmlns:a14="http://schemas.microsoft.com/office/drawing/2010/main" val="0"/>
-              </a:ext>
-            </a:extLst>
-          </a:blip>
-          <a:srcRect/>
-          <a:stretch>
-            <a:fillRect/>
-          </a:stretch>
-        </p:blipFill>
-        <p:spPr bwMode="auto">
-          <a:xfrm>
-            <a:off x="8718209" y="3385589"/>
-            <a:ext cx="2943635" cy="1471818"/>
-          </a:xfrm>
-          <a:prstGeom prst="rect">
-            <a:avLst/>
-          </a:prstGeom>
-          <a:noFill/>
-          <a:extLst>
-            <a:ext uri="{909E8E84-426E-40DD-AFC4-6F175D3DCCD1}">
-              <a14:hiddenFill xmlns:a14="http://schemas.microsoft.com/office/drawing/2010/main">
-                <a:solidFill>
-                  <a:srgbClr val="FFFFFF"/>
-                </a:solidFill>
-              </a14:hiddenFill>
-            </a:ext>
-          </a:extLst>
-        </p:spPr>
-      </p:pic>
-      <p:pic>
-        <p:nvPicPr>
-          <p:cNvPr id="1050" name="Picture 26" descr="RÃ©sultat de recherche d'images pour &quot;phpstorm&quot;">
-            <a:extLst>
-              <a:ext uri="{FF2B5EF4-FFF2-40B4-BE49-F238E27FC236}">
-                <a16:creationId xmlns:a16="http://schemas.microsoft.com/office/drawing/2014/main" id="{160A817C-97C1-415F-A1E7-CCE002488011}"/>
-              </a:ext>
-            </a:extLst>
-          </p:cNvPr>
-          <p:cNvPicPr>
-            <a:picLocks noChangeAspect="1" noChangeArrowheads="1"/>
-          </p:cNvPicPr>
-          <p:nvPr/>
-        </p:nvPicPr>
-        <p:blipFill>
-          <a:blip r:embed="rId9" cstate="print">
-            <a:extLst>
-              <a:ext uri="{28A0092B-C50C-407E-A947-70E740481C1C}">
-                <a14:useLocalDpi xmlns:a14="http://schemas.microsoft.com/office/drawing/2010/main" val="0"/>
-              </a:ext>
-            </a:extLst>
-          </a:blip>
-          <a:srcRect/>
-          <a:stretch>
-            <a:fillRect/>
-          </a:stretch>
-        </p:blipFill>
-        <p:spPr bwMode="auto">
-          <a:xfrm>
-            <a:off x="3885525" y="3404641"/>
-            <a:ext cx="1515226" cy="1515226"/>
-          </a:xfrm>
-          <a:prstGeom prst="rect">
-            <a:avLst/>
-          </a:prstGeom>
-          <a:noFill/>
-          <a:extLst>
-            <a:ext uri="{909E8E84-426E-40DD-AFC4-6F175D3DCCD1}">
-              <a14:hiddenFill xmlns:a14="http://schemas.microsoft.com/office/drawing/2010/main">
-                <a:solidFill>
-                  <a:srgbClr val="FFFFFF"/>
-                </a:solidFill>
-              </a14:hiddenFill>
-            </a:ext>
-          </a:extLst>
-        </p:spPr>
-      </p:pic>
-      <p:pic>
-        <p:nvPicPr>
-          <p:cNvPr id="12" name="Image 11" descr="Une image contenant clipart&#10;&#10;Description générée automatiquement">
-            <a:extLst>
-              <a:ext uri="{FF2B5EF4-FFF2-40B4-BE49-F238E27FC236}">
-                <a16:creationId xmlns:a16="http://schemas.microsoft.com/office/drawing/2014/main" id="{97D2C100-DC90-4FD3-BDC7-B099ED9889E6}"/>
-              </a:ext>
-            </a:extLst>
-          </p:cNvPr>
-          <p:cNvPicPr>
-            <a:picLocks noChangeAspect="1"/>
-          </p:cNvPicPr>
-          <p:nvPr/>
-        </p:nvPicPr>
-        <p:blipFill>
-          <a:blip r:embed="rId10">
-            <a:extLst>
-              <a:ext uri="{28A0092B-C50C-407E-A947-70E740481C1C}">
-                <a14:useLocalDpi xmlns:a14="http://schemas.microsoft.com/office/drawing/2010/main" val="0"/>
-              </a:ext>
-            </a:extLst>
-          </a:blip>
-          <a:stretch>
-            <a:fillRect/>
-          </a:stretch>
-        </p:blipFill>
-        <p:spPr>
-          <a:xfrm>
-            <a:off x="7570740" y="5458849"/>
-            <a:ext cx="2943636" cy="771633"/>
-          </a:xfrm>
-          <a:prstGeom prst="rect">
-            <a:avLst/>
-          </a:prstGeom>
-        </p:spPr>
-      </p:pic>
-      <p:pic>
-        <p:nvPicPr>
-          <p:cNvPr id="14" name="Image 13">
-            <a:extLst>
-              <a:ext uri="{FF2B5EF4-FFF2-40B4-BE49-F238E27FC236}">
-                <a16:creationId xmlns:a16="http://schemas.microsoft.com/office/drawing/2014/main" id="{A87C0993-6497-41E7-B385-1D35677C63B1}"/>
-              </a:ext>
-            </a:extLst>
-          </p:cNvPr>
-          <p:cNvPicPr>
-            <a:picLocks noChangeAspect="1"/>
-          </p:cNvPicPr>
-          <p:nvPr/>
-        </p:nvPicPr>
-        <p:blipFill>
-          <a:blip r:embed="rId11">
-            <a:extLst>
-              <a:ext uri="{28A0092B-C50C-407E-A947-70E740481C1C}">
-                <a14:useLocalDpi xmlns:a14="http://schemas.microsoft.com/office/drawing/2010/main" val="0"/>
-              </a:ext>
-            </a:extLst>
-          </a:blip>
-          <a:stretch>
-            <a:fillRect/>
-          </a:stretch>
-        </p:blipFill>
-        <p:spPr>
-          <a:xfrm>
-            <a:off x="1799331" y="5362204"/>
-            <a:ext cx="2843807" cy="947936"/>
-          </a:xfrm>
-          <a:prstGeom prst="rect">
-            <a:avLst/>
-          </a:prstGeom>
-        </p:spPr>
-      </p:pic>
-    </p:spTree>
-    <p:extLst>
-      <p:ext uri="{BB962C8B-B14F-4D97-AF65-F5344CB8AC3E}">
-        <p14:creationId xmlns:p14="http://schemas.microsoft.com/office/powerpoint/2010/main" val="673011752"/>
       </p:ext>
     </p:extLst>
   </p:cSld>
@@ -15434,7 +11931,19 @@
           <a:p>
             <a:r>
               <a:rPr lang="fr-FR" dirty="0"/>
+              <a:t>Mes outils</a:t>
+            </a:r>
+          </a:p>
+          <a:p>
+            <a:r>
+              <a:rPr lang="fr-FR" dirty="0"/>
               <a:t>L’architecture du site</a:t>
+            </a:r>
+          </a:p>
+          <a:p>
+            <a:r>
+              <a:rPr lang="fr-FR" dirty="0"/>
+              <a:t>Base de données</a:t>
             </a:r>
           </a:p>
           <a:p>
@@ -15453,12 +11962,6 @@
             <a:r>
               <a:rPr lang="fr-FR" dirty="0"/>
               <a:t>Propositions d’améliorations</a:t>
-            </a:r>
-          </a:p>
-          <a:p>
-            <a:r>
-              <a:rPr lang="fr-FR" dirty="0"/>
-              <a:t>Mes outils</a:t>
             </a:r>
           </a:p>
         </p:txBody>
@@ -16354,7 +12857,7 @@
         </p:blipFill>
         <p:spPr>
           <a:xfrm>
-            <a:off x="6296160" y="1902507"/>
+            <a:off x="6316611" y="1905000"/>
             <a:ext cx="5683758" cy="3900265"/>
           </a:xfrm>
           <a:prstGeom prst="rect">
@@ -16516,7 +13019,7 @@
         </p:blipFill>
         <p:spPr>
           <a:xfrm>
-            <a:off x="549796" y="1222662"/>
+            <a:off x="302295" y="1217961"/>
             <a:ext cx="4037690" cy="2964379"/>
           </a:xfrm>
           <a:prstGeom prst="rect">
@@ -16636,31 +13139,166 @@
             <p:ph type="title"/>
           </p:nvPr>
         </p:nvSpPr>
-        <p:spPr>
-          <a:xfrm>
-            <a:off x="1522413" y="359735"/>
-            <a:ext cx="9144001" cy="1371600"/>
-          </a:xfrm>
-        </p:spPr>
+        <p:spPr/>
         <p:txBody>
           <a:bodyPr anchor="t"/>
           <a:lstStyle/>
           <a:p>
             <a:pPr algn="ctr"/>
             <a:r>
-              <a:rPr lang="fr-FR"/>
-              <a:t>L’architecture du site</a:t>
+              <a:rPr lang="fr-FR" dirty="0"/>
+              <a:t>Mes outils</a:t>
             </a:r>
-            <a:endParaRPr lang="fr-FR" dirty="0"/>
           </a:p>
         </p:txBody>
       </p:sp>
       <p:pic>
         <p:nvPicPr>
-          <p:cNvPr id="34" name="Image 33">
+          <p:cNvPr id="1026" name="Picture 2" descr="RÃ©sultat de recherche d'images pour &quot;laravel&quot;">
             <a:extLst>
               <a:ext uri="{FF2B5EF4-FFF2-40B4-BE49-F238E27FC236}">
-                <a16:creationId xmlns:a16="http://schemas.microsoft.com/office/drawing/2014/main" id="{3BF00DBC-A592-4C8B-A556-2B23E2011257}"/>
+                <a16:creationId xmlns:a16="http://schemas.microsoft.com/office/drawing/2014/main" id="{22F6204E-995F-403D-9018-29F614C326F7}"/>
+              </a:ext>
+            </a:extLst>
+          </p:cNvPr>
+          <p:cNvPicPr>
+            <a:picLocks noChangeAspect="1" noChangeArrowheads="1"/>
+          </p:cNvPicPr>
+          <p:nvPr/>
+        </p:nvPicPr>
+        <p:blipFill>
+          <a:blip r:embed="rId2">
+            <a:extLst>
+              <a:ext uri="{28A0092B-C50C-407E-A947-70E740481C1C}">
+                <a14:useLocalDpi xmlns:a14="http://schemas.microsoft.com/office/drawing/2010/main" val="0"/>
+              </a:ext>
+            </a:extLst>
+          </a:blip>
+          <a:srcRect/>
+          <a:stretch>
+            <a:fillRect/>
+          </a:stretch>
+        </p:blipFill>
+        <p:spPr bwMode="auto">
+          <a:xfrm>
+            <a:off x="6923908" y="1102281"/>
+            <a:ext cx="1904999" cy="1904999"/>
+          </a:xfrm>
+          <a:prstGeom prst="rect">
+            <a:avLst/>
+          </a:prstGeom>
+          <a:noFill/>
+          <a:extLst>
+            <a:ext uri="{909E8E84-426E-40DD-AFC4-6F175D3DCCD1}">
+              <a14:hiddenFill xmlns:a14="http://schemas.microsoft.com/office/drawing/2010/main">
+                <a:solidFill>
+                  <a:srgbClr val="FFFFFF"/>
+                </a:solidFill>
+              </a14:hiddenFill>
+            </a:ext>
+          </a:extLst>
+        </p:spPr>
+      </p:pic>
+      <p:pic>
+        <p:nvPicPr>
+          <p:cNvPr id="1032" name="Picture 8" descr="RÃ©sultat de recherche d'images pour &quot;bootstrap&quot;">
+            <a:extLst>
+              <a:ext uri="{FF2B5EF4-FFF2-40B4-BE49-F238E27FC236}">
+                <a16:creationId xmlns:a16="http://schemas.microsoft.com/office/drawing/2014/main" id="{82650EBD-1954-4BF2-A121-CF037BC282B3}"/>
+              </a:ext>
+            </a:extLst>
+          </p:cNvPr>
+          <p:cNvPicPr>
+            <a:picLocks noChangeAspect="1" noChangeArrowheads="1"/>
+          </p:cNvPicPr>
+          <p:nvPr/>
+        </p:nvPicPr>
+        <p:blipFill>
+          <a:blip r:embed="rId3" cstate="print">
+            <a:extLst>
+              <a:ext uri="{28A0092B-C50C-407E-A947-70E740481C1C}">
+                <a14:useLocalDpi xmlns:a14="http://schemas.microsoft.com/office/drawing/2010/main" val="0"/>
+              </a:ext>
+            </a:extLst>
+          </a:blip>
+          <a:srcRect/>
+          <a:stretch>
+            <a:fillRect/>
+          </a:stretch>
+        </p:blipFill>
+        <p:spPr bwMode="auto">
+          <a:xfrm>
+            <a:off x="6272119" y="3394575"/>
+            <a:ext cx="3208576" cy="1453847"/>
+          </a:xfrm>
+          <a:prstGeom prst="rect">
+            <a:avLst/>
+          </a:prstGeom>
+          <a:noFill/>
+          <a:extLst>
+            <a:ext uri="{909E8E84-426E-40DD-AFC4-6F175D3DCCD1}">
+              <a14:hiddenFill xmlns:a14="http://schemas.microsoft.com/office/drawing/2010/main">
+                <a:solidFill>
+                  <a:srgbClr val="FFFFFF"/>
+                </a:solidFill>
+              </a14:hiddenFill>
+            </a:ext>
+          </a:extLst>
+        </p:spPr>
+      </p:pic>
+      <p:pic>
+        <p:nvPicPr>
+          <p:cNvPr id="1038" name="Picture 14" descr="RÃ©sultat de recherche d'images pour &quot;fontawesome logo&quot;">
+            <a:extLst>
+              <a:ext uri="{FF2B5EF4-FFF2-40B4-BE49-F238E27FC236}">
+                <a16:creationId xmlns:a16="http://schemas.microsoft.com/office/drawing/2014/main" id="{FA0A33DC-4C85-4E8C-BFD4-40C2D86756A5}"/>
+              </a:ext>
+            </a:extLst>
+          </p:cNvPr>
+          <p:cNvPicPr>
+            <a:picLocks noChangeAspect="1" noChangeArrowheads="1"/>
+          </p:cNvPicPr>
+          <p:nvPr/>
+        </p:nvPicPr>
+        <p:blipFill>
+          <a:blip r:embed="rId4">
+            <a:extLst>
+              <a:ext uri="{28A0092B-C50C-407E-A947-70E740481C1C}">
+                <a14:useLocalDpi xmlns:a14="http://schemas.microsoft.com/office/drawing/2010/main" val="0"/>
+              </a:ext>
+            </a:extLst>
+          </a:blip>
+          <a:srcRect/>
+          <a:stretch>
+            <a:fillRect/>
+          </a:stretch>
+        </p:blipFill>
+        <p:spPr bwMode="auto">
+          <a:xfrm>
+            <a:off x="9444863" y="1305292"/>
+            <a:ext cx="1490328" cy="1490328"/>
+          </a:xfrm>
+          <a:prstGeom prst="rect">
+            <a:avLst/>
+          </a:prstGeom>
+          <a:noFill/>
+          <a:extLst>
+            <a:ext uri="{909E8E84-426E-40DD-AFC4-6F175D3DCCD1}">
+              <a14:hiddenFill xmlns:a14="http://schemas.microsoft.com/office/drawing/2010/main">
+                <a:solidFill>
+                  <a:srgbClr val="FFFFFF"/>
+                </a:solidFill>
+              </a14:hiddenFill>
+            </a:ext>
+          </a:extLst>
+        </p:spPr>
+      </p:pic>
+      <p:pic>
+        <p:nvPicPr>
+          <p:cNvPr id="6" name="Image 5">
+            <a:extLst>
+              <a:ext uri="{FF2B5EF4-FFF2-40B4-BE49-F238E27FC236}">
+                <a16:creationId xmlns:a16="http://schemas.microsoft.com/office/drawing/2014/main" id="{9F517ECC-F998-42A9-8089-908CEE030F11}"/>
               </a:ext>
             </a:extLst>
           </p:cNvPr>
@@ -16670,7 +13308,7 @@
           <p:nvPr/>
         </p:nvPicPr>
         <p:blipFill>
-          <a:blip r:embed="rId2">
+          <a:blip r:embed="rId5">
             <a:extLst>
               <a:ext uri="{28A0092B-C50C-407E-A947-70E740481C1C}">
                 <a14:useLocalDpi xmlns:a14="http://schemas.microsoft.com/office/drawing/2010/main" val="0"/>
@@ -16683,8 +13321,246 @@
         </p:blipFill>
         <p:spPr>
           <a:xfrm>
-            <a:off x="1593912" y="1045535"/>
-            <a:ext cx="9001000" cy="5630625"/>
+            <a:off x="828398" y="1235415"/>
+            <a:ext cx="1495634" cy="1486107"/>
+          </a:xfrm>
+          <a:prstGeom prst="rect">
+            <a:avLst/>
+          </a:prstGeom>
+        </p:spPr>
+      </p:pic>
+      <p:pic>
+        <p:nvPicPr>
+          <p:cNvPr id="8" name="Image 7" descr="Une image contenant texte, signe&#10;&#10;Description générée automatiquement">
+            <a:extLst>
+              <a:ext uri="{FF2B5EF4-FFF2-40B4-BE49-F238E27FC236}">
+                <a16:creationId xmlns:a16="http://schemas.microsoft.com/office/drawing/2014/main" id="{1ED49972-73A3-4BFA-AB94-18B311B035CF}"/>
+              </a:ext>
+            </a:extLst>
+          </p:cNvPr>
+          <p:cNvPicPr>
+            <a:picLocks noChangeAspect="1"/>
+          </p:cNvPicPr>
+          <p:nvPr/>
+        </p:nvPicPr>
+        <p:blipFill>
+          <a:blip r:embed="rId6">
+            <a:extLst>
+              <a:ext uri="{28A0092B-C50C-407E-A947-70E740481C1C}">
+                <a14:useLocalDpi xmlns:a14="http://schemas.microsoft.com/office/drawing/2010/main" val="0"/>
+              </a:ext>
+            </a:extLst>
+          </a:blip>
+          <a:stretch>
+            <a:fillRect/>
+          </a:stretch>
+        </p:blipFill>
+        <p:spPr>
+          <a:xfrm>
+            <a:off x="760118" y="3687450"/>
+            <a:ext cx="2232248" cy="868096"/>
+          </a:xfrm>
+          <a:prstGeom prst="rect">
+            <a:avLst/>
+          </a:prstGeom>
+        </p:spPr>
+      </p:pic>
+      <p:pic>
+        <p:nvPicPr>
+          <p:cNvPr id="10" name="Image 9">
+            <a:extLst>
+              <a:ext uri="{FF2B5EF4-FFF2-40B4-BE49-F238E27FC236}">
+                <a16:creationId xmlns:a16="http://schemas.microsoft.com/office/drawing/2014/main" id="{7C0BD8D6-DD17-42D3-ACE7-859FE4BCF9BD}"/>
+              </a:ext>
+            </a:extLst>
+          </p:cNvPr>
+          <p:cNvPicPr>
+            <a:picLocks noChangeAspect="1"/>
+          </p:cNvPicPr>
+          <p:nvPr/>
+        </p:nvPicPr>
+        <p:blipFill>
+          <a:blip r:embed="rId7">
+            <a:extLst>
+              <a:ext uri="{28A0092B-C50C-407E-A947-70E740481C1C}">
+                <a14:useLocalDpi xmlns:a14="http://schemas.microsoft.com/office/drawing/2010/main" val="0"/>
+              </a:ext>
+            </a:extLst>
+          </a:blip>
+          <a:stretch>
+            <a:fillRect/>
+          </a:stretch>
+        </p:blipFill>
+        <p:spPr>
+          <a:xfrm>
+            <a:off x="3158703" y="1061487"/>
+            <a:ext cx="3149249" cy="1659740"/>
+          </a:xfrm>
+          <a:prstGeom prst="rect">
+            <a:avLst/>
+          </a:prstGeom>
+        </p:spPr>
+      </p:pic>
+      <p:pic>
+        <p:nvPicPr>
+          <p:cNvPr id="1044" name="Picture 20" descr="RÃ©sultat de recherche d'images pour &quot;php&quot;">
+            <a:extLst>
+              <a:ext uri="{FF2B5EF4-FFF2-40B4-BE49-F238E27FC236}">
+                <a16:creationId xmlns:a16="http://schemas.microsoft.com/office/drawing/2014/main" id="{1EBB4F7E-8168-4486-8238-392D4C331C87}"/>
+              </a:ext>
+            </a:extLst>
+          </p:cNvPr>
+          <p:cNvPicPr>
+            <a:picLocks noChangeAspect="1" noChangeArrowheads="1"/>
+          </p:cNvPicPr>
+          <p:nvPr/>
+        </p:nvPicPr>
+        <p:blipFill>
+          <a:blip r:embed="rId8" cstate="print">
+            <a:extLst>
+              <a:ext uri="{28A0092B-C50C-407E-A947-70E740481C1C}">
+                <a14:useLocalDpi xmlns:a14="http://schemas.microsoft.com/office/drawing/2010/main" val="0"/>
+              </a:ext>
+            </a:extLst>
+          </a:blip>
+          <a:srcRect/>
+          <a:stretch>
+            <a:fillRect/>
+          </a:stretch>
+        </p:blipFill>
+        <p:spPr bwMode="auto">
+          <a:xfrm>
+            <a:off x="8718209" y="3385589"/>
+            <a:ext cx="2943635" cy="1471818"/>
+          </a:xfrm>
+          <a:prstGeom prst="rect">
+            <a:avLst/>
+          </a:prstGeom>
+          <a:noFill/>
+          <a:extLst>
+            <a:ext uri="{909E8E84-426E-40DD-AFC4-6F175D3DCCD1}">
+              <a14:hiddenFill xmlns:a14="http://schemas.microsoft.com/office/drawing/2010/main">
+                <a:solidFill>
+                  <a:srgbClr val="FFFFFF"/>
+                </a:solidFill>
+              </a14:hiddenFill>
+            </a:ext>
+          </a:extLst>
+        </p:spPr>
+      </p:pic>
+      <p:pic>
+        <p:nvPicPr>
+          <p:cNvPr id="1050" name="Picture 26" descr="RÃ©sultat de recherche d'images pour &quot;phpstorm&quot;">
+            <a:extLst>
+              <a:ext uri="{FF2B5EF4-FFF2-40B4-BE49-F238E27FC236}">
+                <a16:creationId xmlns:a16="http://schemas.microsoft.com/office/drawing/2014/main" id="{160A817C-97C1-415F-A1E7-CCE002488011}"/>
+              </a:ext>
+            </a:extLst>
+          </p:cNvPr>
+          <p:cNvPicPr>
+            <a:picLocks noChangeAspect="1" noChangeArrowheads="1"/>
+          </p:cNvPicPr>
+          <p:nvPr/>
+        </p:nvPicPr>
+        <p:blipFill>
+          <a:blip r:embed="rId9" cstate="print">
+            <a:extLst>
+              <a:ext uri="{28A0092B-C50C-407E-A947-70E740481C1C}">
+                <a14:useLocalDpi xmlns:a14="http://schemas.microsoft.com/office/drawing/2010/main" val="0"/>
+              </a:ext>
+            </a:extLst>
+          </a:blip>
+          <a:srcRect/>
+          <a:stretch>
+            <a:fillRect/>
+          </a:stretch>
+        </p:blipFill>
+        <p:spPr bwMode="auto">
+          <a:xfrm>
+            <a:off x="3885525" y="3404641"/>
+            <a:ext cx="1515226" cy="1515226"/>
+          </a:xfrm>
+          <a:prstGeom prst="rect">
+            <a:avLst/>
+          </a:prstGeom>
+          <a:noFill/>
+          <a:extLst>
+            <a:ext uri="{909E8E84-426E-40DD-AFC4-6F175D3DCCD1}">
+              <a14:hiddenFill xmlns:a14="http://schemas.microsoft.com/office/drawing/2010/main">
+                <a:solidFill>
+                  <a:srgbClr val="FFFFFF"/>
+                </a:solidFill>
+              </a14:hiddenFill>
+            </a:ext>
+          </a:extLst>
+        </p:spPr>
+      </p:pic>
+      <p:pic>
+        <p:nvPicPr>
+          <p:cNvPr id="12" name="Image 11" descr="Une image contenant clipart&#10;&#10;Description générée automatiquement">
+            <a:extLst>
+              <a:ext uri="{FF2B5EF4-FFF2-40B4-BE49-F238E27FC236}">
+                <a16:creationId xmlns:a16="http://schemas.microsoft.com/office/drawing/2014/main" id="{97D2C100-DC90-4FD3-BDC7-B099ED9889E6}"/>
+              </a:ext>
+            </a:extLst>
+          </p:cNvPr>
+          <p:cNvPicPr>
+            <a:picLocks noChangeAspect="1"/>
+          </p:cNvPicPr>
+          <p:nvPr/>
+        </p:nvPicPr>
+        <p:blipFill>
+          <a:blip r:embed="rId10">
+            <a:extLst>
+              <a:ext uri="{28A0092B-C50C-407E-A947-70E740481C1C}">
+                <a14:useLocalDpi xmlns:a14="http://schemas.microsoft.com/office/drawing/2010/main" val="0"/>
+              </a:ext>
+            </a:extLst>
+          </a:blip>
+          <a:stretch>
+            <a:fillRect/>
+          </a:stretch>
+        </p:blipFill>
+        <p:spPr>
+          <a:xfrm>
+            <a:off x="7570740" y="5458849"/>
+            <a:ext cx="2943636" cy="771633"/>
+          </a:xfrm>
+          <a:prstGeom prst="rect">
+            <a:avLst/>
+          </a:prstGeom>
+        </p:spPr>
+      </p:pic>
+      <p:pic>
+        <p:nvPicPr>
+          <p:cNvPr id="14" name="Image 13">
+            <a:extLst>
+              <a:ext uri="{FF2B5EF4-FFF2-40B4-BE49-F238E27FC236}">
+                <a16:creationId xmlns:a16="http://schemas.microsoft.com/office/drawing/2014/main" id="{A87C0993-6497-41E7-B385-1D35677C63B1}"/>
+              </a:ext>
+            </a:extLst>
+          </p:cNvPr>
+          <p:cNvPicPr>
+            <a:picLocks noChangeAspect="1"/>
+          </p:cNvPicPr>
+          <p:nvPr/>
+        </p:nvPicPr>
+        <p:blipFill>
+          <a:blip r:embed="rId11">
+            <a:extLst>
+              <a:ext uri="{28A0092B-C50C-407E-A947-70E740481C1C}">
+                <a14:useLocalDpi xmlns:a14="http://schemas.microsoft.com/office/drawing/2010/main" val="0"/>
+              </a:ext>
+            </a:extLst>
+          </a:blip>
+          <a:stretch>
+            <a:fillRect/>
+          </a:stretch>
+        </p:blipFill>
+        <p:spPr>
+          <a:xfrm>
+            <a:off x="1799331" y="5362204"/>
+            <a:ext cx="2843807" cy="947936"/>
           </a:xfrm>
           <a:prstGeom prst="rect">
             <a:avLst/>
@@ -16694,7 +13570,7 @@
     </p:spTree>
     <p:extLst>
       <p:ext uri="{BB962C8B-B14F-4D97-AF65-F5344CB8AC3E}">
-        <p14:creationId xmlns:p14="http://schemas.microsoft.com/office/powerpoint/2010/main" val="2900554787"/>
+        <p14:creationId xmlns:p14="http://schemas.microsoft.com/office/powerpoint/2010/main" val="673011752"/>
       </p:ext>
     </p:extLst>
   </p:cSld>
@@ -17186,7 +14062,7 @@
         <p:spPr>
           <a:xfrm>
             <a:off x="6427570" y="4234715"/>
-            <a:ext cx="2655824" cy="923330"/>
+            <a:ext cx="2655824" cy="1200329"/>
           </a:xfrm>
           <a:prstGeom prst="rect">
             <a:avLst/>
@@ -17201,7 +14077,7 @@
           <a:p>
             <a:r>
               <a:rPr lang="fr-FR" dirty="0"/>
-              <a:t>L’utilisateur clique sur le lien et HomeController va charger les sondages</a:t>
+              <a:t>L’utilisateur clique sur le lien et HomeController va charger les réponses du sondage</a:t>
             </a:r>
           </a:p>
         </p:txBody>
@@ -19966,6 +16842,15 @@
 </file>
 
 <file path=customXml/item1.xml><?xml version="1.0" encoding="utf-8"?>
+<?mso-contentType ?>
+<FormTemplates xmlns="http://schemas.microsoft.com/sharepoint/v3/contenttype/forms">
+  <Display>DocumentLibraryForm</Display>
+  <Edit>AssetEditForm</Edit>
+  <New>DocumentLibraryForm</New>
+</FormTemplates>
+</file>
+
+<file path=customXml/item2.xml><?xml version="1.0" encoding="utf-8"?>
 <ct:contentTypeSchema xmlns:ct="http://schemas.microsoft.com/office/2006/metadata/contentType" xmlns:ma="http://schemas.microsoft.com/office/2006/metadata/properties/metaAttributes" ct:_="" ma:_="" ma:contentTypeName="TemplateFile" ma:contentTypeID="0x0101006EDDDB5EE6D98C44930B742096920B300400F5B6D36B3EF94B4E9A635CDF2A18F5B8" ma:contentTypeVersion="72" ma:contentTypeDescription="Create a new document." ma:contentTypeScope="" ma:versionID="a23e56308344d904b51738559c3d67c9">
   <xsd:schema xmlns:xsd="http://www.w3.org/2001/XMLSchema" xmlns:xs="http://www.w3.org/2001/XMLSchema" xmlns:p="http://schemas.microsoft.com/office/2006/metadata/properties" xmlns:ns2="4873beb7-5857-4685-be1f-d57550cc96cc" targetNamespace="http://schemas.microsoft.com/office/2006/metadata/properties" ma:root="true" ma:fieldsID="cd0908cc4600e77bf5da051303e00c8d" ns2:_="">
     <xsd:import namespace="4873beb7-5857-4685-be1f-d57550cc96cc"/>
@@ -21005,15 +17890,6 @@
 </ct:contentTypeSchema>
 </file>
 
-<file path=customXml/item2.xml><?xml version="1.0" encoding="utf-8"?>
-<?mso-contentType ?>
-<FormTemplates xmlns="http://schemas.microsoft.com/sharepoint/v3/contenttype/forms">
-  <Display>DocumentLibraryForm</Display>
-  <Edit>AssetEditForm</Edit>
-  <New>DocumentLibraryForm</New>
-</FormTemplates>
-</file>
-
 <file path=customXml/item3.xml><?xml version="1.0" encoding="utf-8"?>
 <p:properties xmlns:p="http://schemas.microsoft.com/office/2006/metadata/properties" xmlns:xsi="http://www.w3.org/2001/XMLSchema-instance" xmlns:pc="http://schemas.microsoft.com/office/infopath/2007/PartnerControls">
   <documentManagement>
@@ -21142,6 +18018,14 @@
 </file>
 
 <file path=customXml/itemProps1.xml><?xml version="1.0" encoding="utf-8"?>
+<ds:datastoreItem xmlns:ds="http://schemas.openxmlformats.org/officeDocument/2006/customXml" ds:itemID="{74228E6B-D70C-44BB-A81F-A245495F612B}">
+  <ds:schemaRefs>
+    <ds:schemaRef ds:uri="http://schemas.microsoft.com/sharepoint/v3/contenttype/forms"/>
+  </ds:schemaRefs>
+</ds:datastoreItem>
+</file>
+
+<file path=customXml/itemProps2.xml><?xml version="1.0" encoding="utf-8"?>
 <ds:datastoreItem xmlns:ds="http://schemas.openxmlformats.org/officeDocument/2006/customXml" ds:itemID="{22CCB507-0646-4A50-A4F7-7F385079D589}">
   <ds:schemaRefs>
     <ds:schemaRef ds:uri="http://schemas.microsoft.com/office/2006/metadata/contentType"/>
@@ -21155,14 +18039,6 @@
     <ds:schemaRef ds:uri="http://purl.org/dc/elements/1.1/"/>
     <ds:schemaRef ds:uri="http://purl.org/dc/terms/"/>
     <ds:schemaRef ds:uri="http://schemas.microsoft.com/internal/obd"/>
-  </ds:schemaRefs>
-</ds:datastoreItem>
-</file>
-
-<file path=customXml/itemProps2.xml><?xml version="1.0" encoding="utf-8"?>
-<ds:datastoreItem xmlns:ds="http://schemas.openxmlformats.org/officeDocument/2006/customXml" ds:itemID="{74228E6B-D70C-44BB-A81F-A245495F612B}">
-  <ds:schemaRefs>
-    <ds:schemaRef ds:uri="http://schemas.microsoft.com/sharepoint/v3/contenttype/forms"/>
   </ds:schemaRefs>
 </ds:datastoreItem>
 </file>

</xml_diff>